<commit_message>
afterAdd animation for quickAdd; small comment in PPT
</commit_message>
<xml_diff>
--- a/Durandal T4T.pptx
+++ b/Durandal T4T.pptx
@@ -1382,6 +1382,156 @@
     <p:extLst>
       <p:ext uri="{BB962C8B-B14F-4D97-AF65-F5344CB8AC3E}">
         <p14:creationId xmlns:p14="http://schemas.microsoft.com/office/powerpoint/2010/main" val="1767491647"/>
+      </p:ext>
+    </p:extLst>
+  </p:cSld>
+  <p:clrMapOvr>
+    <a:masterClrMapping/>
+  </p:clrMapOvr>
+</p:notes>
+</file>
+
+<file path=ppt/notesSlides/notesSlide8.xml><?xml version="1.0" encoding="utf-8"?>
+<p:notes xmlns:a="http://schemas.openxmlformats.org/drawingml/2006/main" xmlns:r="http://schemas.openxmlformats.org/officeDocument/2006/relationships" xmlns:p="http://schemas.openxmlformats.org/presentationml/2006/main">
+  <p:cSld>
+    <p:spTree>
+      <p:nvGrpSpPr>
+        <p:cNvPr id="1" name=""/>
+        <p:cNvGrpSpPr/>
+        <p:nvPr/>
+      </p:nvGrpSpPr>
+      <p:grpSpPr>
+        <a:xfrm>
+          <a:off x="0" y="0"/>
+          <a:ext cx="0" cy="0"/>
+          <a:chOff x="0" y="0"/>
+          <a:chExt cx="0" cy="0"/>
+        </a:xfrm>
+      </p:grpSpPr>
+      <p:sp>
+        <p:nvSpPr>
+          <p:cNvPr id="2" name="Slide Image Placeholder 1"/>
+          <p:cNvSpPr>
+            <a:spLocks noGrp="1" noRot="1" noChangeAspect="1"/>
+          </p:cNvSpPr>
+          <p:nvPr>
+            <p:ph type="sldImg"/>
+          </p:nvPr>
+        </p:nvSpPr>
+        <p:spPr/>
+      </p:sp>
+      <p:sp>
+        <p:nvSpPr>
+          <p:cNvPr id="3" name="Notes Placeholder 2"/>
+          <p:cNvSpPr>
+            <a:spLocks noGrp="1"/>
+          </p:cNvSpPr>
+          <p:nvPr>
+            <p:ph type="body" idx="1"/>
+          </p:nvPr>
+        </p:nvSpPr>
+        <p:spPr/>
+        <p:txBody>
+          <a:bodyPr/>
+          <a:lstStyle/>
+          <a:p>
+            <a:r>
+              <a:rPr lang="nl-BE" dirty="0" err="1" smtClean="0"/>
+              <a:t>Css</a:t>
+            </a:r>
+            <a:r>
+              <a:rPr lang="nl-BE" dirty="0" smtClean="0"/>
+              <a:t>: </a:t>
+            </a:r>
+            <a:r>
+              <a:rPr lang="nl-BE" dirty="0" err="1" smtClean="0"/>
+              <a:t>add</a:t>
+            </a:r>
+            <a:r>
+              <a:rPr lang="nl-BE" dirty="0" smtClean="0"/>
+              <a:t> or </a:t>
+            </a:r>
+            <a:r>
+              <a:rPr lang="nl-BE" dirty="0" err="1" smtClean="0"/>
+              <a:t>remove</a:t>
+            </a:r>
+            <a:r>
+              <a:rPr lang="nl-BE" dirty="0" smtClean="0"/>
+              <a:t> a class</a:t>
+            </a:r>
+          </a:p>
+          <a:p>
+            <a:r>
+              <a:rPr lang="nl-BE" dirty="0" smtClean="0"/>
+              <a:t>Style: </a:t>
+            </a:r>
+            <a:r>
+              <a:rPr lang="nl-BE" dirty="0" err="1" smtClean="0"/>
+              <a:t>add</a:t>
+            </a:r>
+            <a:r>
+              <a:rPr lang="nl-BE" dirty="0" smtClean="0"/>
+              <a:t> or </a:t>
+            </a:r>
+            <a:r>
+              <a:rPr lang="nl-BE" dirty="0" err="1" smtClean="0"/>
+              <a:t>remove</a:t>
+            </a:r>
+            <a:r>
+              <a:rPr lang="nl-BE" dirty="0" smtClean="0"/>
+              <a:t> </a:t>
+            </a:r>
+            <a:r>
+              <a:rPr lang="nl-BE" dirty="0" err="1" smtClean="0"/>
+              <a:t>certain</a:t>
+            </a:r>
+            <a:r>
+              <a:rPr lang="nl-BE" dirty="0" smtClean="0"/>
+              <a:t> </a:t>
+            </a:r>
+            <a:r>
+              <a:rPr lang="nl-BE" dirty="0" err="1" smtClean="0"/>
+              <a:t>css</a:t>
+            </a:r>
+            <a:r>
+              <a:rPr lang="nl-BE" dirty="0" smtClean="0"/>
+              <a:t> </a:t>
+            </a:r>
+            <a:r>
+              <a:rPr lang="nl-BE" smtClean="0"/>
+              <a:t>attributes</a:t>
+            </a:r>
+            <a:endParaRPr lang="en-US"/>
+          </a:p>
+        </p:txBody>
+      </p:sp>
+      <p:sp>
+        <p:nvSpPr>
+          <p:cNvPr id="4" name="Slide Number Placeholder 3"/>
+          <p:cNvSpPr>
+            <a:spLocks noGrp="1"/>
+          </p:cNvSpPr>
+          <p:nvPr>
+            <p:ph type="sldNum" sz="quarter" idx="10"/>
+          </p:nvPr>
+        </p:nvSpPr>
+        <p:spPr/>
+        <p:txBody>
+          <a:bodyPr/>
+          <a:lstStyle/>
+          <a:p>
+            <a:fld id="{0DF56419-AC34-45D0-BAB8-5A4CB1E563BF}" type="slidenum">
+              <a:rPr lang="en-US" smtClean="0"/>
+              <a:t>17</a:t>
+            </a:fld>
+            <a:endParaRPr lang="en-US"/>
+          </a:p>
+        </p:txBody>
+      </p:sp>
+    </p:spTree>
+    <p:extLst>
+      <p:ext uri="{BB962C8B-B14F-4D97-AF65-F5344CB8AC3E}">
+        <p14:creationId xmlns:p14="http://schemas.microsoft.com/office/powerpoint/2010/main" val="4207004726"/>
       </p:ext>
     </p:extLst>
   </p:cSld>
@@ -5801,7 +5951,7 @@
               <a:t>: </a:t>
             </a:r>
             <a:r>
-              <a:rPr lang="nl-BE" smtClean="0"/>
+              <a:rPr lang="nl-BE" dirty="0" err="1" smtClean="0"/>
               <a:t>customBindings</a:t>
             </a:r>
             <a:endParaRPr lang="en-US" dirty="0"/>

</xml_diff>

<commit_message>
Finished KO slides, moved on to Durandal slides
</commit_message>
<xml_diff>
--- a/Durandal T4T.pptx
+++ b/Durandal T4T.pptx
@@ -5,7 +5,7 @@
     <p:sldMasterId id="2147483648" r:id="rId1"/>
   </p:sldMasterIdLst>
   <p:notesMasterIdLst>
-    <p:notesMasterId r:id="rId20"/>
+    <p:notesMasterId r:id="rId27"/>
   </p:notesMasterIdLst>
   <p:sldIdLst>
     <p:sldId id="256" r:id="rId2"/>
@@ -17,15 +17,22 @@
     <p:sldId id="261" r:id="rId8"/>
     <p:sldId id="262" r:id="rId9"/>
     <p:sldId id="263" r:id="rId10"/>
-    <p:sldId id="264" r:id="rId11"/>
-    <p:sldId id="266" r:id="rId12"/>
-    <p:sldId id="267" r:id="rId13"/>
-    <p:sldId id="268" r:id="rId14"/>
-    <p:sldId id="269" r:id="rId15"/>
-    <p:sldId id="270" r:id="rId16"/>
-    <p:sldId id="272" r:id="rId17"/>
-    <p:sldId id="271" r:id="rId18"/>
-    <p:sldId id="273" r:id="rId19"/>
+    <p:sldId id="274" r:id="rId11"/>
+    <p:sldId id="264" r:id="rId12"/>
+    <p:sldId id="266" r:id="rId13"/>
+    <p:sldId id="267" r:id="rId14"/>
+    <p:sldId id="268" r:id="rId15"/>
+    <p:sldId id="269" r:id="rId16"/>
+    <p:sldId id="270" r:id="rId17"/>
+    <p:sldId id="272" r:id="rId18"/>
+    <p:sldId id="271" r:id="rId19"/>
+    <p:sldId id="273" r:id="rId20"/>
+    <p:sldId id="275" r:id="rId21"/>
+    <p:sldId id="276" r:id="rId22"/>
+    <p:sldId id="277" r:id="rId23"/>
+    <p:sldId id="278" r:id="rId24"/>
+    <p:sldId id="279" r:id="rId25"/>
+    <p:sldId id="280" r:id="rId26"/>
   </p:sldIdLst>
   <p:sldSz cx="12192000" cy="6858000"/>
   <p:notesSz cx="6858000" cy="9144000"/>
@@ -608,6 +615,206 @@
 </p:notes>
 </file>
 
+<file path=ppt/notesSlides/notesSlide10.xml><?xml version="1.0" encoding="utf-8"?>
+<p:notes xmlns:a="http://schemas.openxmlformats.org/drawingml/2006/main" xmlns:r="http://schemas.openxmlformats.org/officeDocument/2006/relationships" xmlns:p="http://schemas.openxmlformats.org/presentationml/2006/main">
+  <p:cSld>
+    <p:spTree>
+      <p:nvGrpSpPr>
+        <p:cNvPr id="1" name=""/>
+        <p:cNvGrpSpPr/>
+        <p:nvPr/>
+      </p:nvGrpSpPr>
+      <p:grpSpPr>
+        <a:xfrm>
+          <a:off x="0" y="0"/>
+          <a:ext cx="0" cy="0"/>
+          <a:chOff x="0" y="0"/>
+          <a:chExt cx="0" cy="0"/>
+        </a:xfrm>
+      </p:grpSpPr>
+      <p:sp>
+        <p:nvSpPr>
+          <p:cNvPr id="2" name="Slide Image Placeholder 1"/>
+          <p:cNvSpPr>
+            <a:spLocks noGrp="1" noRot="1" noChangeAspect="1"/>
+          </p:cNvSpPr>
+          <p:nvPr>
+            <p:ph type="sldImg"/>
+          </p:nvPr>
+        </p:nvSpPr>
+        <p:spPr/>
+      </p:sp>
+      <p:sp>
+        <p:nvSpPr>
+          <p:cNvPr id="3" name="Notes Placeholder 2"/>
+          <p:cNvSpPr>
+            <a:spLocks noGrp="1"/>
+          </p:cNvSpPr>
+          <p:nvPr>
+            <p:ph type="body" idx="1"/>
+          </p:nvPr>
+        </p:nvSpPr>
+        <p:spPr/>
+        <p:txBody>
+          <a:bodyPr/>
+          <a:lstStyle/>
+          <a:p>
+            <a:r>
+              <a:rPr lang="nl-BE" dirty="0" err="1" smtClean="0"/>
+              <a:t>Id</a:t>
+            </a:r>
+            <a:r>
+              <a:rPr lang="nl-BE" dirty="0" smtClean="0"/>
+              <a:t> is afgeleid</a:t>
+            </a:r>
+            <a:r>
+              <a:rPr lang="nl-BE" baseline="0" dirty="0" smtClean="0"/>
+              <a:t> van pad relatief t.o.v. </a:t>
+            </a:r>
+            <a:r>
+              <a:rPr lang="nl-BE" baseline="0" dirty="0" err="1" smtClean="0"/>
+              <a:t>baseUrl</a:t>
+            </a:r>
+            <a:r>
+              <a:rPr lang="nl-BE" baseline="0" dirty="0" smtClean="0"/>
+              <a:t> (normaal locatie van main.js)</a:t>
+            </a:r>
+            <a:endParaRPr lang="en-US" dirty="0"/>
+          </a:p>
+        </p:txBody>
+      </p:sp>
+      <p:sp>
+        <p:nvSpPr>
+          <p:cNvPr id="4" name="Slide Number Placeholder 3"/>
+          <p:cNvSpPr>
+            <a:spLocks noGrp="1"/>
+          </p:cNvSpPr>
+          <p:nvPr>
+            <p:ph type="sldNum" sz="quarter" idx="10"/>
+          </p:nvPr>
+        </p:nvSpPr>
+        <p:spPr/>
+        <p:txBody>
+          <a:bodyPr/>
+          <a:lstStyle/>
+          <a:p>
+            <a:fld id="{0DF56419-AC34-45D0-BAB8-5A4CB1E563BF}" type="slidenum">
+              <a:rPr lang="en-US" smtClean="0"/>
+              <a:t>22</a:t>
+            </a:fld>
+            <a:endParaRPr lang="en-US"/>
+          </a:p>
+        </p:txBody>
+      </p:sp>
+    </p:spTree>
+    <p:extLst>
+      <p:ext uri="{BB962C8B-B14F-4D97-AF65-F5344CB8AC3E}">
+        <p14:creationId xmlns:p14="http://schemas.microsoft.com/office/powerpoint/2010/main" val="106862747"/>
+      </p:ext>
+    </p:extLst>
+  </p:cSld>
+  <p:clrMapOvr>
+    <a:masterClrMapping/>
+  </p:clrMapOvr>
+</p:notes>
+</file>
+
+<file path=ppt/notesSlides/notesSlide11.xml><?xml version="1.0" encoding="utf-8"?>
+<p:notes xmlns:a="http://schemas.openxmlformats.org/drawingml/2006/main" xmlns:r="http://schemas.openxmlformats.org/officeDocument/2006/relationships" xmlns:p="http://schemas.openxmlformats.org/presentationml/2006/main">
+  <p:cSld>
+    <p:spTree>
+      <p:nvGrpSpPr>
+        <p:cNvPr id="1" name=""/>
+        <p:cNvGrpSpPr/>
+        <p:nvPr/>
+      </p:nvGrpSpPr>
+      <p:grpSpPr>
+        <a:xfrm>
+          <a:off x="0" y="0"/>
+          <a:ext cx="0" cy="0"/>
+          <a:chOff x="0" y="0"/>
+          <a:chExt cx="0" cy="0"/>
+        </a:xfrm>
+      </p:grpSpPr>
+      <p:sp>
+        <p:nvSpPr>
+          <p:cNvPr id="2" name="Slide Image Placeholder 1"/>
+          <p:cNvSpPr>
+            <a:spLocks noGrp="1" noRot="1" noChangeAspect="1"/>
+          </p:cNvSpPr>
+          <p:nvPr>
+            <p:ph type="sldImg"/>
+          </p:nvPr>
+        </p:nvSpPr>
+        <p:spPr/>
+      </p:sp>
+      <p:sp>
+        <p:nvSpPr>
+          <p:cNvPr id="3" name="Notes Placeholder 2"/>
+          <p:cNvSpPr>
+            <a:spLocks noGrp="1"/>
+          </p:cNvSpPr>
+          <p:nvPr>
+            <p:ph type="body" idx="1"/>
+          </p:nvPr>
+        </p:nvSpPr>
+        <p:spPr/>
+        <p:txBody>
+          <a:bodyPr/>
+          <a:lstStyle/>
+          <a:p>
+            <a:r>
+              <a:rPr lang="nl-BE" dirty="0" smtClean="0"/>
+              <a:t>Indien meerdere root </a:t>
+            </a:r>
+            <a:r>
+              <a:rPr lang="nl-BE" dirty="0" err="1" smtClean="0"/>
+              <a:t>elements</a:t>
+            </a:r>
+            <a:r>
+              <a:rPr lang="nl-BE" dirty="0" smtClean="0"/>
+              <a:t>, dan worden deze in een div geplaatst</a:t>
+            </a:r>
+            <a:endParaRPr lang="en-US" dirty="0"/>
+          </a:p>
+        </p:txBody>
+      </p:sp>
+      <p:sp>
+        <p:nvSpPr>
+          <p:cNvPr id="4" name="Slide Number Placeholder 3"/>
+          <p:cNvSpPr>
+            <a:spLocks noGrp="1"/>
+          </p:cNvSpPr>
+          <p:nvPr>
+            <p:ph type="sldNum" sz="quarter" idx="10"/>
+          </p:nvPr>
+        </p:nvSpPr>
+        <p:spPr/>
+        <p:txBody>
+          <a:bodyPr/>
+          <a:lstStyle/>
+          <a:p>
+            <a:fld id="{0DF56419-AC34-45D0-BAB8-5A4CB1E563BF}" type="slidenum">
+              <a:rPr lang="en-US" smtClean="0"/>
+              <a:t>23</a:t>
+            </a:fld>
+            <a:endParaRPr lang="en-US"/>
+          </a:p>
+        </p:txBody>
+      </p:sp>
+    </p:spTree>
+    <p:extLst>
+      <p:ext uri="{BB962C8B-B14F-4D97-AF65-F5344CB8AC3E}">
+        <p14:creationId xmlns:p14="http://schemas.microsoft.com/office/powerpoint/2010/main" val="3152353316"/>
+      </p:ext>
+    </p:extLst>
+  </p:cSld>
+  <p:clrMapOvr>
+    <a:masterClrMapping/>
+  </p:clrMapOvr>
+</p:notes>
+</file>
+
 <file path=ppt/notesSlides/notesSlide2.xml><?xml version="1.0" encoding="utf-8"?>
 <p:notes xmlns:a="http://schemas.openxmlformats.org/drawingml/2006/main" xmlns:r="http://schemas.openxmlformats.org/officeDocument/2006/relationships" xmlns:p="http://schemas.openxmlformats.org/presentationml/2006/main">
   <p:cSld>
@@ -812,7 +1019,7 @@
           <a:p>
             <a:fld id="{0DF56419-AC34-45D0-BAB8-5A4CB1E563BF}" type="slidenum">
               <a:rPr lang="en-US" smtClean="0"/>
-              <a:t>11</a:t>
+              <a:t>12</a:t>
             </a:fld>
             <a:endParaRPr lang="en-US"/>
           </a:p>
@@ -920,7 +1127,7 @@
           <a:p>
             <a:fld id="{0DF56419-AC34-45D0-BAB8-5A4CB1E563BF}" type="slidenum">
               <a:rPr lang="en-US" smtClean="0"/>
-              <a:t>13</a:t>
+              <a:t>14</a:t>
             </a:fld>
             <a:endParaRPr lang="en-US"/>
           </a:p>
@@ -1038,7 +1245,7 @@
           <a:p>
             <a:fld id="{0DF56419-AC34-45D0-BAB8-5A4CB1E563BF}" type="slidenum">
               <a:rPr lang="en-US" smtClean="0"/>
-              <a:t>14</a:t>
+              <a:t>15</a:t>
             </a:fld>
             <a:endParaRPr lang="en-US"/>
           </a:p>
@@ -1240,7 +1447,7 @@
           <a:p>
             <a:fld id="{0DF56419-AC34-45D0-BAB8-5A4CB1E563BF}" type="slidenum">
               <a:rPr lang="en-US" smtClean="0"/>
-              <a:t>15</a:t>
+              <a:t>16</a:t>
             </a:fld>
             <a:endParaRPr lang="en-US"/>
           </a:p>
@@ -1372,7 +1579,7 @@
           <a:p>
             <a:fld id="{0DF56419-AC34-45D0-BAB8-5A4CB1E563BF}" type="slidenum">
               <a:rPr lang="en-US" smtClean="0"/>
-              <a:t>16</a:t>
+              <a:t>17</a:t>
             </a:fld>
             <a:endParaRPr lang="en-US"/>
           </a:p>
@@ -1498,10 +1705,10 @@
               <a:t> </a:t>
             </a:r>
             <a:r>
-              <a:rPr lang="nl-BE" smtClean="0"/>
+              <a:rPr lang="nl-BE" dirty="0" err="1" smtClean="0"/>
               <a:t>attributes</a:t>
             </a:r>
-            <a:endParaRPr lang="en-US"/>
+            <a:endParaRPr lang="en-US" dirty="0"/>
           </a:p>
         </p:txBody>
       </p:sp>
@@ -1522,7 +1729,7 @@
           <a:p>
             <a:fld id="{0DF56419-AC34-45D0-BAB8-5A4CB1E563BF}" type="slidenum">
               <a:rPr lang="en-US" smtClean="0"/>
-              <a:t>17</a:t>
+              <a:t>18</a:t>
             </a:fld>
             <a:endParaRPr lang="en-US"/>
           </a:p>
@@ -1532,6 +1739,186 @@
     <p:extLst>
       <p:ext uri="{BB962C8B-B14F-4D97-AF65-F5344CB8AC3E}">
         <p14:creationId xmlns:p14="http://schemas.microsoft.com/office/powerpoint/2010/main" val="4207004726"/>
+      </p:ext>
+    </p:extLst>
+  </p:cSld>
+  <p:clrMapOvr>
+    <a:masterClrMapping/>
+  </p:clrMapOvr>
+</p:notes>
+</file>
+
+<file path=ppt/notesSlides/notesSlide9.xml><?xml version="1.0" encoding="utf-8"?>
+<p:notes xmlns:a="http://schemas.openxmlformats.org/drawingml/2006/main" xmlns:r="http://schemas.openxmlformats.org/officeDocument/2006/relationships" xmlns:p="http://schemas.openxmlformats.org/presentationml/2006/main">
+  <p:cSld>
+    <p:spTree>
+      <p:nvGrpSpPr>
+        <p:cNvPr id="1" name=""/>
+        <p:cNvGrpSpPr/>
+        <p:nvPr/>
+      </p:nvGrpSpPr>
+      <p:grpSpPr>
+        <a:xfrm>
+          <a:off x="0" y="0"/>
+          <a:ext cx="0" cy="0"/>
+          <a:chOff x="0" y="0"/>
+          <a:chExt cx="0" cy="0"/>
+        </a:xfrm>
+      </p:grpSpPr>
+      <p:sp>
+        <p:nvSpPr>
+          <p:cNvPr id="2" name="Slide Image Placeholder 1"/>
+          <p:cNvSpPr>
+            <a:spLocks noGrp="1" noRot="1" noChangeAspect="1"/>
+          </p:cNvSpPr>
+          <p:nvPr>
+            <p:ph type="sldImg"/>
+          </p:nvPr>
+        </p:nvSpPr>
+        <p:spPr/>
+      </p:sp>
+      <p:sp>
+        <p:nvSpPr>
+          <p:cNvPr id="3" name="Notes Placeholder 2"/>
+          <p:cNvSpPr>
+            <a:spLocks noGrp="1"/>
+          </p:cNvSpPr>
+          <p:nvPr>
+            <p:ph type="body" idx="1"/>
+          </p:nvPr>
+        </p:nvSpPr>
+        <p:spPr/>
+        <p:txBody>
+          <a:bodyPr/>
+          <a:lstStyle/>
+          <a:p>
+            <a:r>
+              <a:rPr lang="nl-BE" dirty="0" err="1" smtClean="0"/>
+              <a:t>toJS</a:t>
+            </a:r>
+            <a:r>
+              <a:rPr lang="nl-BE" dirty="0" smtClean="0"/>
+              <a:t>: je object heeft geen </a:t>
+            </a:r>
+            <a:r>
+              <a:rPr lang="nl-BE" dirty="0" err="1" smtClean="0"/>
+              <a:t>observables</a:t>
+            </a:r>
+            <a:r>
+              <a:rPr lang="nl-BE" baseline="0" dirty="0" smtClean="0"/>
+              <a:t> meer, het is een normaal JS object</a:t>
+            </a:r>
+          </a:p>
+          <a:p>
+            <a:r>
+              <a:rPr lang="nl-BE" baseline="0" dirty="0" err="1" smtClean="0"/>
+              <a:t>toJSON</a:t>
+            </a:r>
+            <a:r>
+              <a:rPr lang="nl-BE" baseline="0" dirty="0" smtClean="0"/>
+              <a:t>: doet intern eerst een call naar </a:t>
+            </a:r>
+            <a:r>
+              <a:rPr lang="nl-BE" baseline="0" dirty="0" err="1" smtClean="0"/>
+              <a:t>toJS</a:t>
+            </a:r>
+            <a:r>
+              <a:rPr lang="nl-BE" baseline="0" dirty="0" smtClean="0"/>
+              <a:t>, </a:t>
+            </a:r>
+            <a:r>
+              <a:rPr lang="nl-BE" baseline="0" dirty="0" err="1" smtClean="0"/>
+              <a:t>serializeert</a:t>
+            </a:r>
+            <a:r>
+              <a:rPr lang="nl-BE" baseline="0" dirty="0" smtClean="0"/>
+              <a:t> dan naar een JSON string</a:t>
+            </a:r>
+          </a:p>
+          <a:p>
+            <a:r>
+              <a:rPr lang="nl-BE" baseline="0" dirty="0" smtClean="0"/>
+              <a:t>Alle members worden geëvalueerd, ook </a:t>
+            </a:r>
+            <a:r>
+              <a:rPr lang="nl-BE" baseline="0" dirty="0" err="1" smtClean="0"/>
+              <a:t>computed</a:t>
+            </a:r>
+            <a:r>
+              <a:rPr lang="nl-BE" baseline="0" dirty="0" smtClean="0"/>
+              <a:t> </a:t>
+            </a:r>
+            <a:r>
+              <a:rPr lang="nl-BE" baseline="0" dirty="0" err="1" smtClean="0"/>
+              <a:t>observables</a:t>
+            </a:r>
+            <a:r>
+              <a:rPr lang="nl-BE" baseline="0" dirty="0" smtClean="0"/>
+              <a:t>, non-</a:t>
+            </a:r>
+            <a:r>
+              <a:rPr lang="nl-BE" baseline="0" dirty="0" err="1" smtClean="0"/>
+              <a:t>observables</a:t>
+            </a:r>
+            <a:r>
+              <a:rPr lang="nl-BE" baseline="0" dirty="0" smtClean="0"/>
+              <a:t>, </a:t>
+            </a:r>
+            <a:r>
+              <a:rPr lang="nl-BE" baseline="0" dirty="0" err="1" smtClean="0"/>
+              <a:t>observable</a:t>
+            </a:r>
+            <a:r>
+              <a:rPr lang="nl-BE" baseline="0" dirty="0" smtClean="0"/>
+              <a:t> arrays, </a:t>
+            </a:r>
+            <a:r>
+              <a:rPr lang="nl-BE" baseline="0" dirty="0" err="1" smtClean="0"/>
+              <a:t>child</a:t>
+            </a:r>
+            <a:r>
+              <a:rPr lang="nl-BE" baseline="0" dirty="0" smtClean="0"/>
+              <a:t> </a:t>
+            </a:r>
+            <a:r>
+              <a:rPr lang="nl-BE" baseline="0" dirty="0" err="1" smtClean="0"/>
+              <a:t>viewmodels</a:t>
+            </a:r>
+            <a:r>
+              <a:rPr lang="nl-BE" baseline="0" dirty="0" smtClean="0"/>
+              <a:t>, enz.</a:t>
+            </a:r>
+            <a:endParaRPr lang="en-US" dirty="0"/>
+          </a:p>
+        </p:txBody>
+      </p:sp>
+      <p:sp>
+        <p:nvSpPr>
+          <p:cNvPr id="4" name="Slide Number Placeholder 3"/>
+          <p:cNvSpPr>
+            <a:spLocks noGrp="1"/>
+          </p:cNvSpPr>
+          <p:nvPr>
+            <p:ph type="sldNum" sz="quarter" idx="10"/>
+          </p:nvPr>
+        </p:nvSpPr>
+        <p:spPr/>
+        <p:txBody>
+          <a:bodyPr/>
+          <a:lstStyle/>
+          <a:p>
+            <a:fld id="{0DF56419-AC34-45D0-BAB8-5A4CB1E563BF}" type="slidenum">
+              <a:rPr lang="en-US" smtClean="0"/>
+              <a:t>20</a:t>
+            </a:fld>
+            <a:endParaRPr lang="en-US"/>
+          </a:p>
+        </p:txBody>
+      </p:sp>
+    </p:spTree>
+    <p:extLst>
+      <p:ext uri="{BB962C8B-B14F-4D97-AF65-F5344CB8AC3E}">
+        <p14:creationId xmlns:p14="http://schemas.microsoft.com/office/powerpoint/2010/main" val="2104542335"/>
       </p:ext>
     </p:extLst>
   </p:cSld>
@@ -4487,6 +4874,97 @@
           <a:p>
             <a:r>
               <a:rPr lang="nl-BE" dirty="0" err="1" smtClean="0"/>
+              <a:t>RequireJS</a:t>
+            </a:r>
+            <a:r>
+              <a:rPr lang="nl-BE" dirty="0" smtClean="0"/>
+              <a:t>: </a:t>
+            </a:r>
+            <a:r>
+              <a:rPr lang="nl-BE" dirty="0" err="1" smtClean="0"/>
+              <a:t>configuration</a:t>
+            </a:r>
+            <a:endParaRPr lang="en-US" dirty="0"/>
+          </a:p>
+        </p:txBody>
+      </p:sp>
+      <p:sp>
+        <p:nvSpPr>
+          <p:cNvPr id="3" name="Content Placeholder 2"/>
+          <p:cNvSpPr>
+            <a:spLocks noGrp="1"/>
+          </p:cNvSpPr>
+          <p:nvPr>
+            <p:ph idx="1"/>
+          </p:nvPr>
+        </p:nvSpPr>
+        <p:spPr/>
+        <p:txBody>
+          <a:bodyPr/>
+          <a:lstStyle/>
+          <a:p>
+            <a:r>
+              <a:rPr lang="nl-BE" dirty="0" err="1" smtClean="0"/>
+              <a:t>Paths</a:t>
+            </a:r>
+            <a:endParaRPr lang="nl-BE" dirty="0" smtClean="0"/>
+          </a:p>
+          <a:p>
+            <a:r>
+              <a:rPr lang="nl-BE" dirty="0" err="1" smtClean="0"/>
+              <a:t>Shims</a:t>
+            </a:r>
+            <a:endParaRPr lang="en-US" dirty="0"/>
+          </a:p>
+        </p:txBody>
+      </p:sp>
+    </p:spTree>
+    <p:extLst>
+      <p:ext uri="{BB962C8B-B14F-4D97-AF65-F5344CB8AC3E}">
+        <p14:creationId xmlns:p14="http://schemas.microsoft.com/office/powerpoint/2010/main" val="260793513"/>
+      </p:ext>
+    </p:extLst>
+  </p:cSld>
+  <p:clrMapOvr>
+    <a:masterClrMapping/>
+  </p:clrMapOvr>
+</p:sld>
+</file>
+
+<file path=ppt/slides/slide11.xml><?xml version="1.0" encoding="utf-8"?>
+<p:sld xmlns:a="http://schemas.openxmlformats.org/drawingml/2006/main" xmlns:r="http://schemas.openxmlformats.org/officeDocument/2006/relationships" xmlns:p="http://schemas.openxmlformats.org/presentationml/2006/main">
+  <p:cSld>
+    <p:spTree>
+      <p:nvGrpSpPr>
+        <p:cNvPr id="1" name=""/>
+        <p:cNvGrpSpPr/>
+        <p:nvPr/>
+      </p:nvGrpSpPr>
+      <p:grpSpPr>
+        <a:xfrm>
+          <a:off x="0" y="0"/>
+          <a:ext cx="0" cy="0"/>
+          <a:chOff x="0" y="0"/>
+          <a:chExt cx="0" cy="0"/>
+        </a:xfrm>
+      </p:grpSpPr>
+      <p:sp>
+        <p:nvSpPr>
+          <p:cNvPr id="2" name="Title 1"/>
+          <p:cNvSpPr>
+            <a:spLocks noGrp="1"/>
+          </p:cNvSpPr>
+          <p:nvPr>
+            <p:ph type="title"/>
+          </p:nvPr>
+        </p:nvSpPr>
+        <p:spPr/>
+        <p:txBody>
+          <a:bodyPr/>
+          <a:lstStyle/>
+          <a:p>
+            <a:r>
+              <a:rPr lang="nl-BE" dirty="0" err="1" smtClean="0"/>
               <a:t>Knockout</a:t>
             </a:r>
             <a:endParaRPr lang="en-US" dirty="0"/>
@@ -4525,7 +5003,7 @@
 </p:sld>
 </file>
 
-<file path=ppt/slides/slide11.xml><?xml version="1.0" encoding="utf-8"?>
+<file path=ppt/slides/slide12.xml><?xml version="1.0" encoding="utf-8"?>
 <p:sld xmlns:a="http://schemas.openxmlformats.org/drawingml/2006/main" xmlns:r="http://schemas.openxmlformats.org/officeDocument/2006/relationships" xmlns:p="http://schemas.openxmlformats.org/presentationml/2006/main">
   <p:cSld>
     <p:spTree>
@@ -4962,7 +5440,7 @@
 </p:sld>
 </file>
 
-<file path=ppt/slides/slide12.xml><?xml version="1.0" encoding="utf-8"?>
+<file path=ppt/slides/slide13.xml><?xml version="1.0" encoding="utf-8"?>
 <p:sld xmlns:a="http://schemas.openxmlformats.org/drawingml/2006/main" xmlns:r="http://schemas.openxmlformats.org/officeDocument/2006/relationships" xmlns:p="http://schemas.openxmlformats.org/presentationml/2006/main">
   <p:cSld>
     <p:spTree>
@@ -5136,7 +5614,7 @@
 </p:sld>
 </file>
 
-<file path=ppt/slides/slide13.xml><?xml version="1.0" encoding="utf-8"?>
+<file path=ppt/slides/slide14.xml><?xml version="1.0" encoding="utf-8"?>
 <p:sld xmlns:a="http://schemas.openxmlformats.org/drawingml/2006/main" xmlns:r="http://schemas.openxmlformats.org/officeDocument/2006/relationships" xmlns:p="http://schemas.openxmlformats.org/presentationml/2006/main">
   <p:cSld>
     <p:spTree>
@@ -5291,7 +5769,7 @@
 </p:sld>
 </file>
 
-<file path=ppt/slides/slide14.xml><?xml version="1.0" encoding="utf-8"?>
+<file path=ppt/slides/slide15.xml><?xml version="1.0" encoding="utf-8"?>
 <p:sld xmlns:a="http://schemas.openxmlformats.org/drawingml/2006/main" xmlns:r="http://schemas.openxmlformats.org/officeDocument/2006/relationships" xmlns:p="http://schemas.openxmlformats.org/presentationml/2006/main">
   <p:cSld>
     <p:spTree>
@@ -5428,7 +5906,7 @@
 </p:sld>
 </file>
 
-<file path=ppt/slides/slide15.xml><?xml version="1.0" encoding="utf-8"?>
+<file path=ppt/slides/slide16.xml><?xml version="1.0" encoding="utf-8"?>
 <p:sld xmlns:a="http://schemas.openxmlformats.org/drawingml/2006/main" xmlns:r="http://schemas.openxmlformats.org/officeDocument/2006/relationships" xmlns:p="http://schemas.openxmlformats.org/presentationml/2006/main">
   <p:cSld>
     <p:spTree>
@@ -5515,7 +5993,7 @@
 </p:sld>
 </file>
 
-<file path=ppt/slides/slide16.xml><?xml version="1.0" encoding="utf-8"?>
+<file path=ppt/slides/slide17.xml><?xml version="1.0" encoding="utf-8"?>
 <p:sld xmlns:a="http://schemas.openxmlformats.org/drawingml/2006/main" xmlns:r="http://schemas.openxmlformats.org/officeDocument/2006/relationships" xmlns:p="http://schemas.openxmlformats.org/presentationml/2006/main">
   <p:cSld>
     <p:spTree>
@@ -5626,7 +6104,7 @@
 </p:sld>
 </file>
 
-<file path=ppt/slides/slide17.xml><?xml version="1.0" encoding="utf-8"?>
+<file path=ppt/slides/slide18.xml><?xml version="1.0" encoding="utf-8"?>
 <p:sld xmlns:a="http://schemas.openxmlformats.org/drawingml/2006/main" xmlns:r="http://schemas.openxmlformats.org/officeDocument/2006/relationships" xmlns:p="http://schemas.openxmlformats.org/presentationml/2006/main">
   <p:cSld>
     <p:spTree>
@@ -5910,7 +6388,7 @@
 </p:sld>
 </file>
 
-<file path=ppt/slides/slide18.xml><?xml version="1.0" encoding="utf-8"?>
+<file path=ppt/slides/slide19.xml><?xml version="1.0" encoding="utf-8"?>
 <p:sld xmlns:a="http://schemas.openxmlformats.org/drawingml/2006/main" xmlns:r="http://schemas.openxmlformats.org/officeDocument/2006/relationships" xmlns:p="http://schemas.openxmlformats.org/presentationml/2006/main">
   <p:cSld>
     <p:spTree>
@@ -5958,25 +6436,32 @@
           </a:p>
         </p:txBody>
       </p:sp>
-      <p:sp>
-        <p:nvSpPr>
-          <p:cNvPr id="3" name="Content Placeholder 2"/>
-          <p:cNvSpPr>
-            <a:spLocks noGrp="1"/>
-          </p:cNvSpPr>
+      <p:pic>
+        <p:nvPicPr>
+          <p:cNvPr id="4" name="Content Placeholder 3"/>
+          <p:cNvPicPr>
+            <a:picLocks noGrp="1" noChangeAspect="1"/>
+          </p:cNvPicPr>
           <p:nvPr>
             <p:ph idx="1"/>
           </p:nvPr>
-        </p:nvSpPr>
-        <p:spPr/>
-        <p:txBody>
-          <a:bodyPr/>
-          <a:lstStyle/>
-          <a:p>
-            <a:endParaRPr lang="en-US"/>
-          </a:p>
-        </p:txBody>
-      </p:sp>
+        </p:nvPicPr>
+        <p:blipFill>
+          <a:blip r:embed="rId2"/>
+          <a:stretch>
+            <a:fillRect/>
+          </a:stretch>
+        </p:blipFill>
+        <p:spPr>
+          <a:xfrm>
+            <a:off x="838200" y="1690688"/>
+            <a:ext cx="8905738" cy="4351338"/>
+          </a:xfrm>
+          <a:prstGeom prst="rect">
+            <a:avLst/>
+          </a:prstGeom>
+        </p:spPr>
+      </p:pic>
     </p:spTree>
     <p:extLst>
       <p:ext uri="{BB962C8B-B14F-4D97-AF65-F5344CB8AC3E}">
@@ -6063,6 +6548,641 @@
     <p:extLst>
       <p:ext uri="{BB962C8B-B14F-4D97-AF65-F5344CB8AC3E}">
         <p14:creationId xmlns:p14="http://schemas.microsoft.com/office/powerpoint/2010/main" val="545992484"/>
+      </p:ext>
+    </p:extLst>
+  </p:cSld>
+  <p:clrMapOvr>
+    <a:masterClrMapping/>
+  </p:clrMapOvr>
+</p:sld>
+</file>
+
+<file path=ppt/slides/slide20.xml><?xml version="1.0" encoding="utf-8"?>
+<p:sld xmlns:a="http://schemas.openxmlformats.org/drawingml/2006/main" xmlns:r="http://schemas.openxmlformats.org/officeDocument/2006/relationships" xmlns:p="http://schemas.openxmlformats.org/presentationml/2006/main">
+  <p:cSld>
+    <p:spTree>
+      <p:nvGrpSpPr>
+        <p:cNvPr id="1" name=""/>
+        <p:cNvGrpSpPr/>
+        <p:nvPr/>
+      </p:nvGrpSpPr>
+      <p:grpSpPr>
+        <a:xfrm>
+          <a:off x="0" y="0"/>
+          <a:ext cx="0" cy="0"/>
+          <a:chOff x="0" y="0"/>
+          <a:chExt cx="0" cy="0"/>
+        </a:xfrm>
+      </p:grpSpPr>
+      <p:sp>
+        <p:nvSpPr>
+          <p:cNvPr id="2" name="Title 1"/>
+          <p:cNvSpPr>
+            <a:spLocks noGrp="1"/>
+          </p:cNvSpPr>
+          <p:nvPr>
+            <p:ph type="title"/>
+          </p:nvPr>
+        </p:nvSpPr>
+        <p:spPr/>
+        <p:txBody>
+          <a:bodyPr/>
+          <a:lstStyle/>
+          <a:p>
+            <a:r>
+              <a:rPr lang="nl-BE" dirty="0" err="1" smtClean="0"/>
+              <a:t>Knockout</a:t>
+            </a:r>
+            <a:r>
+              <a:rPr lang="nl-BE" dirty="0" smtClean="0"/>
+              <a:t>: data</a:t>
+            </a:r>
+            <a:endParaRPr lang="en-US" dirty="0"/>
+          </a:p>
+        </p:txBody>
+      </p:sp>
+      <p:sp>
+        <p:nvSpPr>
+          <p:cNvPr id="3" name="Content Placeholder 2"/>
+          <p:cNvSpPr>
+            <a:spLocks noGrp="1"/>
+          </p:cNvSpPr>
+          <p:nvPr>
+            <p:ph idx="1"/>
+          </p:nvPr>
+        </p:nvSpPr>
+        <p:spPr/>
+        <p:txBody>
+          <a:bodyPr/>
+          <a:lstStyle/>
+          <a:p>
+            <a:r>
+              <a:rPr lang="nl-BE" dirty="0" err="1" smtClean="0"/>
+              <a:t>ko.toJS</a:t>
+            </a:r>
+            <a:r>
+              <a:rPr lang="nl-BE" dirty="0" smtClean="0"/>
+              <a:t>(</a:t>
+            </a:r>
+            <a:r>
+              <a:rPr lang="nl-BE" dirty="0" err="1" smtClean="0"/>
+              <a:t>viewModel</a:t>
+            </a:r>
+            <a:r>
+              <a:rPr lang="nl-BE" dirty="0" smtClean="0"/>
+              <a:t>)</a:t>
+            </a:r>
+          </a:p>
+          <a:p>
+            <a:r>
+              <a:rPr lang="nl-BE" dirty="0" err="1" smtClean="0"/>
+              <a:t>ko.toJSON</a:t>
+            </a:r>
+            <a:r>
+              <a:rPr lang="nl-BE" dirty="0" smtClean="0"/>
+              <a:t>(</a:t>
+            </a:r>
+            <a:r>
+              <a:rPr lang="nl-BE" dirty="0" err="1" smtClean="0"/>
+              <a:t>viewModel</a:t>
+            </a:r>
+            <a:r>
+              <a:rPr lang="nl-BE" dirty="0" smtClean="0"/>
+              <a:t>)</a:t>
+            </a:r>
+          </a:p>
+          <a:p>
+            <a:endParaRPr lang="nl-BE" dirty="0"/>
+          </a:p>
+          <a:p>
+            <a:r>
+              <a:rPr lang="nl-BE" dirty="0" err="1" smtClean="0"/>
+              <a:t>Knockout</a:t>
+            </a:r>
+            <a:r>
+              <a:rPr lang="nl-BE" dirty="0" smtClean="0"/>
+              <a:t> </a:t>
+            </a:r>
+            <a:r>
+              <a:rPr lang="nl-BE" dirty="0" err="1" smtClean="0"/>
+              <a:t>mapping</a:t>
+            </a:r>
+            <a:r>
+              <a:rPr lang="nl-BE" dirty="0" smtClean="0"/>
+              <a:t> </a:t>
+            </a:r>
+            <a:r>
+              <a:rPr lang="nl-BE" dirty="0" err="1" smtClean="0"/>
+              <a:t>plugin</a:t>
+            </a:r>
+            <a:r>
+              <a:rPr lang="nl-BE" dirty="0" smtClean="0"/>
+              <a:t>:</a:t>
+            </a:r>
+          </a:p>
+          <a:p>
+            <a:pPr lvl="1"/>
+            <a:r>
+              <a:rPr lang="nl-BE" dirty="0" err="1" smtClean="0"/>
+              <a:t>ko.mapping.fromJS</a:t>
+            </a:r>
+            <a:endParaRPr lang="nl-BE" dirty="0" smtClean="0"/>
+          </a:p>
+          <a:p>
+            <a:pPr lvl="1"/>
+            <a:r>
+              <a:rPr lang="nl-BE" dirty="0" err="1" smtClean="0"/>
+              <a:t>ko.mapping.updateFromJS</a:t>
+            </a:r>
+            <a:endParaRPr lang="nl-BE" dirty="0" smtClean="0"/>
+          </a:p>
+          <a:p>
+            <a:pPr lvl="1"/>
+            <a:r>
+              <a:rPr lang="nl-BE" dirty="0" err="1" smtClean="0"/>
+              <a:t>ko.mapping.toJS</a:t>
+            </a:r>
+            <a:endParaRPr lang="nl-BE" dirty="0" smtClean="0"/>
+          </a:p>
+          <a:p>
+            <a:pPr lvl="1"/>
+            <a:r>
+              <a:rPr lang="nl-BE" dirty="0" err="1" smtClean="0"/>
+              <a:t>ko.mapping.toJSON</a:t>
+            </a:r>
+            <a:endParaRPr lang="nl-BE" dirty="0" smtClean="0"/>
+          </a:p>
+          <a:p>
+            <a:pPr lvl="1"/>
+            <a:r>
+              <a:rPr lang="nl-BE" dirty="0" err="1" smtClean="0"/>
+              <a:t>ko.mapping.fromJSON</a:t>
+            </a:r>
+            <a:endParaRPr lang="en-US" dirty="0"/>
+          </a:p>
+        </p:txBody>
+      </p:sp>
+    </p:spTree>
+    <p:extLst>
+      <p:ext uri="{BB962C8B-B14F-4D97-AF65-F5344CB8AC3E}">
+        <p14:creationId xmlns:p14="http://schemas.microsoft.com/office/powerpoint/2010/main" val="3755241706"/>
+      </p:ext>
+    </p:extLst>
+  </p:cSld>
+  <p:clrMapOvr>
+    <a:masterClrMapping/>
+  </p:clrMapOvr>
+</p:sld>
+</file>
+
+<file path=ppt/slides/slide21.xml><?xml version="1.0" encoding="utf-8"?>
+<p:sld xmlns:a="http://schemas.openxmlformats.org/drawingml/2006/main" xmlns:r="http://schemas.openxmlformats.org/officeDocument/2006/relationships" xmlns:p="http://schemas.openxmlformats.org/presentationml/2006/main">
+  <p:cSld>
+    <p:spTree>
+      <p:nvGrpSpPr>
+        <p:cNvPr id="1" name=""/>
+        <p:cNvGrpSpPr/>
+        <p:nvPr/>
+      </p:nvGrpSpPr>
+      <p:grpSpPr>
+        <a:xfrm>
+          <a:off x="0" y="0"/>
+          <a:ext cx="0" cy="0"/>
+          <a:chOff x="0" y="0"/>
+          <a:chExt cx="0" cy="0"/>
+        </a:xfrm>
+      </p:grpSpPr>
+      <p:sp>
+        <p:nvSpPr>
+          <p:cNvPr id="2" name="Title 1"/>
+          <p:cNvSpPr>
+            <a:spLocks noGrp="1"/>
+          </p:cNvSpPr>
+          <p:nvPr>
+            <p:ph type="title"/>
+          </p:nvPr>
+        </p:nvSpPr>
+        <p:spPr/>
+        <p:txBody>
+          <a:bodyPr/>
+          <a:lstStyle/>
+          <a:p>
+            <a:r>
+              <a:rPr lang="nl-BE" dirty="0" err="1" smtClean="0"/>
+              <a:t>Durandal</a:t>
+            </a:r>
+            <a:endParaRPr lang="en-US" dirty="0"/>
+          </a:p>
+        </p:txBody>
+      </p:sp>
+      <p:sp>
+        <p:nvSpPr>
+          <p:cNvPr id="3" name="Content Placeholder 2"/>
+          <p:cNvSpPr>
+            <a:spLocks noGrp="1"/>
+          </p:cNvSpPr>
+          <p:nvPr>
+            <p:ph idx="1"/>
+          </p:nvPr>
+        </p:nvSpPr>
+        <p:spPr/>
+        <p:txBody>
+          <a:bodyPr/>
+          <a:lstStyle/>
+          <a:p>
+            <a:r>
+              <a:rPr lang="nl-BE" dirty="0" err="1" smtClean="0"/>
+              <a:t>Finally</a:t>
+            </a:r>
+            <a:r>
+              <a:rPr lang="nl-BE" dirty="0" smtClean="0"/>
+              <a:t>!</a:t>
+            </a:r>
+            <a:endParaRPr lang="en-US" dirty="0"/>
+          </a:p>
+        </p:txBody>
+      </p:sp>
+    </p:spTree>
+    <p:extLst>
+      <p:ext uri="{BB962C8B-B14F-4D97-AF65-F5344CB8AC3E}">
+        <p14:creationId xmlns:p14="http://schemas.microsoft.com/office/powerpoint/2010/main" val="3685310628"/>
+      </p:ext>
+    </p:extLst>
+  </p:cSld>
+  <p:clrMapOvr>
+    <a:masterClrMapping/>
+  </p:clrMapOvr>
+</p:sld>
+</file>
+
+<file path=ppt/slides/slide22.xml><?xml version="1.0" encoding="utf-8"?>
+<p:sld xmlns:a="http://schemas.openxmlformats.org/drawingml/2006/main" xmlns:r="http://schemas.openxmlformats.org/officeDocument/2006/relationships" xmlns:p="http://schemas.openxmlformats.org/presentationml/2006/main">
+  <p:cSld>
+    <p:spTree>
+      <p:nvGrpSpPr>
+        <p:cNvPr id="1" name=""/>
+        <p:cNvGrpSpPr/>
+        <p:nvPr/>
+      </p:nvGrpSpPr>
+      <p:grpSpPr>
+        <a:xfrm>
+          <a:off x="0" y="0"/>
+          <a:ext cx="0" cy="0"/>
+          <a:chOff x="0" y="0"/>
+          <a:chExt cx="0" cy="0"/>
+        </a:xfrm>
+      </p:grpSpPr>
+      <p:sp>
+        <p:nvSpPr>
+          <p:cNvPr id="2" name="Title 1"/>
+          <p:cNvSpPr>
+            <a:spLocks noGrp="1"/>
+          </p:cNvSpPr>
+          <p:nvPr>
+            <p:ph type="title"/>
+          </p:nvPr>
+        </p:nvSpPr>
+        <p:spPr/>
+        <p:txBody>
+          <a:bodyPr/>
+          <a:lstStyle/>
+          <a:p>
+            <a:r>
+              <a:rPr lang="nl-BE" dirty="0" err="1" smtClean="0"/>
+              <a:t>Durandal</a:t>
+            </a:r>
+            <a:r>
+              <a:rPr lang="nl-BE" dirty="0" smtClean="0"/>
+              <a:t>: modules</a:t>
+            </a:r>
+            <a:endParaRPr lang="en-US" dirty="0"/>
+          </a:p>
+        </p:txBody>
+      </p:sp>
+      <p:sp>
+        <p:nvSpPr>
+          <p:cNvPr id="3" name="Content Placeholder 2"/>
+          <p:cNvSpPr>
+            <a:spLocks noGrp="1"/>
+          </p:cNvSpPr>
+          <p:nvPr>
+            <p:ph idx="1"/>
+          </p:nvPr>
+        </p:nvSpPr>
+        <p:spPr/>
+        <p:txBody>
+          <a:bodyPr/>
+          <a:lstStyle/>
+          <a:p>
+            <a:r>
+              <a:rPr lang="nl-BE" dirty="0" smtClean="0"/>
+              <a:t>AMD modules met </a:t>
+            </a:r>
+            <a:r>
+              <a:rPr lang="nl-BE" dirty="0" err="1" smtClean="0"/>
+              <a:t>RequireJS</a:t>
+            </a:r>
+            <a:endParaRPr lang="nl-BE" dirty="0" smtClean="0"/>
+          </a:p>
+          <a:p>
+            <a:r>
+              <a:rPr lang="nl-BE" dirty="0" smtClean="0"/>
+              <a:t>Iedere module krijgt een eigen </a:t>
+            </a:r>
+            <a:r>
+              <a:rPr lang="nl-BE" dirty="0" err="1" smtClean="0"/>
+              <a:t>id</a:t>
+            </a:r>
+            <a:endParaRPr lang="en-US" dirty="0"/>
+          </a:p>
+        </p:txBody>
+      </p:sp>
+    </p:spTree>
+    <p:extLst>
+      <p:ext uri="{BB962C8B-B14F-4D97-AF65-F5344CB8AC3E}">
+        <p14:creationId xmlns:p14="http://schemas.microsoft.com/office/powerpoint/2010/main" val="1210736706"/>
+      </p:ext>
+    </p:extLst>
+  </p:cSld>
+  <p:clrMapOvr>
+    <a:masterClrMapping/>
+  </p:clrMapOvr>
+</p:sld>
+</file>
+
+<file path=ppt/slides/slide23.xml><?xml version="1.0" encoding="utf-8"?>
+<p:sld xmlns:a="http://schemas.openxmlformats.org/drawingml/2006/main" xmlns:r="http://schemas.openxmlformats.org/officeDocument/2006/relationships" xmlns:p="http://schemas.openxmlformats.org/presentationml/2006/main">
+  <p:cSld>
+    <p:spTree>
+      <p:nvGrpSpPr>
+        <p:cNvPr id="1" name=""/>
+        <p:cNvGrpSpPr/>
+        <p:nvPr/>
+      </p:nvGrpSpPr>
+      <p:grpSpPr>
+        <a:xfrm>
+          <a:off x="0" y="0"/>
+          <a:ext cx="0" cy="0"/>
+          <a:chOff x="0" y="0"/>
+          <a:chExt cx="0" cy="0"/>
+        </a:xfrm>
+      </p:grpSpPr>
+      <p:sp>
+        <p:nvSpPr>
+          <p:cNvPr id="2" name="Title 1"/>
+          <p:cNvSpPr>
+            <a:spLocks noGrp="1"/>
+          </p:cNvSpPr>
+          <p:nvPr>
+            <p:ph type="title"/>
+          </p:nvPr>
+        </p:nvSpPr>
+        <p:spPr/>
+        <p:txBody>
+          <a:bodyPr/>
+          <a:lstStyle/>
+          <a:p>
+            <a:r>
+              <a:rPr lang="nl-BE" dirty="0" err="1" smtClean="0"/>
+              <a:t>Durandal</a:t>
+            </a:r>
+            <a:r>
+              <a:rPr lang="nl-BE" dirty="0" smtClean="0"/>
+              <a:t>: views</a:t>
+            </a:r>
+            <a:endParaRPr lang="en-US" dirty="0"/>
+          </a:p>
+        </p:txBody>
+      </p:sp>
+      <p:sp>
+        <p:nvSpPr>
+          <p:cNvPr id="3" name="Content Placeholder 2"/>
+          <p:cNvSpPr>
+            <a:spLocks noGrp="1"/>
+          </p:cNvSpPr>
+          <p:nvPr>
+            <p:ph idx="1"/>
+          </p:nvPr>
+        </p:nvSpPr>
+        <p:spPr/>
+        <p:txBody>
+          <a:bodyPr/>
+          <a:lstStyle/>
+          <a:p>
+            <a:r>
+              <a:rPr lang="nl-BE" dirty="0" smtClean="0"/>
+              <a:t>Gewoon html bestand</a:t>
+            </a:r>
+          </a:p>
+          <a:p>
+            <a:r>
+              <a:rPr lang="nl-BE" dirty="0" smtClean="0"/>
+              <a:t>Slechts 1 root element</a:t>
+            </a:r>
+          </a:p>
+          <a:p>
+            <a:r>
+              <a:rPr lang="nl-BE" dirty="0" smtClean="0"/>
+              <a:t>Databinding (</a:t>
+            </a:r>
+            <a:r>
+              <a:rPr lang="nl-BE" dirty="0" err="1" smtClean="0"/>
+              <a:t>Knockout</a:t>
+            </a:r>
+            <a:r>
+              <a:rPr lang="nl-BE" dirty="0" smtClean="0"/>
+              <a:t>!) verbindt view met module</a:t>
+            </a:r>
+            <a:endParaRPr lang="en-US" dirty="0"/>
+          </a:p>
+        </p:txBody>
+      </p:sp>
+    </p:spTree>
+    <p:extLst>
+      <p:ext uri="{BB962C8B-B14F-4D97-AF65-F5344CB8AC3E}">
+        <p14:creationId xmlns:p14="http://schemas.microsoft.com/office/powerpoint/2010/main" val="1784123812"/>
+      </p:ext>
+    </p:extLst>
+  </p:cSld>
+  <p:clrMapOvr>
+    <a:masterClrMapping/>
+  </p:clrMapOvr>
+</p:sld>
+</file>
+
+<file path=ppt/slides/slide24.xml><?xml version="1.0" encoding="utf-8"?>
+<p:sld xmlns:a="http://schemas.openxmlformats.org/drawingml/2006/main" xmlns:r="http://schemas.openxmlformats.org/officeDocument/2006/relationships" xmlns:p="http://schemas.openxmlformats.org/presentationml/2006/main">
+  <p:cSld>
+    <p:spTree>
+      <p:nvGrpSpPr>
+        <p:cNvPr id="1" name=""/>
+        <p:cNvGrpSpPr/>
+        <p:nvPr/>
+      </p:nvGrpSpPr>
+      <p:grpSpPr>
+        <a:xfrm>
+          <a:off x="0" y="0"/>
+          <a:ext cx="0" cy="0"/>
+          <a:chOff x="0" y="0"/>
+          <a:chExt cx="0" cy="0"/>
+        </a:xfrm>
+      </p:grpSpPr>
+      <p:sp>
+        <p:nvSpPr>
+          <p:cNvPr id="2" name="Title 1"/>
+          <p:cNvSpPr>
+            <a:spLocks noGrp="1"/>
+          </p:cNvSpPr>
+          <p:nvPr>
+            <p:ph type="title"/>
+          </p:nvPr>
+        </p:nvSpPr>
+        <p:spPr/>
+        <p:txBody>
+          <a:bodyPr/>
+          <a:lstStyle/>
+          <a:p>
+            <a:r>
+              <a:rPr lang="nl-BE" dirty="0" err="1" smtClean="0"/>
+              <a:t>Durandal</a:t>
+            </a:r>
+            <a:r>
+              <a:rPr lang="nl-BE" dirty="0" smtClean="0"/>
+              <a:t>: views en </a:t>
+            </a:r>
+            <a:r>
+              <a:rPr lang="nl-BE" dirty="0" err="1" smtClean="0"/>
+              <a:t>viewmodels</a:t>
+            </a:r>
+            <a:endParaRPr lang="en-US" dirty="0"/>
+          </a:p>
+        </p:txBody>
+      </p:sp>
+      <p:sp>
+        <p:nvSpPr>
+          <p:cNvPr id="3" name="Content Placeholder 2"/>
+          <p:cNvSpPr>
+            <a:spLocks noGrp="1"/>
+          </p:cNvSpPr>
+          <p:nvPr>
+            <p:ph idx="1"/>
+          </p:nvPr>
+        </p:nvSpPr>
+        <p:spPr/>
+        <p:txBody>
+          <a:bodyPr/>
+          <a:lstStyle/>
+          <a:p>
+            <a:r>
+              <a:rPr lang="nl-BE" dirty="0" err="1" smtClean="0"/>
+              <a:t>Convention</a:t>
+            </a:r>
+            <a:r>
+              <a:rPr lang="nl-BE" dirty="0" smtClean="0"/>
+              <a:t>:</a:t>
+            </a:r>
+          </a:p>
+          <a:p>
+            <a:pPr lvl="1"/>
+            <a:r>
+              <a:rPr lang="nl-BE" dirty="0" smtClean="0"/>
+              <a:t>customerList.js</a:t>
+            </a:r>
+          </a:p>
+          <a:p>
+            <a:pPr lvl="1"/>
+            <a:r>
+              <a:rPr lang="nl-BE" dirty="0" smtClean="0"/>
+              <a:t>customerList.html</a:t>
+            </a:r>
+            <a:endParaRPr lang="en-US" dirty="0"/>
+          </a:p>
+        </p:txBody>
+      </p:sp>
+    </p:spTree>
+    <p:extLst>
+      <p:ext uri="{BB962C8B-B14F-4D97-AF65-F5344CB8AC3E}">
+        <p14:creationId xmlns:p14="http://schemas.microsoft.com/office/powerpoint/2010/main" val="1783479636"/>
+      </p:ext>
+    </p:extLst>
+  </p:cSld>
+  <p:clrMapOvr>
+    <a:masterClrMapping/>
+  </p:clrMapOvr>
+</p:sld>
+</file>
+
+<file path=ppt/slides/slide25.xml><?xml version="1.0" encoding="utf-8"?>
+<p:sld xmlns:a="http://schemas.openxmlformats.org/drawingml/2006/main" xmlns:r="http://schemas.openxmlformats.org/officeDocument/2006/relationships" xmlns:p="http://schemas.openxmlformats.org/presentationml/2006/main">
+  <p:cSld>
+    <p:spTree>
+      <p:nvGrpSpPr>
+        <p:cNvPr id="1" name=""/>
+        <p:cNvGrpSpPr/>
+        <p:nvPr/>
+      </p:nvGrpSpPr>
+      <p:grpSpPr>
+        <a:xfrm>
+          <a:off x="0" y="0"/>
+          <a:ext cx="0" cy="0"/>
+          <a:chOff x="0" y="0"/>
+          <a:chExt cx="0" cy="0"/>
+        </a:xfrm>
+      </p:grpSpPr>
+      <p:sp>
+        <p:nvSpPr>
+          <p:cNvPr id="2" name="Title 1"/>
+          <p:cNvSpPr>
+            <a:spLocks noGrp="1"/>
+          </p:cNvSpPr>
+          <p:nvPr>
+            <p:ph type="title"/>
+          </p:nvPr>
+        </p:nvSpPr>
+        <p:spPr/>
+        <p:txBody>
+          <a:bodyPr/>
+          <a:lstStyle/>
+          <a:p>
+            <a:r>
+              <a:rPr lang="nl-BE" dirty="0" err="1" smtClean="0"/>
+              <a:t>Durandal</a:t>
+            </a:r>
+            <a:r>
+              <a:rPr lang="nl-BE" dirty="0" smtClean="0"/>
+              <a:t>: </a:t>
+            </a:r>
+            <a:r>
+              <a:rPr lang="nl-BE" smtClean="0"/>
+              <a:t>composition</a:t>
+            </a:r>
+            <a:endParaRPr lang="en-US" dirty="0"/>
+          </a:p>
+        </p:txBody>
+      </p:sp>
+      <p:sp>
+        <p:nvSpPr>
+          <p:cNvPr id="3" name="Content Placeholder 2"/>
+          <p:cNvSpPr>
+            <a:spLocks noGrp="1"/>
+          </p:cNvSpPr>
+          <p:nvPr>
+            <p:ph idx="1"/>
+          </p:nvPr>
+        </p:nvSpPr>
+        <p:spPr/>
+        <p:txBody>
+          <a:bodyPr/>
+          <a:lstStyle/>
+          <a:p>
+            <a:endParaRPr lang="en-US"/>
+          </a:p>
+        </p:txBody>
+      </p:sp>
+    </p:spTree>
+    <p:extLst>
+      <p:ext uri="{BB962C8B-B14F-4D97-AF65-F5344CB8AC3E}">
+        <p14:creationId xmlns:p14="http://schemas.microsoft.com/office/powerpoint/2010/main" val="38311739"/>
       </p:ext>
     </p:extLst>
   </p:cSld>

</xml_diff>

<commit_message>
unknown route page; ppt update on dialogs, router
</commit_message>
<xml_diff>
--- a/Durandal T4T.pptx
+++ b/Durandal T4T.pptx
@@ -5,7 +5,7 @@
     <p:sldMasterId id="2147483648" r:id="rId1"/>
   </p:sldMasterIdLst>
   <p:notesMasterIdLst>
-    <p:notesMasterId r:id="rId32"/>
+    <p:notesMasterId r:id="rId35"/>
   </p:notesMasterIdLst>
   <p:sldIdLst>
     <p:sldId id="256" r:id="rId2"/>
@@ -38,6 +38,9 @@
     <p:sldId id="283" r:id="rId29"/>
     <p:sldId id="284" r:id="rId30"/>
     <p:sldId id="285" r:id="rId31"/>
+    <p:sldId id="287" r:id="rId32"/>
+    <p:sldId id="288" r:id="rId33"/>
+    <p:sldId id="286" r:id="rId34"/>
   </p:sldIdLst>
   <p:sldSz cx="12192000" cy="6858000"/>
   <p:notesSz cx="6858000" cy="9144000"/>
@@ -1510,6 +1513,669 @@
     <p:extLst>
       <p:ext uri="{BB962C8B-B14F-4D97-AF65-F5344CB8AC3E}">
         <p14:creationId xmlns:p14="http://schemas.microsoft.com/office/powerpoint/2010/main" val="1213175449"/>
+      </p:ext>
+    </p:extLst>
+  </p:cSld>
+  <p:clrMapOvr>
+    <a:masterClrMapping/>
+  </p:clrMapOvr>
+</p:notes>
+</file>
+
+<file path=ppt/notesSlides/notesSlide16.xml><?xml version="1.0" encoding="utf-8"?>
+<p:notes xmlns:a="http://schemas.openxmlformats.org/drawingml/2006/main" xmlns:r="http://schemas.openxmlformats.org/officeDocument/2006/relationships" xmlns:p="http://schemas.openxmlformats.org/presentationml/2006/main">
+  <p:cSld>
+    <p:spTree>
+      <p:nvGrpSpPr>
+        <p:cNvPr id="1" name=""/>
+        <p:cNvGrpSpPr/>
+        <p:nvPr/>
+      </p:nvGrpSpPr>
+      <p:grpSpPr>
+        <a:xfrm>
+          <a:off x="0" y="0"/>
+          <a:ext cx="0" cy="0"/>
+          <a:chOff x="0" y="0"/>
+          <a:chExt cx="0" cy="0"/>
+        </a:xfrm>
+      </p:grpSpPr>
+      <p:sp>
+        <p:nvSpPr>
+          <p:cNvPr id="2" name="Slide Image Placeholder 1"/>
+          <p:cNvSpPr>
+            <a:spLocks noGrp="1" noRot="1" noChangeAspect="1"/>
+          </p:cNvSpPr>
+          <p:nvPr>
+            <p:ph type="sldImg"/>
+          </p:nvPr>
+        </p:nvSpPr>
+        <p:spPr/>
+      </p:sp>
+      <p:sp>
+        <p:nvSpPr>
+          <p:cNvPr id="3" name="Notes Placeholder 2"/>
+          <p:cNvSpPr>
+            <a:spLocks noGrp="1"/>
+          </p:cNvSpPr>
+          <p:nvPr>
+            <p:ph type="body" idx="1"/>
+          </p:nvPr>
+        </p:nvSpPr>
+        <p:spPr/>
+        <p:txBody>
+          <a:bodyPr/>
+          <a:lstStyle/>
+          <a:p>
+            <a:r>
+              <a:rPr lang="nl-BE" dirty="0" err="1" smtClean="0"/>
+              <a:t>showMessage</a:t>
+            </a:r>
+            <a:r>
+              <a:rPr lang="nl-BE" dirty="0" smtClean="0"/>
+              <a:t> voorbeeld bij</a:t>
+            </a:r>
+            <a:r>
+              <a:rPr lang="nl-BE" baseline="0" dirty="0" smtClean="0"/>
+              <a:t> verwijderen van een bier</a:t>
+            </a:r>
+          </a:p>
+          <a:p>
+            <a:r>
+              <a:rPr lang="nl-BE" baseline="0" dirty="0" smtClean="0"/>
+              <a:t>Ook mogelijk om je eigen </a:t>
+            </a:r>
+            <a:r>
+              <a:rPr lang="nl-BE" baseline="0" dirty="0" err="1" smtClean="0"/>
+              <a:t>dialog</a:t>
+            </a:r>
+            <a:r>
+              <a:rPr lang="nl-BE" baseline="0" dirty="0" smtClean="0"/>
+              <a:t> te ontwerpen voor </a:t>
+            </a:r>
+            <a:r>
+              <a:rPr lang="nl-BE" baseline="0" dirty="0" err="1" smtClean="0"/>
+              <a:t>showDialog</a:t>
+            </a:r>
+            <a:r>
+              <a:rPr lang="nl-BE" baseline="0" dirty="0" smtClean="0"/>
+              <a:t>, zie search</a:t>
+            </a:r>
+          </a:p>
+        </p:txBody>
+      </p:sp>
+      <p:sp>
+        <p:nvSpPr>
+          <p:cNvPr id="4" name="Slide Number Placeholder 3"/>
+          <p:cNvSpPr>
+            <a:spLocks noGrp="1"/>
+          </p:cNvSpPr>
+          <p:nvPr>
+            <p:ph type="sldNum" sz="quarter" idx="10"/>
+          </p:nvPr>
+        </p:nvSpPr>
+        <p:spPr/>
+        <p:txBody>
+          <a:bodyPr/>
+          <a:lstStyle/>
+          <a:p>
+            <a:fld id="{0DF56419-AC34-45D0-BAB8-5A4CB1E563BF}" type="slidenum">
+              <a:rPr lang="en-US" smtClean="0"/>
+              <a:t>29</a:t>
+            </a:fld>
+            <a:endParaRPr lang="en-US"/>
+          </a:p>
+        </p:txBody>
+      </p:sp>
+    </p:spTree>
+    <p:extLst>
+      <p:ext uri="{BB962C8B-B14F-4D97-AF65-F5344CB8AC3E}">
+        <p14:creationId xmlns:p14="http://schemas.microsoft.com/office/powerpoint/2010/main" val="3055863286"/>
+      </p:ext>
+    </p:extLst>
+  </p:cSld>
+  <p:clrMapOvr>
+    <a:masterClrMapping/>
+  </p:clrMapOvr>
+</p:notes>
+</file>
+
+<file path=ppt/notesSlides/notesSlide17.xml><?xml version="1.0" encoding="utf-8"?>
+<p:notes xmlns:a="http://schemas.openxmlformats.org/drawingml/2006/main" xmlns:r="http://schemas.openxmlformats.org/officeDocument/2006/relationships" xmlns:p="http://schemas.openxmlformats.org/presentationml/2006/main">
+  <p:cSld>
+    <p:spTree>
+      <p:nvGrpSpPr>
+        <p:cNvPr id="1" name=""/>
+        <p:cNvGrpSpPr/>
+        <p:nvPr/>
+      </p:nvGrpSpPr>
+      <p:grpSpPr>
+        <a:xfrm>
+          <a:off x="0" y="0"/>
+          <a:ext cx="0" cy="0"/>
+          <a:chOff x="0" y="0"/>
+          <a:chExt cx="0" cy="0"/>
+        </a:xfrm>
+      </p:grpSpPr>
+      <p:sp>
+        <p:nvSpPr>
+          <p:cNvPr id="2" name="Slide Image Placeholder 1"/>
+          <p:cNvSpPr>
+            <a:spLocks noGrp="1" noRot="1" noChangeAspect="1"/>
+          </p:cNvSpPr>
+          <p:nvPr>
+            <p:ph type="sldImg"/>
+          </p:nvPr>
+        </p:nvSpPr>
+        <p:spPr/>
+      </p:sp>
+      <p:sp>
+        <p:nvSpPr>
+          <p:cNvPr id="3" name="Notes Placeholder 2"/>
+          <p:cNvSpPr>
+            <a:spLocks noGrp="1"/>
+          </p:cNvSpPr>
+          <p:nvPr>
+            <p:ph type="body" idx="1"/>
+          </p:nvPr>
+        </p:nvSpPr>
+        <p:spPr/>
+        <p:txBody>
+          <a:bodyPr/>
+          <a:lstStyle/>
+          <a:p>
+            <a:r>
+              <a:rPr lang="nl-BE" dirty="0" err="1" smtClean="0"/>
+              <a:t>applicationHost</a:t>
+            </a:r>
+            <a:r>
+              <a:rPr lang="nl-BE" dirty="0" smtClean="0"/>
+              <a:t> is waar alles in gebeurt, hierin</a:t>
+            </a:r>
+            <a:r>
+              <a:rPr lang="nl-BE" baseline="0" dirty="0" smtClean="0"/>
+              <a:t> plaatst </a:t>
+            </a:r>
+            <a:r>
+              <a:rPr lang="nl-BE" baseline="0" dirty="0" err="1" smtClean="0"/>
+              <a:t>Durandal</a:t>
+            </a:r>
+            <a:r>
+              <a:rPr lang="nl-BE" baseline="0" dirty="0" smtClean="0"/>
+              <a:t> je views</a:t>
+            </a:r>
+            <a:endParaRPr lang="nl-BE" dirty="0" smtClean="0"/>
+          </a:p>
+          <a:p>
+            <a:r>
+              <a:rPr lang="nl-BE" dirty="0" smtClean="0"/>
+              <a:t>HTML die er al in staat wordt overschreven,</a:t>
+            </a:r>
+            <a:r>
+              <a:rPr lang="nl-BE" baseline="0" dirty="0" smtClean="0"/>
+              <a:t> maar kan als </a:t>
+            </a:r>
+            <a:r>
+              <a:rPr lang="nl-BE" baseline="0" dirty="0" err="1" smtClean="0"/>
+              <a:t>splashscreen</a:t>
+            </a:r>
+            <a:r>
+              <a:rPr lang="nl-BE" baseline="0" dirty="0" smtClean="0"/>
+              <a:t> dienen (deze techniek kan overal toegepast worden)</a:t>
+            </a:r>
+            <a:endParaRPr lang="en-US" dirty="0"/>
+          </a:p>
+        </p:txBody>
+      </p:sp>
+      <p:sp>
+        <p:nvSpPr>
+          <p:cNvPr id="4" name="Slide Number Placeholder 3"/>
+          <p:cNvSpPr>
+            <a:spLocks noGrp="1"/>
+          </p:cNvSpPr>
+          <p:nvPr>
+            <p:ph type="sldNum" sz="quarter" idx="10"/>
+          </p:nvPr>
+        </p:nvSpPr>
+        <p:spPr/>
+        <p:txBody>
+          <a:bodyPr/>
+          <a:lstStyle/>
+          <a:p>
+            <a:fld id="{0DF56419-AC34-45D0-BAB8-5A4CB1E563BF}" type="slidenum">
+              <a:rPr lang="en-US" smtClean="0"/>
+              <a:t>30</a:t>
+            </a:fld>
+            <a:endParaRPr lang="en-US"/>
+          </a:p>
+        </p:txBody>
+      </p:sp>
+    </p:spTree>
+    <p:extLst>
+      <p:ext uri="{BB962C8B-B14F-4D97-AF65-F5344CB8AC3E}">
+        <p14:creationId xmlns:p14="http://schemas.microsoft.com/office/powerpoint/2010/main" val="1795069426"/>
+      </p:ext>
+    </p:extLst>
+  </p:cSld>
+  <p:clrMapOvr>
+    <a:masterClrMapping/>
+  </p:clrMapOvr>
+</p:notes>
+</file>
+
+<file path=ppt/notesSlides/notesSlide18.xml><?xml version="1.0" encoding="utf-8"?>
+<p:notes xmlns:a="http://schemas.openxmlformats.org/drawingml/2006/main" xmlns:r="http://schemas.openxmlformats.org/officeDocument/2006/relationships" xmlns:p="http://schemas.openxmlformats.org/presentationml/2006/main">
+  <p:cSld>
+    <p:spTree>
+      <p:nvGrpSpPr>
+        <p:cNvPr id="1" name=""/>
+        <p:cNvGrpSpPr/>
+        <p:nvPr/>
+      </p:nvGrpSpPr>
+      <p:grpSpPr>
+        <a:xfrm>
+          <a:off x="0" y="0"/>
+          <a:ext cx="0" cy="0"/>
+          <a:chOff x="0" y="0"/>
+          <a:chExt cx="0" cy="0"/>
+        </a:xfrm>
+      </p:grpSpPr>
+      <p:sp>
+        <p:nvSpPr>
+          <p:cNvPr id="2" name="Slide Image Placeholder 1"/>
+          <p:cNvSpPr>
+            <a:spLocks noGrp="1" noRot="1" noChangeAspect="1"/>
+          </p:cNvSpPr>
+          <p:nvPr>
+            <p:ph type="sldImg"/>
+          </p:nvPr>
+        </p:nvSpPr>
+        <p:spPr/>
+      </p:sp>
+      <p:sp>
+        <p:nvSpPr>
+          <p:cNvPr id="3" name="Notes Placeholder 2"/>
+          <p:cNvSpPr>
+            <a:spLocks noGrp="1"/>
+          </p:cNvSpPr>
+          <p:nvPr>
+            <p:ph type="body" idx="1"/>
+          </p:nvPr>
+        </p:nvSpPr>
+        <p:spPr/>
+        <p:txBody>
+          <a:bodyPr/>
+          <a:lstStyle/>
+          <a:p>
+            <a:endParaRPr lang="en-US" dirty="0"/>
+          </a:p>
+        </p:txBody>
+      </p:sp>
+      <p:sp>
+        <p:nvSpPr>
+          <p:cNvPr id="4" name="Slide Number Placeholder 3"/>
+          <p:cNvSpPr>
+            <a:spLocks noGrp="1"/>
+          </p:cNvSpPr>
+          <p:nvPr>
+            <p:ph type="sldNum" sz="quarter" idx="10"/>
+          </p:nvPr>
+        </p:nvSpPr>
+        <p:spPr/>
+        <p:txBody>
+          <a:bodyPr/>
+          <a:lstStyle/>
+          <a:p>
+            <a:fld id="{0DF56419-AC34-45D0-BAB8-5A4CB1E563BF}" type="slidenum">
+              <a:rPr lang="en-US" smtClean="0"/>
+              <a:t>31</a:t>
+            </a:fld>
+            <a:endParaRPr lang="en-US"/>
+          </a:p>
+        </p:txBody>
+      </p:sp>
+    </p:spTree>
+    <p:extLst>
+      <p:ext uri="{BB962C8B-B14F-4D97-AF65-F5344CB8AC3E}">
+        <p14:creationId xmlns:p14="http://schemas.microsoft.com/office/powerpoint/2010/main" val="2754514785"/>
+      </p:ext>
+    </p:extLst>
+  </p:cSld>
+  <p:clrMapOvr>
+    <a:masterClrMapping/>
+  </p:clrMapOvr>
+</p:notes>
+</file>
+
+<file path=ppt/notesSlides/notesSlide19.xml><?xml version="1.0" encoding="utf-8"?>
+<p:notes xmlns:a="http://schemas.openxmlformats.org/drawingml/2006/main" xmlns:r="http://schemas.openxmlformats.org/officeDocument/2006/relationships" xmlns:p="http://schemas.openxmlformats.org/presentationml/2006/main">
+  <p:cSld>
+    <p:spTree>
+      <p:nvGrpSpPr>
+        <p:cNvPr id="1" name=""/>
+        <p:cNvGrpSpPr/>
+        <p:nvPr/>
+      </p:nvGrpSpPr>
+      <p:grpSpPr>
+        <a:xfrm>
+          <a:off x="0" y="0"/>
+          <a:ext cx="0" cy="0"/>
+          <a:chOff x="0" y="0"/>
+          <a:chExt cx="0" cy="0"/>
+        </a:xfrm>
+      </p:grpSpPr>
+      <p:sp>
+        <p:nvSpPr>
+          <p:cNvPr id="2" name="Slide Image Placeholder 1"/>
+          <p:cNvSpPr>
+            <a:spLocks noGrp="1" noRot="1" noChangeAspect="1"/>
+          </p:cNvSpPr>
+          <p:nvPr>
+            <p:ph type="sldImg"/>
+          </p:nvPr>
+        </p:nvSpPr>
+        <p:spPr/>
+      </p:sp>
+      <p:sp>
+        <p:nvSpPr>
+          <p:cNvPr id="3" name="Notes Placeholder 2"/>
+          <p:cNvSpPr>
+            <a:spLocks noGrp="1"/>
+          </p:cNvSpPr>
+          <p:nvPr>
+            <p:ph type="body" idx="1"/>
+          </p:nvPr>
+        </p:nvSpPr>
+        <p:spPr/>
+        <p:txBody>
+          <a:bodyPr/>
+          <a:lstStyle/>
+          <a:p>
+            <a:r>
+              <a:rPr lang="nl-BE" dirty="0" smtClean="0"/>
+              <a:t>Router </a:t>
+            </a:r>
+            <a:r>
+              <a:rPr lang="nl-BE" dirty="0" err="1" smtClean="0"/>
+              <a:t>mappings</a:t>
+            </a:r>
+            <a:r>
+              <a:rPr lang="nl-BE" dirty="0" smtClean="0"/>
+              <a:t>:</a:t>
+            </a:r>
+          </a:p>
+          <a:p>
+            <a:r>
+              <a:rPr lang="nl-BE" dirty="0" smtClean="0"/>
+              <a:t>	route:</a:t>
+            </a:r>
+            <a:r>
+              <a:rPr lang="nl-BE" baseline="0" dirty="0" smtClean="0"/>
+              <a:t> wat in de </a:t>
+            </a:r>
+            <a:r>
+              <a:rPr lang="nl-BE" baseline="0" dirty="0" err="1" smtClean="0"/>
+              <a:t>url</a:t>
+            </a:r>
+            <a:r>
+              <a:rPr lang="nl-BE" baseline="0" dirty="0" smtClean="0"/>
+              <a:t> te zien is, leeg is de default route</a:t>
+            </a:r>
+          </a:p>
+          <a:p>
+            <a:r>
+              <a:rPr lang="nl-BE" baseline="0" dirty="0" smtClean="0"/>
+              <a:t>	</a:t>
+            </a:r>
+            <a:r>
+              <a:rPr lang="nl-BE" baseline="0" dirty="0" err="1" smtClean="0"/>
+              <a:t>title</a:t>
+            </a:r>
+            <a:r>
+              <a:rPr lang="nl-BE" baseline="0" dirty="0" smtClean="0"/>
+              <a:t>: gebruikt voor </a:t>
+            </a:r>
+            <a:r>
+              <a:rPr lang="nl-BE" baseline="0" dirty="0" err="1" smtClean="0"/>
+              <a:t>document.title</a:t>
+            </a:r>
+            <a:endParaRPr lang="nl-BE" baseline="0" dirty="0" smtClean="0"/>
+          </a:p>
+          <a:p>
+            <a:r>
+              <a:rPr lang="nl-BE" baseline="0" dirty="0" smtClean="0"/>
+              <a:t>	</a:t>
+            </a:r>
+            <a:r>
+              <a:rPr lang="nl-BE" baseline="0" dirty="0" err="1" smtClean="0"/>
+              <a:t>moduleId</a:t>
+            </a:r>
+            <a:r>
+              <a:rPr lang="nl-BE" baseline="0" dirty="0" smtClean="0"/>
+              <a:t>: </a:t>
+            </a:r>
+            <a:r>
+              <a:rPr lang="nl-BE" baseline="0" dirty="0" err="1" smtClean="0"/>
+              <a:t>id</a:t>
+            </a:r>
+            <a:r>
+              <a:rPr lang="nl-BE" baseline="0" dirty="0" smtClean="0"/>
+              <a:t> van je module, ook gebruikt om viewmodel op te sporen (en daarna bijbehorende view)</a:t>
+            </a:r>
+          </a:p>
+          <a:p>
+            <a:r>
+              <a:rPr lang="nl-BE" baseline="0" dirty="0" smtClean="0"/>
+              <a:t>	</a:t>
+            </a:r>
+            <a:r>
+              <a:rPr lang="nl-BE" baseline="0" dirty="0" err="1" smtClean="0"/>
+              <a:t>nav</a:t>
+            </a:r>
+            <a:r>
+              <a:rPr lang="nl-BE" baseline="0" dirty="0" smtClean="0"/>
+              <a:t>: of het opgenomen moet worden in </a:t>
+            </a:r>
+            <a:r>
+              <a:rPr lang="nl-BE" baseline="0" dirty="0" err="1" smtClean="0"/>
+              <a:t>router.navigationModel</a:t>
+            </a:r>
+            <a:endParaRPr lang="nl-BE" baseline="0" dirty="0" smtClean="0"/>
+          </a:p>
+          <a:p>
+            <a:endParaRPr lang="nl-BE" baseline="0" dirty="0" smtClean="0"/>
+          </a:p>
+          <a:p>
+            <a:r>
+              <a:rPr lang="nl-BE" baseline="0" dirty="0" smtClean="0"/>
+              <a:t>	parameters: </a:t>
+            </a:r>
+            <a:r>
+              <a:rPr lang="nl-BE" baseline="0" dirty="0" err="1" smtClean="0"/>
+              <a:t>myRoute</a:t>
+            </a:r>
+            <a:r>
+              <a:rPr lang="nl-BE" baseline="0" dirty="0" smtClean="0"/>
+              <a:t>/:</a:t>
+            </a:r>
+            <a:r>
+              <a:rPr lang="nl-BE" baseline="0" dirty="0" err="1" smtClean="0"/>
+              <a:t>id</a:t>
+            </a:r>
+            <a:r>
+              <a:rPr lang="nl-BE" baseline="0" dirty="0" smtClean="0"/>
+              <a:t> of indien optioneel: </a:t>
+            </a:r>
+            <a:r>
+              <a:rPr lang="nl-BE" baseline="0" dirty="0" err="1" smtClean="0"/>
+              <a:t>myRoute</a:t>
+            </a:r>
+            <a:r>
+              <a:rPr lang="nl-BE" baseline="0" dirty="0" smtClean="0"/>
+              <a:t>(/:</a:t>
+            </a:r>
+            <a:r>
+              <a:rPr lang="nl-BE" baseline="0" dirty="0" err="1" smtClean="0"/>
+              <a:t>id</a:t>
+            </a:r>
+            <a:r>
+              <a:rPr lang="nl-BE" baseline="0" dirty="0" smtClean="0"/>
+              <a:t>)</a:t>
+            </a:r>
+          </a:p>
+          <a:p>
+            <a:r>
+              <a:rPr lang="nl-BE" baseline="0" dirty="0" smtClean="0"/>
+              <a:t>		meerdere parameters zijn mogelijk, volgorde wordt bewaard in </a:t>
+            </a:r>
+            <a:r>
+              <a:rPr lang="nl-BE" baseline="0" dirty="0" err="1" smtClean="0"/>
+              <a:t>activate</a:t>
+            </a:r>
+            <a:r>
+              <a:rPr lang="nl-BE" baseline="0" dirty="0" smtClean="0"/>
+              <a:t> call</a:t>
+            </a:r>
+          </a:p>
+          <a:p>
+            <a:r>
+              <a:rPr lang="nl-BE" baseline="0" dirty="0" smtClean="0"/>
+              <a:t>		</a:t>
+            </a:r>
+            <a:r>
+              <a:rPr lang="nl-BE" baseline="0" dirty="0" err="1" smtClean="0"/>
+              <a:t>queryString</a:t>
+            </a:r>
+            <a:r>
+              <a:rPr lang="nl-BE" baseline="0" dirty="0" smtClean="0"/>
+              <a:t> is laatste object in </a:t>
+            </a:r>
+            <a:r>
+              <a:rPr lang="nl-BE" baseline="0" dirty="0" err="1" smtClean="0"/>
+              <a:t>activate</a:t>
+            </a:r>
+            <a:r>
+              <a:rPr lang="nl-BE" baseline="0" dirty="0" smtClean="0"/>
+              <a:t> </a:t>
+            </a:r>
+            <a:r>
+              <a:rPr lang="nl-BE" baseline="0" dirty="0" err="1" smtClean="0"/>
+              <a:t>and</a:t>
+            </a:r>
+            <a:r>
+              <a:rPr lang="nl-BE" baseline="0" dirty="0" smtClean="0"/>
+              <a:t> is een JS object met </a:t>
+            </a:r>
+            <a:r>
+              <a:rPr lang="nl-BE" baseline="0" dirty="0" err="1" smtClean="0"/>
+              <a:t>properties</a:t>
+            </a:r>
+            <a:r>
+              <a:rPr lang="nl-BE" baseline="0" dirty="0" smtClean="0"/>
+              <a:t> volgens querystring </a:t>
+            </a:r>
+            <a:r>
+              <a:rPr lang="nl-BE" baseline="0" smtClean="0"/>
+              <a:t>keys</a:t>
+            </a:r>
+            <a:endParaRPr lang="nl-BE" baseline="0" dirty="0" smtClean="0"/>
+          </a:p>
+          <a:p>
+            <a:r>
+              <a:rPr lang="nl-BE" baseline="0" dirty="0" smtClean="0"/>
+              <a:t>	</a:t>
+            </a:r>
+            <a:r>
+              <a:rPr lang="nl-BE" baseline="0" dirty="0" err="1" smtClean="0"/>
+              <a:t>splat</a:t>
+            </a:r>
+            <a:r>
+              <a:rPr lang="nl-BE" baseline="0" dirty="0" smtClean="0"/>
+              <a:t> route: </a:t>
+            </a:r>
+            <a:r>
+              <a:rPr lang="nl-BE" baseline="0" dirty="0" err="1" smtClean="0"/>
+              <a:t>myRoute</a:t>
+            </a:r>
+            <a:r>
+              <a:rPr lang="nl-BE" baseline="0" dirty="0" smtClean="0"/>
+              <a:t>*details</a:t>
+            </a:r>
+          </a:p>
+          <a:p>
+            <a:r>
+              <a:rPr lang="nl-BE" baseline="0" dirty="0" smtClean="0"/>
+              <a:t>	</a:t>
+            </a:r>
+            <a:endParaRPr lang="nl-BE" dirty="0" smtClean="0"/>
+          </a:p>
+          <a:p>
+            <a:r>
+              <a:rPr lang="nl-BE" dirty="0" err="1" smtClean="0"/>
+              <a:t>buildNavigationModel</a:t>
+            </a:r>
+            <a:r>
+              <a:rPr lang="nl-BE" dirty="0" smtClean="0"/>
+              <a:t>: alle routes met </a:t>
+            </a:r>
+            <a:r>
+              <a:rPr lang="nl-BE" dirty="0" err="1" smtClean="0"/>
+              <a:t>nav</a:t>
+            </a:r>
+            <a:r>
+              <a:rPr lang="nl-BE" dirty="0" smtClean="0"/>
+              <a:t>: </a:t>
+            </a:r>
+            <a:r>
+              <a:rPr lang="nl-BE" dirty="0" err="1" smtClean="0"/>
+              <a:t>true</a:t>
+            </a:r>
+            <a:r>
+              <a:rPr lang="nl-BE" dirty="0" smtClean="0"/>
+              <a:t> worden in de array </a:t>
+            </a:r>
+            <a:r>
+              <a:rPr lang="nl-BE" dirty="0" err="1" smtClean="0"/>
+              <a:t>router.navigationModel</a:t>
+            </a:r>
+            <a:r>
+              <a:rPr lang="nl-BE" dirty="0" smtClean="0"/>
+              <a:t> gegoten om te kunnen binden in navigatie</a:t>
+            </a:r>
+            <a:r>
+              <a:rPr lang="nl-BE" baseline="0" dirty="0" smtClean="0"/>
+              <a:t> (zie shell.html)</a:t>
+            </a:r>
+            <a:endParaRPr lang="en-US" dirty="0"/>
+          </a:p>
+        </p:txBody>
+      </p:sp>
+      <p:sp>
+        <p:nvSpPr>
+          <p:cNvPr id="4" name="Slide Number Placeholder 3"/>
+          <p:cNvSpPr>
+            <a:spLocks noGrp="1"/>
+          </p:cNvSpPr>
+          <p:nvPr>
+            <p:ph type="sldNum" sz="quarter" idx="10"/>
+          </p:nvPr>
+        </p:nvSpPr>
+        <p:spPr/>
+        <p:txBody>
+          <a:bodyPr/>
+          <a:lstStyle/>
+          <a:p>
+            <a:fld id="{0DF56419-AC34-45D0-BAB8-5A4CB1E563BF}" type="slidenum">
+              <a:rPr lang="en-US" smtClean="0"/>
+              <a:t>32</a:t>
+            </a:fld>
+            <a:endParaRPr lang="en-US"/>
+          </a:p>
+        </p:txBody>
+      </p:sp>
+    </p:spTree>
+    <p:extLst>
+      <p:ext uri="{BB962C8B-B14F-4D97-AF65-F5344CB8AC3E}">
+        <p14:creationId xmlns:p14="http://schemas.microsoft.com/office/powerpoint/2010/main" val="3530374302"/>
       </p:ext>
     </p:extLst>
   </p:cSld>
@@ -8519,6 +9185,21 @@
               <a:rPr lang="nl-BE" dirty="0" err="1" smtClean="0"/>
               <a:t>subscribe</a:t>
             </a:r>
+            <a:endParaRPr lang="nl-BE" dirty="0" smtClean="0"/>
+          </a:p>
+          <a:p>
+            <a:r>
+              <a:rPr lang="nl-BE" dirty="0" err="1" smtClean="0"/>
+              <a:t>app.showMessage</a:t>
+            </a:r>
+            <a:r>
+              <a:rPr lang="nl-BE" dirty="0" smtClean="0"/>
+              <a:t> en </a:t>
+            </a:r>
+            <a:r>
+              <a:rPr lang="nl-BE" dirty="0" err="1" smtClean="0"/>
+              <a:t>app.showDialog</a:t>
+            </a:r>
             <a:endParaRPr lang="en-US" dirty="0"/>
           </a:p>
         </p:txBody>
@@ -8667,36 +9348,305 @@
               <a:t>: </a:t>
             </a:r>
             <a:r>
-              <a:rPr lang="nl-BE" smtClean="0"/>
-              <a:t>publish-subscribe</a:t>
+              <a:rPr lang="nl-BE" dirty="0" err="1" smtClean="0"/>
+              <a:t>app</a:t>
+            </a:r>
+            <a:r>
+              <a:rPr lang="nl-BE" dirty="0" smtClean="0"/>
+              <a:t> setup 1</a:t>
             </a:r>
             <a:endParaRPr lang="en-US" dirty="0"/>
           </a:p>
         </p:txBody>
       </p:sp>
-      <p:sp>
-        <p:nvSpPr>
-          <p:cNvPr id="3" name="Content Placeholder 2"/>
-          <p:cNvSpPr>
-            <a:spLocks noGrp="1"/>
-          </p:cNvSpPr>
+      <p:pic>
+        <p:nvPicPr>
+          <p:cNvPr id="4" name="Content Placeholder 3"/>
+          <p:cNvPicPr>
+            <a:picLocks noGrp="1" noChangeAspect="1"/>
+          </p:cNvPicPr>
           <p:nvPr>
             <p:ph idx="1"/>
           </p:nvPr>
-        </p:nvSpPr>
-        <p:spPr/>
-        <p:txBody>
-          <a:bodyPr/>
-          <a:lstStyle/>
-          <a:p>
-            <a:endParaRPr lang="en-US"/>
-          </a:p>
-        </p:txBody>
-      </p:sp>
+        </p:nvPicPr>
+        <p:blipFill>
+          <a:blip r:embed="rId3"/>
+          <a:stretch>
+            <a:fillRect/>
+          </a:stretch>
+        </p:blipFill>
+        <p:spPr>
+          <a:xfrm>
+            <a:off x="838200" y="1690688"/>
+            <a:ext cx="8134350" cy="2600325"/>
+          </a:xfrm>
+          <a:prstGeom prst="rect">
+            <a:avLst/>
+          </a:prstGeom>
+        </p:spPr>
+      </p:pic>
     </p:spTree>
     <p:extLst>
       <p:ext uri="{BB962C8B-B14F-4D97-AF65-F5344CB8AC3E}">
         <p14:creationId xmlns:p14="http://schemas.microsoft.com/office/powerpoint/2010/main" val="87593167"/>
+      </p:ext>
+    </p:extLst>
+  </p:cSld>
+  <p:clrMapOvr>
+    <a:masterClrMapping/>
+  </p:clrMapOvr>
+</p:sld>
+</file>
+
+<file path=ppt/slides/slide31.xml><?xml version="1.0" encoding="utf-8"?>
+<p:sld xmlns:a="http://schemas.openxmlformats.org/drawingml/2006/main" xmlns:r="http://schemas.openxmlformats.org/officeDocument/2006/relationships" xmlns:p="http://schemas.openxmlformats.org/presentationml/2006/main">
+  <p:cSld>
+    <p:spTree>
+      <p:nvGrpSpPr>
+        <p:cNvPr id="1" name=""/>
+        <p:cNvGrpSpPr/>
+        <p:nvPr/>
+      </p:nvGrpSpPr>
+      <p:grpSpPr>
+        <a:xfrm>
+          <a:off x="0" y="0"/>
+          <a:ext cx="0" cy="0"/>
+          <a:chOff x="0" y="0"/>
+          <a:chExt cx="0" cy="0"/>
+        </a:xfrm>
+      </p:grpSpPr>
+      <p:sp>
+        <p:nvSpPr>
+          <p:cNvPr id="2" name="Title 1"/>
+          <p:cNvSpPr>
+            <a:spLocks noGrp="1"/>
+          </p:cNvSpPr>
+          <p:nvPr>
+            <p:ph type="title"/>
+          </p:nvPr>
+        </p:nvSpPr>
+        <p:spPr/>
+        <p:txBody>
+          <a:bodyPr/>
+          <a:lstStyle/>
+          <a:p>
+            <a:r>
+              <a:rPr lang="nl-BE" dirty="0" err="1" smtClean="0"/>
+              <a:t>Durandal</a:t>
+            </a:r>
+            <a:r>
+              <a:rPr lang="nl-BE" dirty="0" smtClean="0"/>
+              <a:t>: </a:t>
+            </a:r>
+            <a:r>
+              <a:rPr lang="nl-BE" dirty="0" err="1" smtClean="0"/>
+              <a:t>app</a:t>
+            </a:r>
+            <a:r>
+              <a:rPr lang="nl-BE" dirty="0" smtClean="0"/>
+              <a:t> setup 2</a:t>
+            </a:r>
+            <a:endParaRPr lang="en-US" dirty="0"/>
+          </a:p>
+        </p:txBody>
+      </p:sp>
+      <p:pic>
+        <p:nvPicPr>
+          <p:cNvPr id="4" name="Content Placeholder 3"/>
+          <p:cNvPicPr>
+            <a:picLocks noGrp="1" noChangeAspect="1"/>
+          </p:cNvPicPr>
+          <p:nvPr>
+            <p:ph idx="1"/>
+          </p:nvPr>
+        </p:nvPicPr>
+        <p:blipFill>
+          <a:blip r:embed="rId3"/>
+          <a:stretch>
+            <a:fillRect/>
+          </a:stretch>
+        </p:blipFill>
+        <p:spPr>
+          <a:xfrm>
+            <a:off x="838200" y="1690688"/>
+            <a:ext cx="10515600" cy="4301836"/>
+          </a:xfrm>
+          <a:prstGeom prst="rect">
+            <a:avLst/>
+          </a:prstGeom>
+        </p:spPr>
+      </p:pic>
+    </p:spTree>
+    <p:extLst>
+      <p:ext uri="{BB962C8B-B14F-4D97-AF65-F5344CB8AC3E}">
+        <p14:creationId xmlns:p14="http://schemas.microsoft.com/office/powerpoint/2010/main" val="3574613670"/>
+      </p:ext>
+    </p:extLst>
+  </p:cSld>
+  <p:clrMapOvr>
+    <a:masterClrMapping/>
+  </p:clrMapOvr>
+</p:sld>
+</file>
+
+<file path=ppt/slides/slide32.xml><?xml version="1.0" encoding="utf-8"?>
+<p:sld xmlns:a="http://schemas.openxmlformats.org/drawingml/2006/main" xmlns:r="http://schemas.openxmlformats.org/officeDocument/2006/relationships" xmlns:p="http://schemas.openxmlformats.org/presentationml/2006/main">
+  <p:cSld>
+    <p:spTree>
+      <p:nvGrpSpPr>
+        <p:cNvPr id="1" name=""/>
+        <p:cNvGrpSpPr/>
+        <p:nvPr/>
+      </p:nvGrpSpPr>
+      <p:grpSpPr>
+        <a:xfrm>
+          <a:off x="0" y="0"/>
+          <a:ext cx="0" cy="0"/>
+          <a:chOff x="0" y="0"/>
+          <a:chExt cx="0" cy="0"/>
+        </a:xfrm>
+      </p:grpSpPr>
+      <p:sp>
+        <p:nvSpPr>
+          <p:cNvPr id="2" name="Title 1"/>
+          <p:cNvSpPr>
+            <a:spLocks noGrp="1"/>
+          </p:cNvSpPr>
+          <p:nvPr>
+            <p:ph type="title"/>
+          </p:nvPr>
+        </p:nvSpPr>
+        <p:spPr/>
+        <p:txBody>
+          <a:bodyPr/>
+          <a:lstStyle/>
+          <a:p>
+            <a:r>
+              <a:rPr lang="nl-BE" dirty="0" err="1" smtClean="0"/>
+              <a:t>Durandal</a:t>
+            </a:r>
+            <a:r>
+              <a:rPr lang="nl-BE" dirty="0" smtClean="0"/>
+              <a:t>: </a:t>
+            </a:r>
+            <a:r>
+              <a:rPr lang="nl-BE" dirty="0" err="1" smtClean="0"/>
+              <a:t>app</a:t>
+            </a:r>
+            <a:r>
+              <a:rPr lang="nl-BE" dirty="0" smtClean="0"/>
+              <a:t> setup 3</a:t>
+            </a:r>
+            <a:endParaRPr lang="en-US" dirty="0"/>
+          </a:p>
+        </p:txBody>
+      </p:sp>
+      <p:pic>
+        <p:nvPicPr>
+          <p:cNvPr id="4" name="Content Placeholder 3"/>
+          <p:cNvPicPr>
+            <a:picLocks noGrp="1" noChangeAspect="1"/>
+          </p:cNvPicPr>
+          <p:nvPr>
+            <p:ph idx="1"/>
+          </p:nvPr>
+        </p:nvPicPr>
+        <p:blipFill>
+          <a:blip r:embed="rId3"/>
+          <a:stretch>
+            <a:fillRect/>
+          </a:stretch>
+        </p:blipFill>
+        <p:spPr>
+          <a:xfrm>
+            <a:off x="838200" y="1690688"/>
+            <a:ext cx="10515600" cy="4268708"/>
+          </a:xfrm>
+          <a:prstGeom prst="rect">
+            <a:avLst/>
+          </a:prstGeom>
+        </p:spPr>
+      </p:pic>
+    </p:spTree>
+    <p:extLst>
+      <p:ext uri="{BB962C8B-B14F-4D97-AF65-F5344CB8AC3E}">
+        <p14:creationId xmlns:p14="http://schemas.microsoft.com/office/powerpoint/2010/main" val="3158189651"/>
+      </p:ext>
+    </p:extLst>
+  </p:cSld>
+  <p:clrMapOvr>
+    <a:masterClrMapping/>
+  </p:clrMapOvr>
+</p:sld>
+</file>
+
+<file path=ppt/slides/slide33.xml><?xml version="1.0" encoding="utf-8"?>
+<p:sld xmlns:a="http://schemas.openxmlformats.org/drawingml/2006/main" xmlns:r="http://schemas.openxmlformats.org/officeDocument/2006/relationships" xmlns:p="http://schemas.openxmlformats.org/presentationml/2006/main">
+  <p:cSld>
+    <p:spTree>
+      <p:nvGrpSpPr>
+        <p:cNvPr id="1" name=""/>
+        <p:cNvGrpSpPr/>
+        <p:nvPr/>
+      </p:nvGrpSpPr>
+      <p:grpSpPr>
+        <a:xfrm>
+          <a:off x="0" y="0"/>
+          <a:ext cx="0" cy="0"/>
+          <a:chOff x="0" y="0"/>
+          <a:chExt cx="0" cy="0"/>
+        </a:xfrm>
+      </p:grpSpPr>
+      <p:sp>
+        <p:nvSpPr>
+          <p:cNvPr id="2" name="Title 1"/>
+          <p:cNvSpPr>
+            <a:spLocks noGrp="1"/>
+          </p:cNvSpPr>
+          <p:nvPr>
+            <p:ph type="title"/>
+          </p:nvPr>
+        </p:nvSpPr>
+        <p:spPr/>
+        <p:txBody>
+          <a:bodyPr/>
+          <a:lstStyle/>
+          <a:p>
+            <a:r>
+              <a:rPr lang="nl-BE" dirty="0" err="1" smtClean="0"/>
+              <a:t>Durandal</a:t>
+            </a:r>
+            <a:r>
+              <a:rPr lang="nl-BE" dirty="0" smtClean="0"/>
+              <a:t>: router</a:t>
+            </a:r>
+            <a:endParaRPr lang="en-US" dirty="0"/>
+          </a:p>
+        </p:txBody>
+      </p:sp>
+      <p:sp>
+        <p:nvSpPr>
+          <p:cNvPr id="3" name="Content Placeholder 2"/>
+          <p:cNvSpPr>
+            <a:spLocks noGrp="1"/>
+          </p:cNvSpPr>
+          <p:nvPr>
+            <p:ph idx="1"/>
+          </p:nvPr>
+        </p:nvSpPr>
+        <p:spPr/>
+        <p:txBody>
+          <a:bodyPr/>
+          <a:lstStyle/>
+          <a:p>
+            <a:endParaRPr lang="en-US"/>
+          </a:p>
+        </p:txBody>
+      </p:sp>
+    </p:spTree>
+    <p:extLst>
+      <p:ext uri="{BB962C8B-B14F-4D97-AF65-F5344CB8AC3E}">
+        <p14:creationId xmlns:p14="http://schemas.microsoft.com/office/powerpoint/2010/main" val="3074774415"/>
       </p:ext>
     </p:extLst>
   </p:cSld>

</xml_diff>

<commit_message>
easily added existing Durandal app to ASP.NET HotTowel app!
</commit_message>
<xml_diff>
--- a/Durandal T4T.pptx
+++ b/Durandal T4T.pptx
@@ -1975,11 +1975,11 @@
             </a:r>
             <a:r>
               <a:rPr lang="nl-BE" baseline="0" dirty="0" smtClean="0"/>
-              <a:t>: of het opgenomen moet worden in </a:t>
-            </a:r>
-            <a:r>
-              <a:rPr lang="nl-BE" baseline="0" dirty="0" err="1" smtClean="0"/>
-              <a:t>router.navigationModel</a:t>
+              <a:t>: of het opgenomen moet worden </a:t>
+            </a:r>
+            <a:r>
+              <a:rPr lang="nl-BE" baseline="0" smtClean="0"/>
+              <a:t>in router.navigationModel (true/false) of de volgorde (int)</a:t>
             </a:r>
             <a:endParaRPr lang="nl-BE" baseline="0" dirty="0" smtClean="0"/>
           </a:p>
@@ -2602,6 +2602,114 @@
     <p:extLst>
       <p:ext uri="{BB962C8B-B14F-4D97-AF65-F5344CB8AC3E}">
         <p14:creationId xmlns:p14="http://schemas.microsoft.com/office/powerpoint/2010/main" val="2081039205"/>
+      </p:ext>
+    </p:extLst>
+  </p:cSld>
+  <p:clrMapOvr>
+    <a:masterClrMapping/>
+  </p:clrMapOvr>
+</p:notes>
+</file>
+
+<file path=ppt/notesSlides/notesSlide21.xml><?xml version="1.0" encoding="utf-8"?>
+<p:notes xmlns:a="http://schemas.openxmlformats.org/drawingml/2006/main" xmlns:r="http://schemas.openxmlformats.org/officeDocument/2006/relationships" xmlns:p="http://schemas.openxmlformats.org/presentationml/2006/main">
+  <p:cSld>
+    <p:spTree>
+      <p:nvGrpSpPr>
+        <p:cNvPr id="1" name=""/>
+        <p:cNvGrpSpPr/>
+        <p:nvPr/>
+      </p:nvGrpSpPr>
+      <p:grpSpPr>
+        <a:xfrm>
+          <a:off x="0" y="0"/>
+          <a:ext cx="0" cy="0"/>
+          <a:chOff x="0" y="0"/>
+          <a:chExt cx="0" cy="0"/>
+        </a:xfrm>
+      </p:grpSpPr>
+      <p:sp>
+        <p:nvSpPr>
+          <p:cNvPr id="2" name="Slide Image Placeholder 1"/>
+          <p:cNvSpPr>
+            <a:spLocks noGrp="1" noRot="1" noChangeAspect="1"/>
+          </p:cNvSpPr>
+          <p:nvPr>
+            <p:ph type="sldImg"/>
+          </p:nvPr>
+        </p:nvSpPr>
+        <p:spPr/>
+      </p:sp>
+      <p:sp>
+        <p:nvSpPr>
+          <p:cNvPr id="3" name="Notes Placeholder 2"/>
+          <p:cNvSpPr>
+            <a:spLocks noGrp="1"/>
+          </p:cNvSpPr>
+          <p:nvPr>
+            <p:ph type="body" idx="1"/>
+          </p:nvPr>
+        </p:nvSpPr>
+        <p:spPr/>
+        <p:txBody>
+          <a:bodyPr/>
+          <a:lstStyle/>
+          <a:p>
+            <a:r>
+              <a:rPr lang="nl-BE" dirty="0" smtClean="0"/>
+              <a:t>SEO: komt er op neer dat je aan de serverkant een </a:t>
+            </a:r>
+            <a:r>
+              <a:rPr lang="nl-BE" dirty="0" err="1" smtClean="0"/>
+              <a:t>headless</a:t>
+            </a:r>
+            <a:r>
+              <a:rPr lang="nl-BE" dirty="0" smtClean="0"/>
+              <a:t> browser gebruikt</a:t>
+            </a:r>
+            <a:r>
+              <a:rPr lang="nl-BE" baseline="0" dirty="0" smtClean="0"/>
+              <a:t> (bv </a:t>
+            </a:r>
+            <a:r>
+              <a:rPr lang="nl-BE" baseline="0" dirty="0" err="1" smtClean="0"/>
+              <a:t>PhantomJS</a:t>
+            </a:r>
+            <a:r>
+              <a:rPr lang="nl-BE" baseline="0" dirty="0" smtClean="0"/>
+              <a:t>) om HTML snapshots te genereren voor Google</a:t>
+            </a:r>
+            <a:endParaRPr lang="en-US" dirty="0"/>
+          </a:p>
+        </p:txBody>
+      </p:sp>
+      <p:sp>
+        <p:nvSpPr>
+          <p:cNvPr id="4" name="Slide Number Placeholder 3"/>
+          <p:cNvSpPr>
+            <a:spLocks noGrp="1"/>
+          </p:cNvSpPr>
+          <p:nvPr>
+            <p:ph type="sldNum" sz="quarter" idx="10"/>
+          </p:nvPr>
+        </p:nvSpPr>
+        <p:spPr/>
+        <p:txBody>
+          <a:bodyPr/>
+          <a:lstStyle/>
+          <a:p>
+            <a:fld id="{0DF56419-AC34-45D0-BAB8-5A4CB1E563BF}" type="slidenum">
+              <a:rPr lang="en-US" smtClean="0"/>
+              <a:t>35</a:t>
+            </a:fld>
+            <a:endParaRPr lang="en-US"/>
+          </a:p>
+        </p:txBody>
+      </p:sp>
+    </p:spTree>
+    <p:extLst>
+      <p:ext uri="{BB962C8B-B14F-4D97-AF65-F5344CB8AC3E}">
+        <p14:creationId xmlns:p14="http://schemas.microsoft.com/office/powerpoint/2010/main" val="4037003911"/>
       </p:ext>
     </p:extLst>
   </p:cSld>
@@ -10156,7 +10264,7 @@
         <p:spPr/>
         <p:txBody>
           <a:bodyPr>
-            <a:normAutofit lnSpcReduction="10000"/>
+            <a:normAutofit fontScale="92500" lnSpcReduction="20000"/>
           </a:bodyPr>
           <a:lstStyle/>
           <a:p>
@@ -10297,13 +10405,14 @@
             </a:r>
             <a:r>
               <a:rPr lang="nl-BE" dirty="0" smtClean="0"/>
-              <a:t> </a:t>
-            </a:r>
-            <a:r>
-              <a:rPr lang="nl-BE" smtClean="0"/>
-              <a:t>vanuit Visual Studio</a:t>
-            </a:r>
-            <a:endParaRPr lang="nl-BE" dirty="0" smtClean="0"/>
+              <a:t> vanuit Visual Studio</a:t>
+            </a:r>
+          </a:p>
+          <a:p>
+            <a:r>
+              <a:rPr lang="nl-BE" dirty="0" smtClean="0"/>
+              <a:t>SEO mogelijkheden</a:t>
+            </a:r>
           </a:p>
         </p:txBody>
       </p:sp>

</xml_diff>

<commit_message>
More or less but not yet finished structure of presentation
</commit_message>
<xml_diff>
--- a/Durandal T4T.pptx
+++ b/Durandal T4T.pptx
@@ -5,7 +5,7 @@
     <p:sldMasterId id="2147483648" r:id="rId1"/>
   </p:sldMasterIdLst>
   <p:notesMasterIdLst>
-    <p:notesMasterId r:id="rId37"/>
+    <p:notesMasterId r:id="rId38"/>
   </p:notesMasterIdLst>
   <p:sldIdLst>
     <p:sldId id="256" r:id="rId2"/>
@@ -42,7 +42,8 @@
     <p:sldId id="288" r:id="rId33"/>
     <p:sldId id="286" r:id="rId34"/>
     <p:sldId id="289" r:id="rId35"/>
-    <p:sldId id="290" r:id="rId36"/>
+    <p:sldId id="291" r:id="rId36"/>
+    <p:sldId id="290" r:id="rId37"/>
   </p:sldIdLst>
   <p:sldSz cx="12192000" cy="6858000"/>
   <p:notesSz cx="6858000" cy="9144000"/>
@@ -556,7 +557,7 @@
             </a:r>
             <a:r>
               <a:rPr lang="nl-BE" baseline="0" dirty="0" err="1" smtClean="0"/>
-              <a:t>dpendencies</a:t>
+              <a:t>dependencies</a:t>
             </a:r>
             <a:endParaRPr lang="nl-BE" baseline="0" dirty="0" smtClean="0"/>
           </a:p>
@@ -671,23 +672,99 @@
           <a:p>
             <a:r>
               <a:rPr lang="nl-BE" dirty="0" err="1" smtClean="0"/>
-              <a:t>Id</a:t>
-            </a:r>
-            <a:r>
-              <a:rPr lang="nl-BE" dirty="0" smtClean="0"/>
-              <a:t> is afgeleid</a:t>
-            </a:r>
-            <a:r>
-              <a:rPr lang="nl-BE" baseline="0" dirty="0" smtClean="0"/>
-              <a:t> van pad relatief t.o.v. </a:t>
-            </a:r>
+              <a:t>toJS</a:t>
+            </a:r>
+            <a:r>
+              <a:rPr lang="nl-BE" dirty="0" smtClean="0"/>
+              <a:t>: je object heeft geen </a:t>
+            </a:r>
+            <a:r>
+              <a:rPr lang="nl-BE" dirty="0" err="1" smtClean="0"/>
+              <a:t>observables</a:t>
+            </a:r>
+            <a:r>
+              <a:rPr lang="nl-BE" baseline="0" dirty="0" smtClean="0"/>
+              <a:t> meer, het is een normaal JS object</a:t>
+            </a:r>
+          </a:p>
+          <a:p>
             <a:r>
               <a:rPr lang="nl-BE" baseline="0" dirty="0" err="1" smtClean="0"/>
-              <a:t>baseUrl</a:t>
-            </a:r>
-            <a:r>
-              <a:rPr lang="nl-BE" baseline="0" dirty="0" smtClean="0"/>
-              <a:t> (normaal locatie van main.js)</a:t>
+              <a:t>toJSON</a:t>
+            </a:r>
+            <a:r>
+              <a:rPr lang="nl-BE" baseline="0" dirty="0" smtClean="0"/>
+              <a:t>: doet intern eerst een call naar </a:t>
+            </a:r>
+            <a:r>
+              <a:rPr lang="nl-BE" baseline="0" dirty="0" err="1" smtClean="0"/>
+              <a:t>toJS</a:t>
+            </a:r>
+            <a:r>
+              <a:rPr lang="nl-BE" baseline="0" dirty="0" smtClean="0"/>
+              <a:t>, </a:t>
+            </a:r>
+            <a:r>
+              <a:rPr lang="nl-BE" baseline="0" dirty="0" err="1" smtClean="0"/>
+              <a:t>serializeert</a:t>
+            </a:r>
+            <a:r>
+              <a:rPr lang="nl-BE" baseline="0" dirty="0" smtClean="0"/>
+              <a:t> dan naar een JSON string</a:t>
+            </a:r>
+          </a:p>
+          <a:p>
+            <a:r>
+              <a:rPr lang="nl-BE" baseline="0" dirty="0" smtClean="0"/>
+              <a:t>Alle members worden geëvalueerd, ook </a:t>
+            </a:r>
+            <a:r>
+              <a:rPr lang="nl-BE" baseline="0" dirty="0" err="1" smtClean="0"/>
+              <a:t>computed</a:t>
+            </a:r>
+            <a:r>
+              <a:rPr lang="nl-BE" baseline="0" dirty="0" smtClean="0"/>
+              <a:t> </a:t>
+            </a:r>
+            <a:r>
+              <a:rPr lang="nl-BE" baseline="0" dirty="0" err="1" smtClean="0"/>
+              <a:t>observables</a:t>
+            </a:r>
+            <a:r>
+              <a:rPr lang="nl-BE" baseline="0" dirty="0" smtClean="0"/>
+              <a:t>, non-</a:t>
+            </a:r>
+            <a:r>
+              <a:rPr lang="nl-BE" baseline="0" dirty="0" err="1" smtClean="0"/>
+              <a:t>observables</a:t>
+            </a:r>
+            <a:r>
+              <a:rPr lang="nl-BE" baseline="0" dirty="0" smtClean="0"/>
+              <a:t>, </a:t>
+            </a:r>
+            <a:r>
+              <a:rPr lang="nl-BE" baseline="0" dirty="0" err="1" smtClean="0"/>
+              <a:t>observable</a:t>
+            </a:r>
+            <a:r>
+              <a:rPr lang="nl-BE" baseline="0" dirty="0" smtClean="0"/>
+              <a:t> arrays, </a:t>
+            </a:r>
+            <a:r>
+              <a:rPr lang="nl-BE" baseline="0" dirty="0" err="1" smtClean="0"/>
+              <a:t>child</a:t>
+            </a:r>
+            <a:r>
+              <a:rPr lang="nl-BE" baseline="0" dirty="0" smtClean="0"/>
+              <a:t> </a:t>
+            </a:r>
+            <a:r>
+              <a:rPr lang="nl-BE" baseline="0" dirty="0" err="1" smtClean="0"/>
+              <a:t>viewmodels</a:t>
+            </a:r>
+            <a:r>
+              <a:rPr lang="nl-BE" baseline="0" dirty="0" smtClean="0"/>
+              <a:t>, enz.</a:t>
             </a:r>
             <a:endParaRPr lang="en-US" dirty="0"/>
           </a:p>
@@ -710,7 +787,7 @@
           <a:p>
             <a:fld id="{0DF56419-AC34-45D0-BAB8-5A4CB1E563BF}" type="slidenum">
               <a:rPr lang="en-US" smtClean="0"/>
-              <a:t>22</a:t>
+              <a:t>20</a:t>
             </a:fld>
             <a:endParaRPr lang="en-US"/>
           </a:p>
@@ -719,7 +796,7 @@
     </p:spTree>
     <p:extLst>
       <p:ext uri="{BB962C8B-B14F-4D97-AF65-F5344CB8AC3E}">
-        <p14:creationId xmlns:p14="http://schemas.microsoft.com/office/powerpoint/2010/main" val="106862747"/>
+        <p14:creationId xmlns:p14="http://schemas.microsoft.com/office/powerpoint/2010/main" val="2104542335"/>
       </p:ext>
     </p:extLst>
   </p:cSld>
@@ -774,16 +851,24 @@
           <a:lstStyle/>
           <a:p>
             <a:r>
-              <a:rPr lang="nl-BE" dirty="0" smtClean="0"/>
-              <a:t>Indien meerdere root </a:t>
-            </a:r>
-            <a:r>
-              <a:rPr lang="nl-BE" dirty="0" err="1" smtClean="0"/>
-              <a:t>elements</a:t>
-            </a:r>
-            <a:r>
-              <a:rPr lang="nl-BE" dirty="0" smtClean="0"/>
-              <a:t>, dan worden deze in een div geplaatst</a:t>
+              <a:rPr lang="nl-BE" dirty="0" err="1" smtClean="0"/>
+              <a:t>Id</a:t>
+            </a:r>
+            <a:r>
+              <a:rPr lang="nl-BE" dirty="0" smtClean="0"/>
+              <a:t> is afgeleid</a:t>
+            </a:r>
+            <a:r>
+              <a:rPr lang="nl-BE" baseline="0" dirty="0" smtClean="0"/>
+              <a:t> van pad relatief t.o.v. </a:t>
+            </a:r>
+            <a:r>
+              <a:rPr lang="nl-BE" baseline="0" dirty="0" err="1" smtClean="0"/>
+              <a:t>baseUrl</a:t>
+            </a:r>
+            <a:r>
+              <a:rPr lang="nl-BE" baseline="0" dirty="0" smtClean="0"/>
+              <a:t> (normaal locatie van main.js)</a:t>
             </a:r>
             <a:endParaRPr lang="en-US" dirty="0"/>
           </a:p>
@@ -806,7 +891,7 @@
           <a:p>
             <a:fld id="{0DF56419-AC34-45D0-BAB8-5A4CB1E563BF}" type="slidenum">
               <a:rPr lang="en-US" smtClean="0"/>
-              <a:t>23</a:t>
+              <a:t>22</a:t>
             </a:fld>
             <a:endParaRPr lang="en-US"/>
           </a:p>
@@ -815,7 +900,7 @@
     </p:spTree>
     <p:extLst>
       <p:ext uri="{BB962C8B-B14F-4D97-AF65-F5344CB8AC3E}">
-        <p14:creationId xmlns:p14="http://schemas.microsoft.com/office/powerpoint/2010/main" val="3152353316"/>
+        <p14:creationId xmlns:p14="http://schemas.microsoft.com/office/powerpoint/2010/main" val="106862747"/>
       </p:ext>
     </p:extLst>
   </p:cSld>
@@ -871,30 +956,16 @@
           <a:p>
             <a:r>
               <a:rPr lang="nl-BE" dirty="0" smtClean="0"/>
-              <a:t>Object</a:t>
-            </a:r>
-            <a:r>
-              <a:rPr lang="nl-BE" baseline="0" dirty="0" smtClean="0"/>
-              <a:t> </a:t>
-            </a:r>
-            <a:r>
-              <a:rPr lang="nl-BE" baseline="0" dirty="0" err="1" smtClean="0"/>
-              <a:t>composition</a:t>
-            </a:r>
-            <a:r>
-              <a:rPr lang="nl-BE" baseline="0" dirty="0" smtClean="0"/>
-              <a:t>: via </a:t>
-            </a:r>
-            <a:r>
-              <a:rPr lang="nl-BE" baseline="0" dirty="0" err="1" smtClean="0"/>
-              <a:t>RequireJS</a:t>
-            </a:r>
-            <a:r>
-              <a:rPr lang="nl-BE" baseline="0" dirty="0" smtClean="0"/>
-              <a:t> gewoon modules en hun afhankelijkheden</a:t>
-            </a:r>
-          </a:p>
-          <a:p>
+              <a:t>Indien meerdere root </a:t>
+            </a:r>
+            <a:r>
+              <a:rPr lang="nl-BE" dirty="0" err="1" smtClean="0"/>
+              <a:t>elements</a:t>
+            </a:r>
+            <a:r>
+              <a:rPr lang="nl-BE" dirty="0" smtClean="0"/>
+              <a:t>, dan worden deze in een div geplaatst</a:t>
+            </a:r>
             <a:endParaRPr lang="en-US" dirty="0"/>
           </a:p>
         </p:txBody>
@@ -916,7 +987,7 @@
           <a:p>
             <a:fld id="{0DF56419-AC34-45D0-BAB8-5A4CB1E563BF}" type="slidenum">
               <a:rPr lang="en-US" smtClean="0"/>
-              <a:t>25</a:t>
+              <a:t>23</a:t>
             </a:fld>
             <a:endParaRPr lang="en-US"/>
           </a:p>
@@ -925,7 +996,7 @@
     </p:spTree>
     <p:extLst>
       <p:ext uri="{BB962C8B-B14F-4D97-AF65-F5344CB8AC3E}">
-        <p14:creationId xmlns:p14="http://schemas.microsoft.com/office/powerpoint/2010/main" val="2009853299"/>
+        <p14:creationId xmlns:p14="http://schemas.microsoft.com/office/powerpoint/2010/main" val="3152353316"/>
       </p:ext>
     </p:extLst>
   </p:cSld>
@@ -981,185 +1052,31 @@
           <a:p>
             <a:r>
               <a:rPr lang="nl-BE" dirty="0" smtClean="0"/>
-              <a:t>1: view wordt </a:t>
-            </a:r>
-            <a:r>
-              <a:rPr lang="nl-BE" dirty="0" err="1" smtClean="0"/>
-              <a:t>gebind</a:t>
-            </a:r>
-            <a:r>
-              <a:rPr lang="nl-BE" dirty="0" smtClean="0"/>
-              <a:t> tegen huidige context</a:t>
-            </a:r>
-          </a:p>
-          <a:p>
-            <a:r>
-              <a:rPr lang="nl-BE" dirty="0" smtClean="0"/>
-              <a:t>2: </a:t>
-            </a:r>
-            <a:r>
-              <a:rPr lang="nl-BE" dirty="0" err="1" smtClean="0"/>
-              <a:t>id</a:t>
-            </a:r>
-            <a:r>
-              <a:rPr lang="nl-BE" dirty="0" smtClean="0"/>
-              <a:t> van een module</a:t>
-            </a:r>
-            <a:r>
-              <a:rPr lang="nl-BE" baseline="0" dirty="0" smtClean="0"/>
-              <a:t> (want geen view extension, bv .html)</a:t>
-            </a:r>
-            <a:r>
-              <a:rPr lang="nl-BE" dirty="0" smtClean="0"/>
-              <a:t>; module en</a:t>
-            </a:r>
-            <a:r>
-              <a:rPr lang="nl-BE" baseline="0" dirty="0" smtClean="0"/>
-              <a:t> view worden ingeladen en </a:t>
+              <a:t>Object</a:t>
+            </a:r>
+            <a:r>
+              <a:rPr lang="nl-BE" baseline="0" dirty="0" smtClean="0"/>
+              <a:t> </a:t>
             </a:r>
             <a:r>
               <a:rPr lang="nl-BE" baseline="0" dirty="0" err="1" smtClean="0"/>
-              <a:t>gebind</a:t>
-            </a:r>
-            <a:r>
-              <a:rPr lang="nl-BE" baseline="0" dirty="0" smtClean="0"/>
-              <a:t> aan elkaar</a:t>
-            </a:r>
-          </a:p>
-          <a:p>
-            <a:r>
-              <a:rPr lang="nl-BE" baseline="0" dirty="0" smtClean="0"/>
-              <a:t>3: een </a:t>
+              <a:t>composition</a:t>
+            </a:r>
+            <a:r>
+              <a:rPr lang="nl-BE" baseline="0" dirty="0" smtClean="0"/>
+              <a:t>: via </a:t>
             </a:r>
             <a:r>
               <a:rPr lang="nl-BE" baseline="0" dirty="0" err="1" smtClean="0"/>
-              <a:t>observable</a:t>
-            </a:r>
-            <a:r>
-              <a:rPr lang="nl-BE" baseline="0" dirty="0" smtClean="0"/>
-              <a:t>; interessant want wanneer </a:t>
-            </a:r>
-            <a:r>
-              <a:rPr lang="nl-BE" baseline="0" dirty="0" err="1" smtClean="0"/>
-              <a:t>observable</a:t>
-            </a:r>
-            <a:r>
-              <a:rPr lang="nl-BE" baseline="0" dirty="0" smtClean="0"/>
-              <a:t> verandert, verandert de DOM</a:t>
-            </a:r>
-          </a:p>
-          <a:p>
-            <a:r>
-              <a:rPr lang="nl-BE" baseline="0" dirty="0" smtClean="0"/>
-              <a:t>	indien een string</a:t>
-            </a:r>
-          </a:p>
-          <a:p>
-            <a:r>
-              <a:rPr lang="nl-BE" baseline="0" dirty="0" smtClean="0"/>
-              <a:t>		met view extension: view wordt ingeladen en </a:t>
-            </a:r>
-            <a:r>
-              <a:rPr lang="nl-BE" baseline="0" dirty="0" err="1" smtClean="0"/>
-              <a:t>gebind</a:t>
-            </a:r>
-            <a:r>
-              <a:rPr lang="nl-BE" baseline="0" dirty="0" smtClean="0"/>
-              <a:t> aan huidige context</a:t>
-            </a:r>
-          </a:p>
-          <a:p>
-            <a:r>
-              <a:rPr lang="nl-BE" baseline="0" dirty="0" smtClean="0"/>
-              <a:t>		indien een </a:t>
-            </a:r>
-            <a:r>
-              <a:rPr lang="nl-BE" baseline="0" dirty="0" err="1" smtClean="0"/>
-              <a:t>moduleid</a:t>
-            </a:r>
-            <a:r>
-              <a:rPr lang="nl-BE" baseline="0" dirty="0" smtClean="0"/>
-              <a:t>: module en view worden ingeladen en </a:t>
-            </a:r>
-            <a:r>
-              <a:rPr lang="nl-BE" baseline="0" dirty="0" err="1" smtClean="0"/>
-              <a:t>gebind</a:t>
-            </a:r>
-            <a:r>
-              <a:rPr lang="nl-BE" baseline="0" dirty="0" smtClean="0"/>
-              <a:t> aan elkaar</a:t>
-            </a:r>
-          </a:p>
-          <a:p>
-            <a:r>
-              <a:rPr lang="nl-BE" baseline="0" dirty="0" smtClean="0"/>
-              <a:t>	indien een object</a:t>
-            </a:r>
-          </a:p>
-          <a:p>
-            <a:r>
-              <a:rPr lang="nl-BE" baseline="0" dirty="0" smtClean="0"/>
-              <a:t>		bijpassende view wordt opgezocht, beiden worden aan elkaar </a:t>
-            </a:r>
-            <a:r>
-              <a:rPr lang="nl-BE" baseline="0" dirty="0" err="1" smtClean="0"/>
-              <a:t>gebind</a:t>
-            </a:r>
-            <a:endParaRPr lang="nl-BE" baseline="0" dirty="0" smtClean="0"/>
-          </a:p>
-          <a:p>
-            <a:r>
-              <a:rPr lang="nl-BE" baseline="0" dirty="0" smtClean="0"/>
-              <a:t>	indien een </a:t>
-            </a:r>
-            <a:r>
-              <a:rPr lang="nl-BE" baseline="0" dirty="0" err="1" smtClean="0"/>
-              <a:t>function</a:t>
-            </a:r>
-            <a:endParaRPr lang="nl-BE" baseline="0" dirty="0" smtClean="0"/>
-          </a:p>
-          <a:p>
-            <a:r>
-              <a:rPr lang="nl-BE" baseline="0" dirty="0" smtClean="0"/>
-              <a:t>		</a:t>
-            </a:r>
-            <a:r>
-              <a:rPr lang="nl-BE" baseline="0" dirty="0" err="1" smtClean="0"/>
-              <a:t>function</a:t>
-            </a:r>
-            <a:r>
-              <a:rPr lang="nl-BE" baseline="0" dirty="0" smtClean="0"/>
-              <a:t> wordt opgeroepen met new, view wordt gezocht voor object, binding</a:t>
-            </a:r>
-          </a:p>
-          <a:p>
-            <a:endParaRPr lang="nl-BE" baseline="0" dirty="0" smtClean="0"/>
-          </a:p>
-          <a:p>
-            <a:r>
-              <a:rPr lang="nl-BE" baseline="0" dirty="0" err="1" smtClean="0"/>
-              <a:t>Compose</a:t>
-            </a:r>
-            <a:r>
-              <a:rPr lang="nl-BE" baseline="0" dirty="0" smtClean="0"/>
-              <a:t> met object met view en/of model property: werkt in het algemeen zoals je zou verwachten</a:t>
-            </a:r>
-          </a:p>
-          <a:p>
-            <a:endParaRPr lang="nl-BE" baseline="0" dirty="0" smtClean="0"/>
-          </a:p>
-          <a:p>
-            <a:r>
-              <a:rPr lang="nl-BE" baseline="0" dirty="0" smtClean="0"/>
-              <a:t>Indien er iets niet lukt (bv geen view gevonden,…) </a:t>
-            </a:r>
-            <a:r>
-              <a:rPr lang="nl-BE" baseline="0" dirty="0" smtClean="0">
-                <a:sym typeface="Wingdings" panose="05000000000000000000" pitchFamily="2" charset="2"/>
-              </a:rPr>
-              <a:t> er zal niks in de DOM te zien zijn</a:t>
-            </a:r>
-            <a:endParaRPr lang="nl-BE" baseline="0" dirty="0" smtClean="0"/>
+              <a:t>RequireJS</a:t>
+            </a:r>
+            <a:r>
+              <a:rPr lang="nl-BE" baseline="0" dirty="0" smtClean="0"/>
+              <a:t> gewoon modules en hun afhankelijkheden</a:t>
+            </a:r>
+          </a:p>
+          <a:p>
+            <a:endParaRPr lang="en-US" dirty="0"/>
           </a:p>
         </p:txBody>
       </p:sp>
@@ -1180,7 +1097,7 @@
           <a:p>
             <a:fld id="{0DF56419-AC34-45D0-BAB8-5A4CB1E563BF}" type="slidenum">
               <a:rPr lang="en-US" smtClean="0"/>
-              <a:t>26</a:t>
+              <a:t>25</a:t>
             </a:fld>
             <a:endParaRPr lang="en-US"/>
           </a:p>
@@ -1189,7 +1106,7 @@
     </p:spTree>
     <p:extLst>
       <p:ext uri="{BB962C8B-B14F-4D97-AF65-F5344CB8AC3E}">
-        <p14:creationId xmlns:p14="http://schemas.microsoft.com/office/powerpoint/2010/main" val="2510050687"/>
+        <p14:creationId xmlns:p14="http://schemas.microsoft.com/office/powerpoint/2010/main" val="2009853299"/>
       </p:ext>
     </p:extLst>
   </p:cSld>
@@ -1245,47 +1162,147 @@
           <a:p>
             <a:r>
               <a:rPr lang="nl-BE" dirty="0" smtClean="0"/>
-              <a:t>Extra opties voor je </a:t>
-            </a:r>
-            <a:r>
-              <a:rPr lang="nl-BE" dirty="0" err="1" smtClean="0"/>
-              <a:t>compose</a:t>
-            </a:r>
-            <a:r>
-              <a:rPr lang="nl-BE" dirty="0" smtClean="0"/>
-              <a:t> binding.</a:t>
-            </a:r>
-          </a:p>
-          <a:p>
-            <a:r>
-              <a:rPr lang="nl-BE" dirty="0" err="1" smtClean="0"/>
-              <a:t>strategy</a:t>
-            </a:r>
-            <a:r>
-              <a:rPr lang="nl-BE" dirty="0" smtClean="0"/>
-              <a:t>:</a:t>
-            </a:r>
-            <a:r>
-              <a:rPr lang="nl-BE" baseline="0" dirty="0" smtClean="0"/>
-              <a:t> </a:t>
+              <a:t>1: view wordt </a:t>
+            </a:r>
+            <a:r>
+              <a:rPr lang="nl-BE" dirty="0" err="1" smtClean="0"/>
+              <a:t>gebind</a:t>
+            </a:r>
+            <a:r>
+              <a:rPr lang="nl-BE" dirty="0" smtClean="0"/>
+              <a:t> tegen huidige context</a:t>
+            </a:r>
+          </a:p>
+          <a:p>
+            <a:r>
+              <a:rPr lang="nl-BE" dirty="0" smtClean="0"/>
+              <a:t>2: </a:t>
+            </a:r>
+            <a:r>
+              <a:rPr lang="nl-BE" dirty="0" err="1" smtClean="0"/>
+              <a:t>id</a:t>
+            </a:r>
+            <a:r>
+              <a:rPr lang="nl-BE" dirty="0" smtClean="0"/>
+              <a:t> van een module</a:t>
+            </a:r>
+            <a:r>
+              <a:rPr lang="nl-BE" baseline="0" dirty="0" smtClean="0"/>
+              <a:t> (want geen view extension, bv .html)</a:t>
+            </a:r>
+            <a:r>
+              <a:rPr lang="nl-BE" dirty="0" smtClean="0"/>
+              <a:t>; module en</a:t>
+            </a:r>
+            <a:r>
+              <a:rPr lang="nl-BE" baseline="0" dirty="0" smtClean="0"/>
+              <a:t> view worden ingeladen en </a:t>
+            </a:r>
+            <a:r>
+              <a:rPr lang="nl-BE" baseline="0" dirty="0" err="1" smtClean="0"/>
+              <a:t>gebind</a:t>
+            </a:r>
+            <a:r>
+              <a:rPr lang="nl-BE" baseline="0" dirty="0" smtClean="0"/>
+              <a:t> aan elkaar</a:t>
+            </a:r>
+          </a:p>
+          <a:p>
+            <a:r>
+              <a:rPr lang="nl-BE" baseline="0" dirty="0" smtClean="0"/>
+              <a:t>3: een </a:t>
+            </a:r>
+            <a:r>
+              <a:rPr lang="nl-BE" baseline="0" dirty="0" err="1" smtClean="0"/>
+              <a:t>observable</a:t>
+            </a:r>
+            <a:r>
+              <a:rPr lang="nl-BE" baseline="0" dirty="0" smtClean="0"/>
+              <a:t>; interessant want wanneer </a:t>
+            </a:r>
+            <a:r>
+              <a:rPr lang="nl-BE" baseline="0" dirty="0" err="1" smtClean="0"/>
+              <a:t>observable</a:t>
+            </a:r>
+            <a:r>
+              <a:rPr lang="nl-BE" baseline="0" dirty="0" smtClean="0"/>
+              <a:t> verandert, verandert de DOM</a:t>
+            </a:r>
+          </a:p>
+          <a:p>
+            <a:r>
+              <a:rPr lang="nl-BE" baseline="0" dirty="0" smtClean="0"/>
+              <a:t>	indien een string</a:t>
+            </a:r>
+          </a:p>
+          <a:p>
+            <a:r>
+              <a:rPr lang="nl-BE" baseline="0" dirty="0" smtClean="0"/>
+              <a:t>		met view extension: view wordt ingeladen en </a:t>
+            </a:r>
+            <a:r>
+              <a:rPr lang="nl-BE" baseline="0" dirty="0" err="1" smtClean="0"/>
+              <a:t>gebind</a:t>
+            </a:r>
+            <a:r>
+              <a:rPr lang="nl-BE" baseline="0" dirty="0" smtClean="0"/>
+              <a:t> aan huidige context</a:t>
+            </a:r>
+          </a:p>
+          <a:p>
+            <a:r>
+              <a:rPr lang="nl-BE" baseline="0" dirty="0" smtClean="0"/>
+              <a:t>		indien een </a:t>
+            </a:r>
+            <a:r>
+              <a:rPr lang="nl-BE" baseline="0" dirty="0" err="1" smtClean="0"/>
+              <a:t>moduleid</a:t>
+            </a:r>
+            <a:r>
+              <a:rPr lang="nl-BE" baseline="0" dirty="0" smtClean="0"/>
+              <a:t>: module en view worden ingeladen en </a:t>
+            </a:r>
+            <a:r>
+              <a:rPr lang="nl-BE" baseline="0" dirty="0" err="1" smtClean="0"/>
+              <a:t>gebind</a:t>
+            </a:r>
+            <a:r>
+              <a:rPr lang="nl-BE" baseline="0" dirty="0" smtClean="0"/>
+              <a:t> aan elkaar</a:t>
+            </a:r>
+          </a:p>
+          <a:p>
+            <a:r>
+              <a:rPr lang="nl-BE" baseline="0" dirty="0" smtClean="0"/>
+              <a:t>	indien een object</a:t>
+            </a:r>
+          </a:p>
+          <a:p>
+            <a:r>
+              <a:rPr lang="nl-BE" baseline="0" dirty="0" smtClean="0"/>
+              <a:t>		bijpassende view wordt opgezocht, beiden worden aan elkaar </a:t>
+            </a:r>
+            <a:r>
+              <a:rPr lang="nl-BE" baseline="0" dirty="0" err="1" smtClean="0"/>
+              <a:t>gebind</a:t>
+            </a:r>
+            <a:endParaRPr lang="nl-BE" baseline="0" dirty="0" smtClean="0"/>
+          </a:p>
+          <a:p>
+            <a:r>
+              <a:rPr lang="nl-BE" baseline="0" dirty="0" smtClean="0"/>
+              <a:t>	indien een </a:t>
             </a:r>
             <a:r>
               <a:rPr lang="nl-BE" baseline="0" dirty="0" err="1" smtClean="0"/>
               <a:t>function</a:t>
             </a:r>
-            <a:r>
-              <a:rPr lang="nl-BE" baseline="0" dirty="0" smtClean="0"/>
-              <a:t> om view te vinden indien niet gegeven</a:t>
-            </a:r>
-          </a:p>
-          <a:p>
-            <a:r>
-              <a:rPr lang="nl-BE" baseline="0" dirty="0" err="1" smtClean="0"/>
-              <a:t>transition</a:t>
-            </a:r>
-            <a:r>
-              <a:rPr lang="nl-BE" baseline="0" dirty="0" smtClean="0"/>
-              <a:t>: </a:t>
+            <a:endParaRPr lang="nl-BE" baseline="0" dirty="0" smtClean="0"/>
+          </a:p>
+          <a:p>
+            <a:r>
+              <a:rPr lang="nl-BE" baseline="0" dirty="0" smtClean="0"/>
+              <a:t>		</a:t>
             </a:r>
             <a:r>
               <a:rPr lang="nl-BE" baseline="0" dirty="0" err="1" smtClean="0"/>
@@ -1293,51 +1310,20 @@
             </a:r>
             <a:r>
               <a:rPr lang="nl-BE" baseline="0" dirty="0" smtClean="0"/>
-              <a:t> om wijziging van views in DOM te animeren</a:t>
-            </a:r>
+              <a:t> wordt opgeroepen met new, view wordt gezocht voor object, binding</a:t>
+            </a:r>
+          </a:p>
+          <a:p>
+            <a:endParaRPr lang="nl-BE" baseline="0" dirty="0" smtClean="0"/>
           </a:p>
           <a:p>
             <a:r>
               <a:rPr lang="nl-BE" baseline="0" dirty="0" err="1" smtClean="0"/>
-              <a:t>cacheViews</a:t>
-            </a:r>
-            <a:r>
-              <a:rPr lang="nl-BE" baseline="0" dirty="0" smtClean="0"/>
-              <a:t>: views worden bijgehouden en hergebruikt indien binding op hetzelfde object gebeurt</a:t>
-            </a:r>
-          </a:p>
-          <a:p>
-            <a:r>
-              <a:rPr lang="nl-BE" baseline="0" dirty="0" err="1" smtClean="0"/>
-              <a:t>activate</a:t>
-            </a:r>
-            <a:r>
-              <a:rPr lang="nl-BE" baseline="0" dirty="0" smtClean="0"/>
-              <a:t>: indien </a:t>
-            </a:r>
-            <a:r>
-              <a:rPr lang="nl-BE" baseline="0" dirty="0" err="1" smtClean="0"/>
-              <a:t>activate</a:t>
-            </a:r>
-            <a:r>
-              <a:rPr lang="nl-BE" baseline="0" dirty="0" smtClean="0"/>
-              <a:t> op je viewmodel niet </a:t>
-            </a:r>
-            <a:r>
-              <a:rPr lang="nl-BE" baseline="0" dirty="0" err="1" smtClean="0"/>
-              <a:t>gecalled</a:t>
-            </a:r>
-            <a:r>
-              <a:rPr lang="nl-BE" baseline="0" dirty="0" smtClean="0"/>
-              <a:t> moet worden (default: </a:t>
-            </a:r>
-            <a:r>
-              <a:rPr lang="nl-BE" baseline="0" dirty="0" err="1" smtClean="0"/>
-              <a:t>true</a:t>
-            </a:r>
-            <a:r>
-              <a:rPr lang="nl-BE" baseline="0" dirty="0" smtClean="0"/>
-              <a:t>)</a:t>
+              <a:t>Compose</a:t>
+            </a:r>
+            <a:r>
+              <a:rPr lang="nl-BE" baseline="0" dirty="0" smtClean="0"/>
+              <a:t> met object met view en/of model property: werkt in het algemeen zoals je zou verwachten</a:t>
             </a:r>
           </a:p>
           <a:p>
@@ -1346,41 +1332,28 @@
           <a:p>
             <a:r>
               <a:rPr lang="nl-BE" baseline="0" dirty="0" smtClean="0"/>
-              <a:t>Veel extra mogelijkheden. De </a:t>
-            </a:r>
-            <a:r>
-              <a:rPr lang="nl-BE" baseline="0" dirty="0" err="1" smtClean="0"/>
-              <a:t>composition</a:t>
-            </a:r>
-            <a:r>
-              <a:rPr lang="nl-BE" baseline="0" dirty="0" smtClean="0"/>
-              <a:t> </a:t>
-            </a:r>
-            <a:r>
-              <a:rPr lang="nl-BE" baseline="0" dirty="0" err="1" smtClean="0"/>
-              <a:t>lifecycle</a:t>
-            </a:r>
-            <a:r>
-              <a:rPr lang="nl-BE" baseline="0" dirty="0" smtClean="0"/>
-              <a:t> laat je toe om in te pikken op de verschillende momenten van </a:t>
-            </a:r>
-            <a:r>
-              <a:rPr lang="nl-BE" baseline="0" dirty="0" err="1" smtClean="0"/>
-              <a:t>composition</a:t>
-            </a:r>
-            <a:r>
-              <a:rPr lang="nl-BE" baseline="0" dirty="0" smtClean="0"/>
-              <a:t>. Een beetje zoals ASP.NET page </a:t>
-            </a:r>
-            <a:r>
-              <a:rPr lang="nl-BE" baseline="0" dirty="0" err="1" smtClean="0"/>
-              <a:t>lifecycle</a:t>
-            </a:r>
-            <a:r>
-              <a:rPr lang="nl-BE" baseline="0" dirty="0" smtClean="0"/>
-              <a:t>. Bestaat uit:</a:t>
-            </a:r>
-            <a:endParaRPr lang="en-US" dirty="0"/>
+              <a:t>Indien er iets niet lukt (bv geen view gevonden,…) </a:t>
+            </a:r>
+            <a:r>
+              <a:rPr lang="nl-BE" baseline="0" dirty="0" smtClean="0">
+                <a:sym typeface="Wingdings" panose="05000000000000000000" pitchFamily="2" charset="2"/>
+              </a:rPr>
+              <a:t> er zal niks in de DOM te zien zijn</a:t>
+            </a:r>
+          </a:p>
+          <a:p>
+            <a:endParaRPr lang="nl-BE" baseline="0" dirty="0" smtClean="0">
+              <a:sym typeface="Wingdings" panose="05000000000000000000" pitchFamily="2" charset="2"/>
+            </a:endParaRPr>
+          </a:p>
+          <a:p>
+            <a:r>
+              <a:rPr lang="nl-BE" baseline="0" dirty="0" smtClean="0">
+                <a:sym typeface="Wingdings" panose="05000000000000000000" pitchFamily="2" charset="2"/>
+              </a:rPr>
+              <a:t>In demo: home.html en beers.html</a:t>
+            </a:r>
+            <a:endParaRPr lang="nl-BE" baseline="0" dirty="0" smtClean="0"/>
           </a:p>
         </p:txBody>
       </p:sp>
@@ -1401,7 +1374,7 @@
           <a:p>
             <a:fld id="{0DF56419-AC34-45D0-BAB8-5A4CB1E563BF}" type="slidenum">
               <a:rPr lang="en-US" smtClean="0"/>
-              <a:t>27</a:t>
+              <a:t>26</a:t>
             </a:fld>
             <a:endParaRPr lang="en-US"/>
           </a:p>
@@ -1410,7 +1383,7 @@
     </p:spTree>
     <p:extLst>
       <p:ext uri="{BB962C8B-B14F-4D97-AF65-F5344CB8AC3E}">
-        <p14:creationId xmlns:p14="http://schemas.microsoft.com/office/powerpoint/2010/main" val="1389305066"/>
+        <p14:creationId xmlns:p14="http://schemas.microsoft.com/office/powerpoint/2010/main" val="2510050687"/>
       </p:ext>
     </p:extLst>
   </p:cSld>
@@ -1465,24 +1438,149 @@
           <a:lstStyle/>
           <a:p>
             <a:r>
-              <a:rPr lang="nl-BE" dirty="0" err="1" smtClean="0"/>
-              <a:t>urlArgs</a:t>
-            </a:r>
-            <a:r>
-              <a:rPr lang="nl-BE" dirty="0" smtClean="0"/>
-              <a:t> worden toegevoegd</a:t>
-            </a:r>
-            <a:r>
-              <a:rPr lang="nl-BE" baseline="0" dirty="0" smtClean="0"/>
-              <a:t> aan iedere </a:t>
+              <a:rPr lang="nl-BE" dirty="0" smtClean="0"/>
+              <a:t>Extra opties voor je </a:t>
+            </a:r>
+            <a:r>
+              <a:rPr lang="nl-BE" dirty="0" err="1" smtClean="0"/>
+              <a:t>compose</a:t>
+            </a:r>
+            <a:r>
+              <a:rPr lang="nl-BE" dirty="0" smtClean="0"/>
+              <a:t> binding.</a:t>
+            </a:r>
+          </a:p>
+          <a:p>
+            <a:r>
+              <a:rPr lang="nl-BE" dirty="0" err="1" smtClean="0"/>
+              <a:t>strategy</a:t>
+            </a:r>
+            <a:r>
+              <a:rPr lang="nl-BE" dirty="0" smtClean="0"/>
+              <a:t>:</a:t>
+            </a:r>
+            <a:r>
+              <a:rPr lang="nl-BE" baseline="0" dirty="0" smtClean="0"/>
+              <a:t> </a:t>
             </a:r>
             <a:r>
               <a:rPr lang="nl-BE" baseline="0" dirty="0" err="1" smtClean="0"/>
-              <a:t>request</a:t>
-            </a:r>
-            <a:r>
-              <a:rPr lang="nl-BE" baseline="0" dirty="0" smtClean="0"/>
-              <a:t>, best niet in productie zetten</a:t>
+              <a:t>function</a:t>
+            </a:r>
+            <a:r>
+              <a:rPr lang="nl-BE" baseline="0" dirty="0" smtClean="0"/>
+              <a:t> om view te vinden indien niet gegeven</a:t>
+            </a:r>
+          </a:p>
+          <a:p>
+            <a:r>
+              <a:rPr lang="nl-BE" baseline="0" dirty="0" err="1" smtClean="0"/>
+              <a:t>transition</a:t>
+            </a:r>
+            <a:r>
+              <a:rPr lang="nl-BE" baseline="0" dirty="0" smtClean="0"/>
+              <a:t>: </a:t>
+            </a:r>
+            <a:r>
+              <a:rPr lang="nl-BE" baseline="0" dirty="0" err="1" smtClean="0"/>
+              <a:t>function</a:t>
+            </a:r>
+            <a:r>
+              <a:rPr lang="nl-BE" baseline="0" dirty="0" smtClean="0"/>
+              <a:t> om wijziging van views in DOM te animeren, je kan je eigen </a:t>
+            </a:r>
+            <a:r>
+              <a:rPr lang="nl-BE" baseline="0" dirty="0" err="1" smtClean="0"/>
+              <a:t>transitions</a:t>
+            </a:r>
+            <a:r>
+              <a:rPr lang="nl-BE" baseline="0" dirty="0" smtClean="0"/>
+              <a:t> definiëren</a:t>
+            </a:r>
+          </a:p>
+          <a:p>
+            <a:r>
+              <a:rPr lang="nl-BE" baseline="0" dirty="0" err="1" smtClean="0"/>
+              <a:t>cacheViews</a:t>
+            </a:r>
+            <a:r>
+              <a:rPr lang="nl-BE" baseline="0" dirty="0" smtClean="0"/>
+              <a:t>: views worden bijgehouden en hergebruikt indien binding op hetzelfde object gebeurt</a:t>
+            </a:r>
+          </a:p>
+          <a:p>
+            <a:r>
+              <a:rPr lang="nl-BE" baseline="0" dirty="0" err="1" smtClean="0"/>
+              <a:t>activate</a:t>
+            </a:r>
+            <a:r>
+              <a:rPr lang="nl-BE" baseline="0" dirty="0" smtClean="0"/>
+              <a:t>: indien </a:t>
+            </a:r>
+            <a:r>
+              <a:rPr lang="nl-BE" baseline="0" dirty="0" err="1" smtClean="0"/>
+              <a:t>activate</a:t>
+            </a:r>
+            <a:r>
+              <a:rPr lang="nl-BE" baseline="0" dirty="0" smtClean="0"/>
+              <a:t> op je viewmodel niet </a:t>
+            </a:r>
+            <a:r>
+              <a:rPr lang="nl-BE" baseline="0" dirty="0" err="1" smtClean="0"/>
+              <a:t>gecalled</a:t>
+            </a:r>
+            <a:r>
+              <a:rPr lang="nl-BE" baseline="0" dirty="0" smtClean="0"/>
+              <a:t> moet worden (default: </a:t>
+            </a:r>
+            <a:r>
+              <a:rPr lang="nl-BE" baseline="0" dirty="0" err="1" smtClean="0"/>
+              <a:t>true</a:t>
+            </a:r>
+            <a:r>
+              <a:rPr lang="nl-BE" baseline="0" dirty="0" smtClean="0"/>
+              <a:t>)</a:t>
+            </a:r>
+          </a:p>
+          <a:p>
+            <a:endParaRPr lang="nl-BE" baseline="0" dirty="0" smtClean="0"/>
+          </a:p>
+          <a:p>
+            <a:r>
+              <a:rPr lang="nl-BE" baseline="0" dirty="0" smtClean="0"/>
+              <a:t>Veel extra mogelijkheden. De </a:t>
+            </a:r>
+            <a:r>
+              <a:rPr lang="nl-BE" baseline="0" dirty="0" err="1" smtClean="0"/>
+              <a:t>composition</a:t>
+            </a:r>
+            <a:r>
+              <a:rPr lang="nl-BE" baseline="0" dirty="0" smtClean="0"/>
+              <a:t> </a:t>
+            </a:r>
+            <a:r>
+              <a:rPr lang="nl-BE" baseline="0" dirty="0" err="1" smtClean="0"/>
+              <a:t>lifecycle</a:t>
+            </a:r>
+            <a:r>
+              <a:rPr lang="nl-BE" baseline="0" dirty="0" smtClean="0"/>
+              <a:t> laat je toe om in te pikken op de verschillende momenten van </a:t>
+            </a:r>
+            <a:r>
+              <a:rPr lang="nl-BE" baseline="0" dirty="0" err="1" smtClean="0"/>
+              <a:t>composition</a:t>
+            </a:r>
+            <a:r>
+              <a:rPr lang="nl-BE" baseline="0" dirty="0" smtClean="0"/>
+              <a:t>. Een beetje zoals ASP.NET page </a:t>
+            </a:r>
+            <a:r>
+              <a:rPr lang="nl-BE" baseline="0" dirty="0" err="1" smtClean="0"/>
+              <a:t>lifecycle</a:t>
+            </a:r>
+            <a:r>
+              <a:rPr lang="nl-BE" baseline="0" dirty="0" smtClean="0"/>
+              <a:t>. Bestaat uit:</a:t>
             </a:r>
             <a:endParaRPr lang="en-US" dirty="0"/>
           </a:p>
@@ -1505,7 +1603,7 @@
           <a:p>
             <a:fld id="{0DF56419-AC34-45D0-BAB8-5A4CB1E563BF}" type="slidenum">
               <a:rPr lang="en-US" smtClean="0"/>
-              <a:t>28</a:t>
+              <a:t>27</a:t>
             </a:fld>
             <a:endParaRPr lang="en-US"/>
           </a:p>
@@ -1514,7 +1612,7 @@
     </p:spTree>
     <p:extLst>
       <p:ext uri="{BB962C8B-B14F-4D97-AF65-F5344CB8AC3E}">
-        <p14:creationId xmlns:p14="http://schemas.microsoft.com/office/powerpoint/2010/main" val="1213175449"/>
+        <p14:creationId xmlns:p14="http://schemas.microsoft.com/office/powerpoint/2010/main" val="1389305066"/>
       </p:ext>
     </p:extLst>
   </p:cSld>
@@ -1570,38 +1668,25 @@
           <a:p>
             <a:r>
               <a:rPr lang="nl-BE" dirty="0" err="1" smtClean="0"/>
-              <a:t>showMessage</a:t>
-            </a:r>
-            <a:r>
-              <a:rPr lang="nl-BE" dirty="0" smtClean="0"/>
-              <a:t> voorbeeld bij</a:t>
-            </a:r>
-            <a:r>
-              <a:rPr lang="nl-BE" baseline="0" dirty="0" smtClean="0"/>
-              <a:t> verwijderen van een bier</a:t>
-            </a:r>
-          </a:p>
-          <a:p>
-            <a:r>
-              <a:rPr lang="nl-BE" baseline="0" dirty="0" smtClean="0"/>
-              <a:t>Ook mogelijk om je eigen </a:t>
+              <a:t>urlArgs</a:t>
+            </a:r>
+            <a:r>
+              <a:rPr lang="nl-BE" dirty="0" smtClean="0"/>
+              <a:t> worden toegevoegd</a:t>
+            </a:r>
+            <a:r>
+              <a:rPr lang="nl-BE" baseline="0" dirty="0" smtClean="0"/>
+              <a:t> aan iedere </a:t>
             </a:r>
             <a:r>
               <a:rPr lang="nl-BE" baseline="0" dirty="0" err="1" smtClean="0"/>
-              <a:t>dialog</a:t>
-            </a:r>
-            <a:r>
-              <a:rPr lang="nl-BE" baseline="0" dirty="0" smtClean="0"/>
-              <a:t> te ontwerpen voor </a:t>
-            </a:r>
-            <a:r>
-              <a:rPr lang="nl-BE" baseline="0" dirty="0" err="1" smtClean="0"/>
-              <a:t>showDialog</a:t>
-            </a:r>
-            <a:r>
-              <a:rPr lang="nl-BE" baseline="0" dirty="0" smtClean="0"/>
-              <a:t>, zie search</a:t>
-            </a:r>
+              <a:t>request</a:t>
+            </a:r>
+            <a:r>
+              <a:rPr lang="nl-BE" baseline="0" dirty="0" smtClean="0"/>
+              <a:t>, best niet in productie zetten</a:t>
+            </a:r>
+            <a:endParaRPr lang="en-US" dirty="0"/>
           </a:p>
         </p:txBody>
       </p:sp>
@@ -1622,7 +1707,7 @@
           <a:p>
             <a:fld id="{0DF56419-AC34-45D0-BAB8-5A4CB1E563BF}" type="slidenum">
               <a:rPr lang="en-US" smtClean="0"/>
-              <a:t>29</a:t>
+              <a:t>28</a:t>
             </a:fld>
             <a:endParaRPr lang="en-US"/>
           </a:p>
@@ -1631,7 +1716,7 @@
     </p:spTree>
     <p:extLst>
       <p:ext uri="{BB962C8B-B14F-4D97-AF65-F5344CB8AC3E}">
-        <p14:creationId xmlns:p14="http://schemas.microsoft.com/office/powerpoint/2010/main" val="3055863286"/>
+        <p14:creationId xmlns:p14="http://schemas.microsoft.com/office/powerpoint/2010/main" val="1213175449"/>
       </p:ext>
     </p:extLst>
   </p:cSld>
@@ -1687,44 +1772,38 @@
           <a:p>
             <a:r>
               <a:rPr lang="nl-BE" dirty="0" err="1" smtClean="0"/>
-              <a:t>applicationHost</a:t>
-            </a:r>
-            <a:r>
-              <a:rPr lang="nl-BE" dirty="0" smtClean="0"/>
-              <a:t> is waar alles in gebeurt, hierin</a:t>
-            </a:r>
-            <a:r>
-              <a:rPr lang="nl-BE" baseline="0" dirty="0" smtClean="0"/>
-              <a:t> plaatst </a:t>
+              <a:t>showMessage</a:t>
+            </a:r>
+            <a:r>
+              <a:rPr lang="nl-BE" dirty="0" smtClean="0"/>
+              <a:t> voorbeeld bij</a:t>
+            </a:r>
+            <a:r>
+              <a:rPr lang="nl-BE" baseline="0" dirty="0" smtClean="0"/>
+              <a:t> verwijderen van een bier</a:t>
+            </a:r>
+          </a:p>
+          <a:p>
+            <a:r>
+              <a:rPr lang="nl-BE" baseline="0" dirty="0" smtClean="0"/>
+              <a:t>Ook mogelijk om je eigen </a:t>
             </a:r>
             <a:r>
               <a:rPr lang="nl-BE" baseline="0" dirty="0" err="1" smtClean="0"/>
-              <a:t>Durandal</a:t>
-            </a:r>
-            <a:r>
-              <a:rPr lang="nl-BE" baseline="0" dirty="0" smtClean="0"/>
-              <a:t> je views</a:t>
-            </a:r>
-            <a:endParaRPr lang="nl-BE" dirty="0" smtClean="0"/>
-          </a:p>
-          <a:p>
-            <a:r>
-              <a:rPr lang="nl-BE" dirty="0" smtClean="0"/>
-              <a:t>HTML die er al in staat wordt overschreven,</a:t>
-            </a:r>
-            <a:r>
-              <a:rPr lang="nl-BE" baseline="0" dirty="0" smtClean="0"/>
-              <a:t> maar kan als </a:t>
+              <a:t>dialog</a:t>
+            </a:r>
+            <a:r>
+              <a:rPr lang="nl-BE" baseline="0" dirty="0" smtClean="0"/>
+              <a:t> te ontwerpen voor </a:t>
             </a:r>
             <a:r>
               <a:rPr lang="nl-BE" baseline="0" dirty="0" err="1" smtClean="0"/>
-              <a:t>splashscreen</a:t>
-            </a:r>
-            <a:r>
-              <a:rPr lang="nl-BE" baseline="0" dirty="0" smtClean="0"/>
-              <a:t> dienen (deze techniek kan overal toegepast worden)</a:t>
-            </a:r>
-            <a:endParaRPr lang="en-US" dirty="0"/>
+              <a:t>showDialog</a:t>
+            </a:r>
+            <a:r>
+              <a:rPr lang="nl-BE" baseline="0" dirty="0" smtClean="0"/>
+              <a:t>, zie search</a:t>
+            </a:r>
           </a:p>
         </p:txBody>
       </p:sp>
@@ -1745,7 +1824,7 @@
           <a:p>
             <a:fld id="{0DF56419-AC34-45D0-BAB8-5A4CB1E563BF}" type="slidenum">
               <a:rPr lang="en-US" smtClean="0"/>
-              <a:t>30</a:t>
+              <a:t>29</a:t>
             </a:fld>
             <a:endParaRPr lang="en-US"/>
           </a:p>
@@ -1754,7 +1833,7 @@
     </p:spTree>
     <p:extLst>
       <p:ext uri="{BB962C8B-B14F-4D97-AF65-F5344CB8AC3E}">
-        <p14:creationId xmlns:p14="http://schemas.microsoft.com/office/powerpoint/2010/main" val="1795069426"/>
+        <p14:creationId xmlns:p14="http://schemas.microsoft.com/office/powerpoint/2010/main" val="3055863286"/>
       </p:ext>
     </p:extLst>
   </p:cSld>
@@ -1808,6 +1887,45 @@
           <a:bodyPr/>
           <a:lstStyle/>
           <a:p>
+            <a:r>
+              <a:rPr lang="nl-BE" dirty="0" err="1" smtClean="0"/>
+              <a:t>applicationHost</a:t>
+            </a:r>
+            <a:r>
+              <a:rPr lang="nl-BE" dirty="0" smtClean="0"/>
+              <a:t> is waar alles in gebeurt, hierin</a:t>
+            </a:r>
+            <a:r>
+              <a:rPr lang="nl-BE" baseline="0" dirty="0" smtClean="0"/>
+              <a:t> plaatst </a:t>
+            </a:r>
+            <a:r>
+              <a:rPr lang="nl-BE" baseline="0" dirty="0" err="1" smtClean="0"/>
+              <a:t>Durandal</a:t>
+            </a:r>
+            <a:r>
+              <a:rPr lang="nl-BE" baseline="0" dirty="0" smtClean="0"/>
+              <a:t> je views</a:t>
+            </a:r>
+            <a:endParaRPr lang="nl-BE" dirty="0" smtClean="0"/>
+          </a:p>
+          <a:p>
+            <a:r>
+              <a:rPr lang="nl-BE" dirty="0" smtClean="0"/>
+              <a:t>HTML die er al in staat wordt overschreven,</a:t>
+            </a:r>
+            <a:r>
+              <a:rPr lang="nl-BE" baseline="0" dirty="0" smtClean="0"/>
+              <a:t> maar kan als </a:t>
+            </a:r>
+            <a:r>
+              <a:rPr lang="nl-BE" baseline="0" dirty="0" err="1" smtClean="0"/>
+              <a:t>splashscreen</a:t>
+            </a:r>
+            <a:r>
+              <a:rPr lang="nl-BE" baseline="0" dirty="0" smtClean="0"/>
+              <a:t> dienen (deze techniek kan overal toegepast worden)</a:t>
+            </a:r>
             <a:endParaRPr lang="en-US" dirty="0"/>
           </a:p>
         </p:txBody>
@@ -1829,7 +1947,7 @@
           <a:p>
             <a:fld id="{0DF56419-AC34-45D0-BAB8-5A4CB1E563BF}" type="slidenum">
               <a:rPr lang="en-US" smtClean="0"/>
-              <a:t>31</a:t>
+              <a:t>30</a:t>
             </a:fld>
             <a:endParaRPr lang="en-US"/>
           </a:p>
@@ -1838,7 +1956,7 @@
     </p:spTree>
     <p:extLst>
       <p:ext uri="{BB962C8B-B14F-4D97-AF65-F5344CB8AC3E}">
-        <p14:creationId xmlns:p14="http://schemas.microsoft.com/office/powerpoint/2010/main" val="2754514785"/>
+        <p14:creationId xmlns:p14="http://schemas.microsoft.com/office/powerpoint/2010/main" val="1795069426"/>
       </p:ext>
     </p:extLst>
   </p:cSld>
@@ -1892,379 +2010,6 @@
           <a:bodyPr/>
           <a:lstStyle/>
           <a:p>
-            <a:r>
-              <a:rPr lang="nl-BE" dirty="0" smtClean="0"/>
-              <a:t>Router </a:t>
-            </a:r>
-            <a:r>
-              <a:rPr lang="nl-BE" dirty="0" err="1" smtClean="0"/>
-              <a:t>mappings</a:t>
-            </a:r>
-            <a:r>
-              <a:rPr lang="nl-BE" dirty="0" smtClean="0"/>
-              <a:t>:</a:t>
-            </a:r>
-          </a:p>
-          <a:p>
-            <a:r>
-              <a:rPr lang="nl-BE" dirty="0" smtClean="0"/>
-              <a:t>	route:</a:t>
-            </a:r>
-            <a:r>
-              <a:rPr lang="nl-BE" baseline="0" dirty="0" smtClean="0"/>
-              <a:t> wat in de </a:t>
-            </a:r>
-            <a:r>
-              <a:rPr lang="nl-BE" baseline="0" dirty="0" err="1" smtClean="0"/>
-              <a:t>url</a:t>
-            </a:r>
-            <a:r>
-              <a:rPr lang="nl-BE" baseline="0" dirty="0" smtClean="0"/>
-              <a:t> te zien is, leeg is de default route</a:t>
-            </a:r>
-          </a:p>
-          <a:p>
-            <a:r>
-              <a:rPr lang="nl-BE" baseline="0" dirty="0" smtClean="0"/>
-              <a:t>	</a:t>
-            </a:r>
-            <a:r>
-              <a:rPr lang="nl-BE" baseline="0" dirty="0" err="1" smtClean="0"/>
-              <a:t>title</a:t>
-            </a:r>
-            <a:r>
-              <a:rPr lang="nl-BE" baseline="0" dirty="0" smtClean="0"/>
-              <a:t>: gebruikt voor </a:t>
-            </a:r>
-            <a:r>
-              <a:rPr lang="nl-BE" baseline="0" dirty="0" err="1" smtClean="0"/>
-              <a:t>document.title</a:t>
-            </a:r>
-            <a:endParaRPr lang="nl-BE" baseline="0" dirty="0" smtClean="0"/>
-          </a:p>
-          <a:p>
-            <a:r>
-              <a:rPr lang="nl-BE" baseline="0" dirty="0" smtClean="0"/>
-              <a:t>	</a:t>
-            </a:r>
-            <a:r>
-              <a:rPr lang="nl-BE" baseline="0" dirty="0" err="1" smtClean="0"/>
-              <a:t>moduleId</a:t>
-            </a:r>
-            <a:r>
-              <a:rPr lang="nl-BE" baseline="0" dirty="0" smtClean="0"/>
-              <a:t>: </a:t>
-            </a:r>
-            <a:r>
-              <a:rPr lang="nl-BE" baseline="0" dirty="0" err="1" smtClean="0"/>
-              <a:t>id</a:t>
-            </a:r>
-            <a:r>
-              <a:rPr lang="nl-BE" baseline="0" dirty="0" smtClean="0"/>
-              <a:t> van je module, ook gebruikt om viewmodel op te sporen (en daarna bijbehorende view)</a:t>
-            </a:r>
-          </a:p>
-          <a:p>
-            <a:r>
-              <a:rPr lang="nl-BE" baseline="0" dirty="0" smtClean="0"/>
-              <a:t>	</a:t>
-            </a:r>
-            <a:r>
-              <a:rPr lang="nl-BE" baseline="0" dirty="0" err="1" smtClean="0"/>
-              <a:t>nav</a:t>
-            </a:r>
-            <a:r>
-              <a:rPr lang="nl-BE" baseline="0" dirty="0" smtClean="0"/>
-              <a:t>: of het opgenomen moet worden </a:t>
-            </a:r>
-            <a:r>
-              <a:rPr lang="nl-BE" baseline="0" smtClean="0"/>
-              <a:t>in router.navigationModel (true/false) of de volgorde (int)</a:t>
-            </a:r>
-            <a:endParaRPr lang="nl-BE" baseline="0" dirty="0" smtClean="0"/>
-          </a:p>
-          <a:p>
-            <a:endParaRPr lang="nl-BE" baseline="0" dirty="0" smtClean="0"/>
-          </a:p>
-          <a:p>
-            <a:r>
-              <a:rPr lang="nl-BE" baseline="0" dirty="0" smtClean="0"/>
-              <a:t>	parameters: </a:t>
-            </a:r>
-            <a:r>
-              <a:rPr lang="nl-BE" baseline="0" dirty="0" err="1" smtClean="0"/>
-              <a:t>myRoute</a:t>
-            </a:r>
-            <a:r>
-              <a:rPr lang="nl-BE" baseline="0" dirty="0" smtClean="0"/>
-              <a:t>/:</a:t>
-            </a:r>
-            <a:r>
-              <a:rPr lang="nl-BE" baseline="0" dirty="0" err="1" smtClean="0"/>
-              <a:t>id</a:t>
-            </a:r>
-            <a:r>
-              <a:rPr lang="nl-BE" baseline="0" dirty="0" smtClean="0"/>
-              <a:t> of indien optioneel: </a:t>
-            </a:r>
-            <a:r>
-              <a:rPr lang="nl-BE" baseline="0" dirty="0" err="1" smtClean="0"/>
-              <a:t>myRoute</a:t>
-            </a:r>
-            <a:r>
-              <a:rPr lang="nl-BE" baseline="0" dirty="0" smtClean="0"/>
-              <a:t>(/:</a:t>
-            </a:r>
-            <a:r>
-              <a:rPr lang="nl-BE" baseline="0" dirty="0" err="1" smtClean="0"/>
-              <a:t>id</a:t>
-            </a:r>
-            <a:r>
-              <a:rPr lang="nl-BE" baseline="0" dirty="0" smtClean="0"/>
-              <a:t>)</a:t>
-            </a:r>
-          </a:p>
-          <a:p>
-            <a:r>
-              <a:rPr lang="nl-BE" baseline="0" dirty="0" smtClean="0"/>
-              <a:t>		meerdere parameters zijn mogelijk, volgorde wordt bewaard in </a:t>
-            </a:r>
-            <a:r>
-              <a:rPr lang="nl-BE" baseline="0" dirty="0" err="1" smtClean="0"/>
-              <a:t>activate</a:t>
-            </a:r>
-            <a:r>
-              <a:rPr lang="nl-BE" baseline="0" dirty="0" smtClean="0"/>
-              <a:t> call</a:t>
-            </a:r>
-          </a:p>
-          <a:p>
-            <a:r>
-              <a:rPr lang="nl-BE" baseline="0" dirty="0" smtClean="0"/>
-              <a:t>		</a:t>
-            </a:r>
-            <a:r>
-              <a:rPr lang="nl-BE" baseline="0" dirty="0" err="1" smtClean="0"/>
-              <a:t>queryString</a:t>
-            </a:r>
-            <a:r>
-              <a:rPr lang="nl-BE" baseline="0" dirty="0" smtClean="0"/>
-              <a:t> is laatste object in </a:t>
-            </a:r>
-            <a:r>
-              <a:rPr lang="nl-BE" baseline="0" dirty="0" err="1" smtClean="0"/>
-              <a:t>activate</a:t>
-            </a:r>
-            <a:r>
-              <a:rPr lang="nl-BE" baseline="0" dirty="0" smtClean="0"/>
-              <a:t> </a:t>
-            </a:r>
-            <a:r>
-              <a:rPr lang="nl-BE" baseline="0" dirty="0" err="1" smtClean="0"/>
-              <a:t>and</a:t>
-            </a:r>
-            <a:r>
-              <a:rPr lang="nl-BE" baseline="0" dirty="0" smtClean="0"/>
-              <a:t> is een JS object met </a:t>
-            </a:r>
-            <a:r>
-              <a:rPr lang="nl-BE" baseline="0" dirty="0" err="1" smtClean="0"/>
-              <a:t>properties</a:t>
-            </a:r>
-            <a:r>
-              <a:rPr lang="nl-BE" baseline="0" dirty="0" smtClean="0"/>
-              <a:t> volgens querystring </a:t>
-            </a:r>
-            <a:r>
-              <a:rPr lang="nl-BE" baseline="0" dirty="0" err="1" smtClean="0"/>
-              <a:t>keys</a:t>
-            </a:r>
-            <a:endParaRPr lang="nl-BE" baseline="0" dirty="0" smtClean="0"/>
-          </a:p>
-          <a:p>
-            <a:r>
-              <a:rPr lang="nl-BE" baseline="0" dirty="0" smtClean="0"/>
-              <a:t>	</a:t>
-            </a:r>
-            <a:r>
-              <a:rPr lang="nl-BE" baseline="0" dirty="0" err="1" smtClean="0"/>
-              <a:t>splat</a:t>
-            </a:r>
-            <a:r>
-              <a:rPr lang="nl-BE" baseline="0" dirty="0" smtClean="0"/>
-              <a:t> route: </a:t>
-            </a:r>
-            <a:r>
-              <a:rPr lang="nl-BE" baseline="0" dirty="0" err="1" smtClean="0"/>
-              <a:t>myRoute</a:t>
-            </a:r>
-            <a:r>
-              <a:rPr lang="nl-BE" baseline="0" dirty="0" smtClean="0"/>
-              <a:t>*details</a:t>
-            </a:r>
-          </a:p>
-          <a:p>
-            <a:r>
-              <a:rPr lang="nl-BE" baseline="0" dirty="0" smtClean="0"/>
-              <a:t>	</a:t>
-            </a:r>
-            <a:endParaRPr lang="nl-BE" dirty="0" smtClean="0"/>
-          </a:p>
-          <a:p>
-            <a:r>
-              <a:rPr lang="nl-BE" dirty="0" err="1" smtClean="0"/>
-              <a:t>buildNavigationModel</a:t>
-            </a:r>
-            <a:r>
-              <a:rPr lang="nl-BE" dirty="0" smtClean="0"/>
-              <a:t>: alle routes met </a:t>
-            </a:r>
-            <a:r>
-              <a:rPr lang="nl-BE" dirty="0" err="1" smtClean="0"/>
-              <a:t>nav</a:t>
-            </a:r>
-            <a:r>
-              <a:rPr lang="nl-BE" dirty="0" smtClean="0"/>
-              <a:t>: </a:t>
-            </a:r>
-            <a:r>
-              <a:rPr lang="nl-BE" dirty="0" err="1" smtClean="0"/>
-              <a:t>true</a:t>
-            </a:r>
-            <a:r>
-              <a:rPr lang="nl-BE" dirty="0" smtClean="0"/>
-              <a:t> worden in de array </a:t>
-            </a:r>
-            <a:r>
-              <a:rPr lang="nl-BE" dirty="0" err="1" smtClean="0"/>
-              <a:t>router.navigationModel</a:t>
-            </a:r>
-            <a:r>
-              <a:rPr lang="nl-BE" dirty="0" smtClean="0"/>
-              <a:t> gegoten om te kunnen binden in navigatie</a:t>
-            </a:r>
-            <a:r>
-              <a:rPr lang="nl-BE" baseline="0" dirty="0" smtClean="0"/>
-              <a:t> (zie shell.html)</a:t>
-            </a:r>
-          </a:p>
-          <a:p>
-            <a:endParaRPr lang="nl-BE" baseline="0" dirty="0" smtClean="0"/>
-          </a:p>
-          <a:p>
-            <a:r>
-              <a:rPr lang="nl-BE" baseline="0" dirty="0" smtClean="0"/>
-              <a:t>Router gebruiken:</a:t>
-            </a:r>
-          </a:p>
-          <a:p>
-            <a:r>
-              <a:rPr lang="nl-BE" baseline="0" dirty="0" smtClean="0"/>
-              <a:t>	indien &lt;a&gt;: </a:t>
-            </a:r>
-            <a:r>
-              <a:rPr lang="nl-BE" baseline="0" dirty="0" err="1" smtClean="0"/>
-              <a:t>hash</a:t>
-            </a:r>
-            <a:r>
-              <a:rPr lang="nl-BE" baseline="0" dirty="0" smtClean="0"/>
-              <a:t> gebruiken (zie beers.html en </a:t>
-            </a:r>
-            <a:r>
-              <a:rPr lang="nl-BE" baseline="0" dirty="0" err="1" smtClean="0"/>
-              <a:t>add</a:t>
-            </a:r>
-            <a:r>
-              <a:rPr lang="nl-BE" baseline="0" dirty="0" smtClean="0"/>
-              <a:t> link)</a:t>
-            </a:r>
-          </a:p>
-          <a:p>
-            <a:r>
-              <a:rPr lang="nl-BE" baseline="0" dirty="0" smtClean="0"/>
-              <a:t>	vanuit JS: </a:t>
-            </a:r>
-            <a:r>
-              <a:rPr lang="nl-BE" baseline="0" dirty="0" err="1" smtClean="0"/>
-              <a:t>router.navigate</a:t>
-            </a:r>
-            <a:r>
-              <a:rPr lang="nl-BE" baseline="0" dirty="0" smtClean="0"/>
-              <a:t>(‘#</a:t>
-            </a:r>
-            <a:r>
-              <a:rPr lang="nl-BE" baseline="0" dirty="0" err="1" smtClean="0"/>
-              <a:t>hash</a:t>
-            </a:r>
-            <a:r>
-              <a:rPr lang="nl-BE" baseline="0" dirty="0" smtClean="0"/>
-              <a:t>’); (zie add.js)</a:t>
-            </a:r>
-          </a:p>
-          <a:p>
-            <a:endParaRPr lang="nl-BE" baseline="0" dirty="0" smtClean="0"/>
-          </a:p>
-          <a:p>
-            <a:r>
-              <a:rPr lang="nl-BE" baseline="0" dirty="0" smtClean="0"/>
-              <a:t>Router kan nog meer:</a:t>
-            </a:r>
-          </a:p>
-          <a:p>
-            <a:r>
-              <a:rPr lang="nl-BE" baseline="0" dirty="0" smtClean="0"/>
-              <a:t>	</a:t>
-            </a:r>
-            <a:r>
-              <a:rPr lang="nl-BE" baseline="0" dirty="0" err="1" smtClean="0"/>
-              <a:t>history</a:t>
-            </a:r>
-            <a:r>
-              <a:rPr lang="nl-BE" baseline="0" dirty="0" smtClean="0"/>
-              <a:t> veranderen</a:t>
-            </a:r>
-          </a:p>
-          <a:p>
-            <a:r>
-              <a:rPr lang="nl-BE" baseline="0" dirty="0" smtClean="0"/>
-              <a:t>	</a:t>
-            </a:r>
-            <a:r>
-              <a:rPr lang="nl-BE" baseline="0" dirty="0" err="1" smtClean="0"/>
-              <a:t>router.navigateBack</a:t>
-            </a:r>
-            <a:r>
-              <a:rPr lang="nl-BE" baseline="0" dirty="0" smtClean="0"/>
-              <a:t>() om terug te gaan</a:t>
-            </a:r>
-          </a:p>
-          <a:p>
-            <a:r>
-              <a:rPr lang="nl-BE" baseline="0" dirty="0" smtClean="0"/>
-              <a:t>	routes die niet </a:t>
-            </a:r>
-            <a:r>
-              <a:rPr lang="nl-BE" baseline="0" dirty="0" err="1" smtClean="0"/>
-              <a:t>gematcht</a:t>
-            </a:r>
-            <a:r>
-              <a:rPr lang="nl-BE" baseline="0" dirty="0" smtClean="0"/>
-              <a:t> kunnen worden (zie shell.js)</a:t>
-            </a:r>
-          </a:p>
-          <a:p>
-            <a:r>
-              <a:rPr lang="nl-BE" baseline="0" dirty="0" smtClean="0"/>
-              <a:t>	</a:t>
-            </a:r>
-            <a:r>
-              <a:rPr lang="nl-BE" baseline="0" dirty="0" err="1" smtClean="0"/>
-              <a:t>child</a:t>
-            </a:r>
-            <a:r>
-              <a:rPr lang="nl-BE" baseline="0" dirty="0" smtClean="0"/>
-              <a:t> routers</a:t>
-            </a:r>
             <a:endParaRPr lang="en-US" dirty="0"/>
           </a:p>
         </p:txBody>
@@ -2286,7 +2031,7 @@
           <a:p>
             <a:fld id="{0DF56419-AC34-45D0-BAB8-5A4CB1E563BF}" type="slidenum">
               <a:rPr lang="en-US" smtClean="0"/>
-              <a:t>32</a:t>
+              <a:t>31</a:t>
             </a:fld>
             <a:endParaRPr lang="en-US"/>
           </a:p>
@@ -2295,7 +2040,7 @@
     </p:spTree>
     <p:extLst>
       <p:ext uri="{BB962C8B-B14F-4D97-AF65-F5344CB8AC3E}">
-        <p14:creationId xmlns:p14="http://schemas.microsoft.com/office/powerpoint/2010/main" val="3530374302"/>
+        <p14:creationId xmlns:p14="http://schemas.microsoft.com/office/powerpoint/2010/main" val="2754514785"/>
       </p:ext>
     </p:extLst>
   </p:cSld>
@@ -2486,90 +2231,395 @@
           <a:p>
             <a:r>
               <a:rPr lang="nl-BE" dirty="0" smtClean="0"/>
-              <a:t>http</a:t>
-            </a:r>
-            <a:r>
-              <a:rPr lang="nl-BE" baseline="0" dirty="0" smtClean="0"/>
-              <a:t> en </a:t>
+              <a:t>Router </a:t>
+            </a:r>
+            <a:r>
+              <a:rPr lang="nl-BE" dirty="0" err="1" smtClean="0"/>
+              <a:t>mappings</a:t>
+            </a:r>
+            <a:r>
+              <a:rPr lang="nl-BE" dirty="0" smtClean="0"/>
+              <a:t>:</a:t>
+            </a:r>
+          </a:p>
+          <a:p>
+            <a:r>
+              <a:rPr lang="nl-BE" dirty="0" smtClean="0"/>
+              <a:t>	route:</a:t>
+            </a:r>
+            <a:r>
+              <a:rPr lang="nl-BE" baseline="0" dirty="0" smtClean="0"/>
+              <a:t> wat in de </a:t>
             </a:r>
             <a:r>
               <a:rPr lang="nl-BE" baseline="0" dirty="0" err="1" smtClean="0"/>
-              <a:t>serializer</a:t>
-            </a:r>
-            <a:r>
-              <a:rPr lang="nl-BE" baseline="0" dirty="0" smtClean="0"/>
-              <a:t> zijn om met data van de backend te werken. J</a:t>
-            </a:r>
-            <a:r>
-              <a:rPr lang="nl-BE" dirty="0" smtClean="0"/>
-              <a:t>e kan uiteraard ook andere </a:t>
-            </a:r>
-            <a:r>
-              <a:rPr lang="nl-BE" dirty="0" err="1" smtClean="0"/>
-              <a:t>libraries</a:t>
-            </a:r>
-            <a:r>
-              <a:rPr lang="nl-BE" dirty="0" smtClean="0"/>
-              <a:t> gebruiken, bv </a:t>
-            </a:r>
-            <a:r>
-              <a:rPr lang="nl-BE" dirty="0" err="1" smtClean="0"/>
-              <a:t>jQuery</a:t>
+              <a:t>url</a:t>
+            </a:r>
+            <a:r>
+              <a:rPr lang="nl-BE" baseline="0" dirty="0" smtClean="0"/>
+              <a:t> te zien is, leeg is de default route</a:t>
+            </a:r>
+          </a:p>
+          <a:p>
+            <a:r>
+              <a:rPr lang="nl-BE" baseline="0" dirty="0" smtClean="0"/>
+              <a:t>	</a:t>
+            </a:r>
+            <a:r>
+              <a:rPr lang="nl-BE" baseline="0" dirty="0" err="1" smtClean="0"/>
+              <a:t>title</a:t>
+            </a:r>
+            <a:r>
+              <a:rPr lang="nl-BE" baseline="0" dirty="0" smtClean="0"/>
+              <a:t>: gebruikt voor </a:t>
+            </a:r>
+            <a:r>
+              <a:rPr lang="nl-BE" baseline="0" dirty="0" err="1" smtClean="0"/>
+              <a:t>document.title</a:t>
+            </a:r>
+            <a:endParaRPr lang="nl-BE" baseline="0" dirty="0" smtClean="0"/>
+          </a:p>
+          <a:p>
+            <a:r>
+              <a:rPr lang="nl-BE" baseline="0" dirty="0" smtClean="0"/>
+              <a:t>	</a:t>
+            </a:r>
+            <a:r>
+              <a:rPr lang="nl-BE" baseline="0" dirty="0" err="1" smtClean="0"/>
+              <a:t>moduleId</a:t>
+            </a:r>
+            <a:r>
+              <a:rPr lang="nl-BE" baseline="0" dirty="0" smtClean="0"/>
+              <a:t>: </a:t>
+            </a:r>
+            <a:r>
+              <a:rPr lang="nl-BE" baseline="0" dirty="0" err="1" smtClean="0"/>
+              <a:t>id</a:t>
+            </a:r>
+            <a:r>
+              <a:rPr lang="nl-BE" baseline="0" dirty="0" smtClean="0"/>
+              <a:t> van je module, ook gebruikt om viewmodel op te sporen (en daarna bijbehorende view)</a:t>
+            </a:r>
+          </a:p>
+          <a:p>
+            <a:r>
+              <a:rPr lang="nl-BE" baseline="0" dirty="0" smtClean="0"/>
+              <a:t>	</a:t>
+            </a:r>
+            <a:r>
+              <a:rPr lang="nl-BE" baseline="0" dirty="0" err="1" smtClean="0"/>
+              <a:t>nav</a:t>
+            </a:r>
+            <a:r>
+              <a:rPr lang="nl-BE" baseline="0" dirty="0" smtClean="0"/>
+              <a:t>: of het opgenomen moet worden in </a:t>
+            </a:r>
+            <a:r>
+              <a:rPr lang="nl-BE" baseline="0" dirty="0" err="1" smtClean="0"/>
+              <a:t>router.navigationModel</a:t>
+            </a:r>
+            <a:r>
+              <a:rPr lang="nl-BE" baseline="0" dirty="0" smtClean="0"/>
+              <a:t> (</a:t>
+            </a:r>
+            <a:r>
+              <a:rPr lang="nl-BE" baseline="0" dirty="0" err="1" smtClean="0"/>
+              <a:t>true</a:t>
+            </a:r>
+            <a:r>
+              <a:rPr lang="nl-BE" baseline="0" dirty="0" smtClean="0"/>
+              <a:t>/</a:t>
+            </a:r>
+            <a:r>
+              <a:rPr lang="nl-BE" baseline="0" dirty="0" err="1" smtClean="0"/>
+              <a:t>false</a:t>
+            </a:r>
+            <a:r>
+              <a:rPr lang="nl-BE" baseline="0" dirty="0" smtClean="0"/>
+              <a:t>) of de volgorde (int)</a:t>
+            </a:r>
+          </a:p>
+          <a:p>
+            <a:endParaRPr lang="nl-BE" baseline="0" dirty="0" smtClean="0"/>
+          </a:p>
+          <a:p>
+            <a:r>
+              <a:rPr lang="nl-BE" baseline="0" dirty="0" smtClean="0"/>
+              <a:t>	parameters: </a:t>
+            </a:r>
+            <a:r>
+              <a:rPr lang="nl-BE" baseline="0" dirty="0" err="1" smtClean="0"/>
+              <a:t>myRoute</a:t>
+            </a:r>
+            <a:r>
+              <a:rPr lang="nl-BE" baseline="0" dirty="0" smtClean="0"/>
+              <a:t>/:</a:t>
+            </a:r>
+            <a:r>
+              <a:rPr lang="nl-BE" baseline="0" dirty="0" err="1" smtClean="0"/>
+              <a:t>id</a:t>
+            </a:r>
+            <a:r>
+              <a:rPr lang="nl-BE" baseline="0" dirty="0" smtClean="0"/>
+              <a:t> of indien optioneel: </a:t>
+            </a:r>
+            <a:r>
+              <a:rPr lang="nl-BE" baseline="0" dirty="0" err="1" smtClean="0"/>
+              <a:t>myRoute</a:t>
+            </a:r>
+            <a:r>
+              <a:rPr lang="nl-BE" baseline="0" dirty="0" smtClean="0"/>
+              <a:t>(/:</a:t>
+            </a:r>
+            <a:r>
+              <a:rPr lang="nl-BE" baseline="0" dirty="0" err="1" smtClean="0"/>
+              <a:t>id</a:t>
+            </a:r>
+            <a:r>
+              <a:rPr lang="nl-BE" baseline="0" dirty="0" smtClean="0"/>
+              <a:t>)</a:t>
+            </a:r>
+          </a:p>
+          <a:p>
+            <a:r>
+              <a:rPr lang="nl-BE" baseline="0" dirty="0" smtClean="0"/>
+              <a:t>		meerdere parameters zijn mogelijk, volgorde wordt bewaard in </a:t>
+            </a:r>
+            <a:r>
+              <a:rPr lang="nl-BE" baseline="0" dirty="0" err="1" smtClean="0"/>
+              <a:t>activate</a:t>
+            </a:r>
+            <a:r>
+              <a:rPr lang="nl-BE" baseline="0" dirty="0" smtClean="0"/>
+              <a:t> call</a:t>
+            </a:r>
+          </a:p>
+          <a:p>
+            <a:r>
+              <a:rPr lang="nl-BE" baseline="0" dirty="0" smtClean="0"/>
+              <a:t>		</a:t>
+            </a:r>
+            <a:r>
+              <a:rPr lang="nl-BE" baseline="0" dirty="0" err="1" smtClean="0"/>
+              <a:t>queryString</a:t>
+            </a:r>
+            <a:r>
+              <a:rPr lang="nl-BE" baseline="0" dirty="0" smtClean="0"/>
+              <a:t> is laatste object in </a:t>
+            </a:r>
+            <a:r>
+              <a:rPr lang="nl-BE" baseline="0" dirty="0" err="1" smtClean="0"/>
+              <a:t>activate</a:t>
+            </a:r>
+            <a:r>
+              <a:rPr lang="nl-BE" baseline="0" dirty="0" smtClean="0"/>
+              <a:t> </a:t>
+            </a:r>
+            <a:r>
+              <a:rPr lang="nl-BE" baseline="0" dirty="0" err="1" smtClean="0"/>
+              <a:t>and</a:t>
+            </a:r>
+            <a:r>
+              <a:rPr lang="nl-BE" baseline="0" dirty="0" smtClean="0"/>
+              <a:t> is een JS object met </a:t>
+            </a:r>
+            <a:r>
+              <a:rPr lang="nl-BE" baseline="0" dirty="0" err="1" smtClean="0"/>
+              <a:t>properties</a:t>
+            </a:r>
+            <a:r>
+              <a:rPr lang="nl-BE" baseline="0" dirty="0" smtClean="0"/>
+              <a:t> volgens querystring </a:t>
+            </a:r>
+            <a:r>
+              <a:rPr lang="nl-BE" baseline="0" dirty="0" err="1" smtClean="0"/>
+              <a:t>keys</a:t>
+            </a:r>
+            <a:endParaRPr lang="nl-BE" baseline="0" dirty="0" smtClean="0"/>
+          </a:p>
+          <a:p>
+            <a:r>
+              <a:rPr lang="nl-BE" baseline="0" dirty="0" smtClean="0"/>
+              <a:t>	</a:t>
+            </a:r>
+            <a:r>
+              <a:rPr lang="nl-BE" baseline="0" dirty="0" err="1" smtClean="0"/>
+              <a:t>splat</a:t>
+            </a:r>
+            <a:r>
+              <a:rPr lang="nl-BE" baseline="0" dirty="0" smtClean="0"/>
+              <a:t> route: </a:t>
+            </a:r>
+            <a:r>
+              <a:rPr lang="nl-BE" baseline="0" dirty="0" err="1" smtClean="0"/>
+              <a:t>myRoute</a:t>
+            </a:r>
+            <a:r>
+              <a:rPr lang="nl-BE" baseline="0" dirty="0" smtClean="0"/>
+              <a:t>*details</a:t>
+            </a:r>
+          </a:p>
+          <a:p>
+            <a:r>
+              <a:rPr lang="nl-BE" baseline="0" dirty="0" smtClean="0"/>
+              <a:t>	</a:t>
             </a:r>
             <a:endParaRPr lang="nl-BE" dirty="0" smtClean="0"/>
           </a:p>
           <a:p>
             <a:r>
               <a:rPr lang="nl-BE" dirty="0" err="1" smtClean="0"/>
-              <a:t>observable</a:t>
-            </a:r>
-            <a:r>
-              <a:rPr lang="nl-BE" dirty="0" smtClean="0"/>
-              <a:t>: om tegen</a:t>
-            </a:r>
-            <a:r>
-              <a:rPr lang="nl-BE" baseline="0" dirty="0" smtClean="0"/>
-              <a:t> gewone JS objecten te </a:t>
+              <a:t>buildNavigationModel</a:t>
+            </a:r>
+            <a:r>
+              <a:rPr lang="nl-BE" dirty="0" smtClean="0"/>
+              <a:t>: alle routes met </a:t>
+            </a:r>
+            <a:r>
+              <a:rPr lang="nl-BE" dirty="0" err="1" smtClean="0"/>
+              <a:t>nav</a:t>
+            </a:r>
+            <a:r>
+              <a:rPr lang="nl-BE" dirty="0" smtClean="0"/>
+              <a:t>: </a:t>
+            </a:r>
+            <a:r>
+              <a:rPr lang="nl-BE" dirty="0" err="1" smtClean="0"/>
+              <a:t>true</a:t>
+            </a:r>
+            <a:r>
+              <a:rPr lang="nl-BE" dirty="0" smtClean="0"/>
+              <a:t> worden in de array </a:t>
+            </a:r>
+            <a:r>
+              <a:rPr lang="nl-BE" dirty="0" err="1" smtClean="0"/>
+              <a:t>router.navigationModel</a:t>
+            </a:r>
+            <a:r>
+              <a:rPr lang="nl-BE" dirty="0" smtClean="0"/>
+              <a:t> gegoten om te kunnen binden in navigatie</a:t>
+            </a:r>
+            <a:r>
+              <a:rPr lang="nl-BE" baseline="0" dirty="0" smtClean="0"/>
+              <a:t> (zie shell.html)</a:t>
+            </a:r>
+          </a:p>
+          <a:p>
+            <a:endParaRPr lang="nl-BE" baseline="0" dirty="0" smtClean="0"/>
+          </a:p>
+          <a:p>
+            <a:r>
+              <a:rPr lang="nl-BE" baseline="0" dirty="0" smtClean="0"/>
+              <a:t>Router gebruiken:</a:t>
+            </a:r>
+          </a:p>
+          <a:p>
+            <a:r>
+              <a:rPr lang="nl-BE" baseline="0" dirty="0" smtClean="0"/>
+              <a:t>	indien &lt;a&gt;: </a:t>
             </a:r>
             <a:r>
               <a:rPr lang="nl-BE" baseline="0" dirty="0" err="1" smtClean="0"/>
-              <a:t>databinden</a:t>
-            </a:r>
-            <a:r>
-              <a:rPr lang="nl-BE" baseline="0" dirty="0" smtClean="0"/>
-              <a:t>, niet via </a:t>
+              <a:t>hash</a:t>
+            </a:r>
+            <a:r>
+              <a:rPr lang="nl-BE" baseline="0" dirty="0" smtClean="0"/>
+              <a:t> gebruiken (zie beers.html en </a:t>
             </a:r>
             <a:r>
               <a:rPr lang="nl-BE" baseline="0" dirty="0" err="1" smtClean="0"/>
-              <a:t>Knockout</a:t>
-            </a:r>
-            <a:r>
-              <a:rPr lang="nl-BE" baseline="0" dirty="0" smtClean="0"/>
-              <a:t>. Werkt enkel met browsers die ES5 ondersteunen (</a:t>
+              <a:t>add</a:t>
+            </a:r>
+            <a:r>
+              <a:rPr lang="nl-BE" baseline="0" dirty="0" smtClean="0"/>
+              <a:t> link)</a:t>
+            </a:r>
+          </a:p>
+          <a:p>
+            <a:r>
+              <a:rPr lang="nl-BE" baseline="0" dirty="0" smtClean="0"/>
+              <a:t>	vanuit JS: </a:t>
             </a:r>
             <a:r>
               <a:rPr lang="nl-BE" baseline="0" dirty="0" err="1" smtClean="0"/>
-              <a:t>defineProperty</a:t>
-            </a:r>
-            <a:r>
-              <a:rPr lang="nl-BE" baseline="0" dirty="0" smtClean="0"/>
-              <a:t>). Deze </a:t>
+              <a:t>router.navigate</a:t>
+            </a:r>
+            <a:r>
+              <a:rPr lang="nl-BE" baseline="0" dirty="0" smtClean="0"/>
+              <a:t>(‘#</a:t>
             </a:r>
             <a:r>
               <a:rPr lang="nl-BE" baseline="0" dirty="0" err="1" smtClean="0"/>
-              <a:t>plugin</a:t>
-            </a:r>
-            <a:r>
-              <a:rPr lang="nl-BE" baseline="0" dirty="0" smtClean="0"/>
-              <a:t> kan ook met </a:t>
+              <a:t>hash</a:t>
+            </a:r>
+            <a:r>
+              <a:rPr lang="nl-BE" baseline="0" dirty="0" smtClean="0"/>
+              <a:t>’); (zie add.js)</a:t>
+            </a:r>
+          </a:p>
+          <a:p>
+            <a:endParaRPr lang="nl-BE" baseline="0" dirty="0" smtClean="0"/>
+          </a:p>
+          <a:p>
+            <a:r>
+              <a:rPr lang="nl-BE" baseline="0" dirty="0" smtClean="0"/>
+              <a:t>Router kan nog meer:</a:t>
+            </a:r>
+          </a:p>
+          <a:p>
+            <a:r>
+              <a:rPr lang="nl-BE" baseline="0" dirty="0" smtClean="0"/>
+              <a:t>	</a:t>
             </a:r>
             <a:r>
               <a:rPr lang="nl-BE" baseline="0" dirty="0" err="1" smtClean="0"/>
-              <a:t>promises</a:t>
-            </a:r>
-            <a:r>
-              <a:rPr lang="nl-BE" baseline="0" dirty="0" smtClean="0"/>
-              <a:t> overweg.</a:t>
+              <a:t>history</a:t>
+            </a:r>
+            <a:r>
+              <a:rPr lang="nl-BE" baseline="0" dirty="0" smtClean="0"/>
+              <a:t> veranderen</a:t>
+            </a:r>
+          </a:p>
+          <a:p>
+            <a:r>
+              <a:rPr lang="nl-BE" baseline="0" dirty="0" smtClean="0"/>
+              <a:t>	</a:t>
+            </a:r>
+            <a:r>
+              <a:rPr lang="nl-BE" baseline="0" dirty="0" err="1" smtClean="0"/>
+              <a:t>router.navigateBack</a:t>
+            </a:r>
+            <a:r>
+              <a:rPr lang="nl-BE" baseline="0" dirty="0" smtClean="0"/>
+              <a:t>() om terug te gaan</a:t>
+            </a:r>
+          </a:p>
+          <a:p>
+            <a:r>
+              <a:rPr lang="nl-BE" baseline="0" dirty="0" smtClean="0"/>
+              <a:t>	routes die niet </a:t>
+            </a:r>
+            <a:r>
+              <a:rPr lang="nl-BE" baseline="0" dirty="0" err="1" smtClean="0"/>
+              <a:t>gematcht</a:t>
+            </a:r>
+            <a:r>
+              <a:rPr lang="nl-BE" baseline="0" dirty="0" smtClean="0"/>
+              <a:t> kunnen worden (zie shell.js)</a:t>
+            </a:r>
+          </a:p>
+          <a:p>
+            <a:r>
+              <a:rPr lang="nl-BE" baseline="0" dirty="0" smtClean="0"/>
+              <a:t>	</a:t>
+            </a:r>
+            <a:r>
+              <a:rPr lang="nl-BE" baseline="0" dirty="0" err="1" smtClean="0"/>
+              <a:t>child</a:t>
+            </a:r>
+            <a:r>
+              <a:rPr lang="nl-BE" baseline="0" dirty="0" smtClean="0"/>
+              <a:t> routers</a:t>
             </a:r>
             <a:endParaRPr lang="en-US" dirty="0"/>
           </a:p>
@@ -2592,7 +2642,7 @@
           <a:p>
             <a:fld id="{0DF56419-AC34-45D0-BAB8-5A4CB1E563BF}" type="slidenum">
               <a:rPr lang="en-US" smtClean="0"/>
-              <a:t>33</a:t>
+              <a:t>32</a:t>
             </a:fld>
             <a:endParaRPr lang="en-US"/>
           </a:p>
@@ -2601,7 +2651,7 @@
     </p:spTree>
     <p:extLst>
       <p:ext uri="{BB962C8B-B14F-4D97-AF65-F5344CB8AC3E}">
-        <p14:creationId xmlns:p14="http://schemas.microsoft.com/office/powerpoint/2010/main" val="2081039205"/>
+        <p14:creationId xmlns:p14="http://schemas.microsoft.com/office/powerpoint/2010/main" val="3530374302"/>
       </p:ext>
     </p:extLst>
   </p:cSld>
@@ -2657,6 +2707,177 @@
           <a:p>
             <a:r>
               <a:rPr lang="nl-BE" dirty="0" smtClean="0"/>
+              <a:t>http</a:t>
+            </a:r>
+            <a:r>
+              <a:rPr lang="nl-BE" baseline="0" dirty="0" smtClean="0"/>
+              <a:t> en </a:t>
+            </a:r>
+            <a:r>
+              <a:rPr lang="nl-BE" baseline="0" dirty="0" err="1" smtClean="0"/>
+              <a:t>serializer</a:t>
+            </a:r>
+            <a:r>
+              <a:rPr lang="nl-BE" baseline="0" dirty="0" smtClean="0"/>
+              <a:t> zijn om met data van de backend te werken. J</a:t>
+            </a:r>
+            <a:r>
+              <a:rPr lang="nl-BE" dirty="0" smtClean="0"/>
+              <a:t>e kan uiteraard ook andere </a:t>
+            </a:r>
+            <a:r>
+              <a:rPr lang="nl-BE" dirty="0" err="1" smtClean="0"/>
+              <a:t>libraries</a:t>
+            </a:r>
+            <a:r>
+              <a:rPr lang="nl-BE" dirty="0" smtClean="0"/>
+              <a:t> gebruiken, bv </a:t>
+            </a:r>
+            <a:r>
+              <a:rPr lang="nl-BE" dirty="0" err="1" smtClean="0"/>
+              <a:t>jQuery</a:t>
+            </a:r>
+            <a:endParaRPr lang="nl-BE" dirty="0" smtClean="0"/>
+          </a:p>
+          <a:p>
+            <a:r>
+              <a:rPr lang="nl-BE" dirty="0" err="1" smtClean="0"/>
+              <a:t>observable</a:t>
+            </a:r>
+            <a:r>
+              <a:rPr lang="nl-BE" dirty="0" smtClean="0"/>
+              <a:t>: om tegen</a:t>
+            </a:r>
+            <a:r>
+              <a:rPr lang="nl-BE" baseline="0" dirty="0" smtClean="0"/>
+              <a:t> gewone JS objecten te </a:t>
+            </a:r>
+            <a:r>
+              <a:rPr lang="nl-BE" baseline="0" dirty="0" err="1" smtClean="0"/>
+              <a:t>databinden</a:t>
+            </a:r>
+            <a:r>
+              <a:rPr lang="nl-BE" baseline="0" dirty="0" smtClean="0"/>
+              <a:t>, niet via </a:t>
+            </a:r>
+            <a:r>
+              <a:rPr lang="nl-BE" baseline="0" dirty="0" err="1" smtClean="0"/>
+              <a:t>Knockout</a:t>
+            </a:r>
+            <a:r>
+              <a:rPr lang="nl-BE" baseline="0" dirty="0" smtClean="0"/>
+              <a:t>. Werkt enkel met browsers die ES5 ondersteunen (</a:t>
+            </a:r>
+            <a:r>
+              <a:rPr lang="nl-BE" baseline="0" dirty="0" err="1" smtClean="0"/>
+              <a:t>defineProperty</a:t>
+            </a:r>
+            <a:r>
+              <a:rPr lang="nl-BE" baseline="0" dirty="0" smtClean="0"/>
+              <a:t>). Deze </a:t>
+            </a:r>
+            <a:r>
+              <a:rPr lang="nl-BE" baseline="0" dirty="0" err="1" smtClean="0"/>
+              <a:t>plugin</a:t>
+            </a:r>
+            <a:r>
+              <a:rPr lang="nl-BE" baseline="0" dirty="0" smtClean="0"/>
+              <a:t> kan ook met </a:t>
+            </a:r>
+            <a:r>
+              <a:rPr lang="nl-BE" baseline="0" dirty="0" err="1" smtClean="0"/>
+              <a:t>promises</a:t>
+            </a:r>
+            <a:r>
+              <a:rPr lang="nl-BE" baseline="0" dirty="0" smtClean="0"/>
+              <a:t> overweg.</a:t>
+            </a:r>
+            <a:endParaRPr lang="en-US" dirty="0"/>
+          </a:p>
+        </p:txBody>
+      </p:sp>
+      <p:sp>
+        <p:nvSpPr>
+          <p:cNvPr id="4" name="Slide Number Placeholder 3"/>
+          <p:cNvSpPr>
+            <a:spLocks noGrp="1"/>
+          </p:cNvSpPr>
+          <p:nvPr>
+            <p:ph type="sldNum" sz="quarter" idx="10"/>
+          </p:nvPr>
+        </p:nvSpPr>
+        <p:spPr/>
+        <p:txBody>
+          <a:bodyPr/>
+          <a:lstStyle/>
+          <a:p>
+            <a:fld id="{0DF56419-AC34-45D0-BAB8-5A4CB1E563BF}" type="slidenum">
+              <a:rPr lang="en-US" smtClean="0"/>
+              <a:t>33</a:t>
+            </a:fld>
+            <a:endParaRPr lang="en-US"/>
+          </a:p>
+        </p:txBody>
+      </p:sp>
+    </p:spTree>
+    <p:extLst>
+      <p:ext uri="{BB962C8B-B14F-4D97-AF65-F5344CB8AC3E}">
+        <p14:creationId xmlns:p14="http://schemas.microsoft.com/office/powerpoint/2010/main" val="2081039205"/>
+      </p:ext>
+    </p:extLst>
+  </p:cSld>
+  <p:clrMapOvr>
+    <a:masterClrMapping/>
+  </p:clrMapOvr>
+</p:notes>
+</file>
+
+<file path=ppt/notesSlides/notesSlide22.xml><?xml version="1.0" encoding="utf-8"?>
+<p:notes xmlns:a="http://schemas.openxmlformats.org/drawingml/2006/main" xmlns:r="http://schemas.openxmlformats.org/officeDocument/2006/relationships" xmlns:p="http://schemas.openxmlformats.org/presentationml/2006/main">
+  <p:cSld>
+    <p:spTree>
+      <p:nvGrpSpPr>
+        <p:cNvPr id="1" name=""/>
+        <p:cNvGrpSpPr/>
+        <p:nvPr/>
+      </p:nvGrpSpPr>
+      <p:grpSpPr>
+        <a:xfrm>
+          <a:off x="0" y="0"/>
+          <a:ext cx="0" cy="0"/>
+          <a:chOff x="0" y="0"/>
+          <a:chExt cx="0" cy="0"/>
+        </a:xfrm>
+      </p:grpSpPr>
+      <p:sp>
+        <p:nvSpPr>
+          <p:cNvPr id="2" name="Slide Image Placeholder 1"/>
+          <p:cNvSpPr>
+            <a:spLocks noGrp="1" noRot="1" noChangeAspect="1"/>
+          </p:cNvSpPr>
+          <p:nvPr>
+            <p:ph type="sldImg"/>
+          </p:nvPr>
+        </p:nvSpPr>
+        <p:spPr/>
+      </p:sp>
+      <p:sp>
+        <p:nvSpPr>
+          <p:cNvPr id="3" name="Notes Placeholder 2"/>
+          <p:cNvSpPr>
+            <a:spLocks noGrp="1"/>
+          </p:cNvSpPr>
+          <p:nvPr>
+            <p:ph type="body" idx="1"/>
+          </p:nvPr>
+        </p:nvSpPr>
+        <p:spPr/>
+        <p:txBody>
+          <a:bodyPr/>
+          <a:lstStyle/>
+          <a:p>
+            <a:r>
+              <a:rPr lang="nl-BE" dirty="0" smtClean="0"/>
               <a:t>SEO: komt er op neer dat je aan de serverkant een </a:t>
             </a:r>
             <a:r>
@@ -2679,6 +2900,12 @@
               <a:rPr lang="nl-BE" baseline="0" dirty="0" smtClean="0"/>
               <a:t>) om HTML snapshots te genereren voor Google</a:t>
             </a:r>
+          </a:p>
+          <a:p>
+            <a:r>
+              <a:rPr lang="nl-BE" baseline="0" dirty="0" smtClean="0"/>
+              <a:t>Node-Webkit: om native desktop applicaties te maken</a:t>
+            </a:r>
             <a:endParaRPr lang="en-US" dirty="0"/>
           </a:p>
         </p:txBody>
@@ -2700,7 +2927,7 @@
           <a:p>
             <a:fld id="{0DF56419-AC34-45D0-BAB8-5A4CB1E563BF}" type="slidenum">
               <a:rPr lang="en-US" smtClean="0"/>
-              <a:t>35</a:t>
+              <a:t>36</a:t>
             </a:fld>
             <a:endParaRPr lang="en-US"/>
           </a:p>
@@ -3562,100 +3789,32 @@
           <a:lstStyle/>
           <a:p>
             <a:r>
-              <a:rPr lang="nl-BE" dirty="0" err="1" smtClean="0"/>
-              <a:t>toJS</a:t>
-            </a:r>
-            <a:r>
-              <a:rPr lang="nl-BE" dirty="0" smtClean="0"/>
-              <a:t>: je object heeft geen </a:t>
-            </a:r>
-            <a:r>
-              <a:rPr lang="nl-BE" dirty="0" err="1" smtClean="0"/>
-              <a:t>observables</a:t>
-            </a:r>
-            <a:r>
-              <a:rPr lang="nl-BE" baseline="0" dirty="0" smtClean="0"/>
-              <a:t> meer, het is een normaal JS object</a:t>
-            </a:r>
-          </a:p>
-          <a:p>
+              <a:rPr lang="nl-BE" dirty="0" smtClean="0"/>
+              <a:t>Zie twee </a:t>
+            </a:r>
+            <a:r>
+              <a:rPr lang="nl-BE" dirty="0" err="1" smtClean="0"/>
+              <a:t>custom</a:t>
+            </a:r>
+            <a:r>
+              <a:rPr lang="nl-BE" dirty="0" smtClean="0"/>
+              <a:t> </a:t>
+            </a:r>
+            <a:r>
+              <a:rPr lang="nl-BE" dirty="0" err="1" smtClean="0"/>
+              <a:t>bindings</a:t>
+            </a:r>
+            <a:r>
+              <a:rPr lang="nl-BE" baseline="0" dirty="0" smtClean="0"/>
+              <a:t> in demo project: </a:t>
+            </a:r>
             <a:r>
               <a:rPr lang="nl-BE" baseline="0" dirty="0" err="1" smtClean="0"/>
-              <a:t>toJSON</a:t>
-            </a:r>
-            <a:r>
-              <a:rPr lang="nl-BE" baseline="0" dirty="0" smtClean="0"/>
-              <a:t>: doet intern eerst een call naar </a:t>
-            </a:r>
-            <a:r>
-              <a:rPr lang="nl-BE" baseline="0" dirty="0" err="1" smtClean="0"/>
-              <a:t>toJS</a:t>
-            </a:r>
-            <a:r>
-              <a:rPr lang="nl-BE" baseline="0" dirty="0" smtClean="0"/>
-              <a:t>, </a:t>
-            </a:r>
-            <a:r>
-              <a:rPr lang="nl-BE" baseline="0" dirty="0" err="1" smtClean="0"/>
-              <a:t>serializeert</a:t>
-            </a:r>
-            <a:r>
-              <a:rPr lang="nl-BE" baseline="0" dirty="0" smtClean="0"/>
-              <a:t> dan naar een JSON string</a:t>
-            </a:r>
-          </a:p>
-          <a:p>
-            <a:r>
-              <a:rPr lang="nl-BE" baseline="0" dirty="0" smtClean="0"/>
-              <a:t>Alle members worden geëvalueerd, ook </a:t>
-            </a:r>
-            <a:r>
-              <a:rPr lang="nl-BE" baseline="0" dirty="0" err="1" smtClean="0"/>
-              <a:t>computed</a:t>
-            </a:r>
-            <a:r>
-              <a:rPr lang="nl-BE" baseline="0" dirty="0" smtClean="0"/>
-              <a:t> </a:t>
-            </a:r>
-            <a:r>
-              <a:rPr lang="nl-BE" baseline="0" dirty="0" err="1" smtClean="0"/>
-              <a:t>observables</a:t>
-            </a:r>
-            <a:r>
-              <a:rPr lang="nl-BE" baseline="0" dirty="0" smtClean="0"/>
-              <a:t>, non-</a:t>
-            </a:r>
-            <a:r>
-              <a:rPr lang="nl-BE" baseline="0" dirty="0" err="1" smtClean="0"/>
-              <a:t>observables</a:t>
-            </a:r>
-            <a:r>
-              <a:rPr lang="nl-BE" baseline="0" dirty="0" smtClean="0"/>
-              <a:t>, </a:t>
-            </a:r>
-            <a:r>
-              <a:rPr lang="nl-BE" baseline="0" dirty="0" err="1" smtClean="0"/>
-              <a:t>observable</a:t>
-            </a:r>
-            <a:r>
-              <a:rPr lang="nl-BE" baseline="0" dirty="0" smtClean="0"/>
-              <a:t> arrays, </a:t>
-            </a:r>
-            <a:r>
-              <a:rPr lang="nl-BE" baseline="0" dirty="0" err="1" smtClean="0"/>
-              <a:t>child</a:t>
-            </a:r>
-            <a:r>
-              <a:rPr lang="nl-BE" baseline="0" dirty="0" smtClean="0"/>
-              <a:t> </a:t>
-            </a:r>
-            <a:r>
-              <a:rPr lang="nl-BE" baseline="0" dirty="0" err="1" smtClean="0"/>
-              <a:t>viewmodels</a:t>
-            </a:r>
-            <a:r>
-              <a:rPr lang="nl-BE" baseline="0" dirty="0" smtClean="0"/>
-              <a:t>, enz.</a:t>
+              <a:t>collapsibleSection</a:t>
+            </a:r>
+            <a:r>
+              <a:rPr lang="nl-BE" baseline="0" dirty="0" smtClean="0"/>
+              <a:t> en rating</a:t>
             </a:r>
             <a:endParaRPr lang="en-US" dirty="0"/>
           </a:p>
@@ -3678,7 +3837,7 @@
           <a:p>
             <a:fld id="{0DF56419-AC34-45D0-BAB8-5A4CB1E563BF}" type="slidenum">
               <a:rPr lang="en-US" smtClean="0"/>
-              <a:t>20</a:t>
+              <a:t>19</a:t>
             </a:fld>
             <a:endParaRPr lang="en-US"/>
           </a:p>
@@ -3687,7 +3846,7 @@
     </p:spTree>
     <p:extLst>
       <p:ext uri="{BB962C8B-B14F-4D97-AF65-F5344CB8AC3E}">
-        <p14:creationId xmlns:p14="http://schemas.microsoft.com/office/powerpoint/2010/main" val="2104542335"/>
+        <p14:creationId xmlns:p14="http://schemas.microsoft.com/office/powerpoint/2010/main" val="3706878361"/>
       </p:ext>
     </p:extLst>
   </p:cSld>
@@ -8216,7 +8375,7 @@
           </p:nvPr>
         </p:nvPicPr>
         <p:blipFill>
-          <a:blip r:embed="rId2"/>
+          <a:blip r:embed="rId3"/>
           <a:stretch>
             <a:fillRect/>
           </a:stretch>
@@ -8854,15 +9013,27 @@
           <a:p>
             <a:pPr lvl="1"/>
             <a:r>
-              <a:rPr lang="nl-BE" dirty="0" smtClean="0"/>
-              <a:t>customerList.js</a:t>
+              <a:rPr lang="nl-BE" dirty="0" err="1"/>
+              <a:t>v</a:t>
+            </a:r>
+            <a:r>
+              <a:rPr lang="nl-BE" dirty="0" err="1" smtClean="0"/>
+              <a:t>iewmodels</a:t>
+            </a:r>
+            <a:r>
+              <a:rPr lang="nl-BE" dirty="0" smtClean="0"/>
+              <a:t>/customerList.js</a:t>
             </a:r>
           </a:p>
           <a:p>
             <a:pPr lvl="1"/>
             <a:r>
-              <a:rPr lang="nl-BE" dirty="0" smtClean="0"/>
-              <a:t>customerList.html</a:t>
+              <a:rPr lang="nl-BE" dirty="0"/>
+              <a:t>v</a:t>
+            </a:r>
+            <a:r>
+              <a:rPr lang="nl-BE" dirty="0" smtClean="0"/>
+              <a:t>iews/customerList.html</a:t>
             </a:r>
             <a:endParaRPr lang="en-US" dirty="0"/>
           </a:p>
@@ -9038,7 +9209,7 @@
       </p:sp>
       <p:pic>
         <p:nvPicPr>
-          <p:cNvPr id="6" name="Picture 5"/>
+          <p:cNvPr id="9" name="Picture 8"/>
           <p:cNvPicPr>
             <a:picLocks noChangeAspect="1"/>
           </p:cNvPicPr>
@@ -9052,40 +9223,23 @@
         </p:blipFill>
         <p:spPr>
           <a:xfrm>
-            <a:off x="838200" y="1825625"/>
-            <a:ext cx="10782300" cy="1495425"/>
+            <a:off x="847725" y="4001294"/>
+            <a:ext cx="10506075" cy="2028825"/>
           </a:xfrm>
           <a:prstGeom prst="rect">
             <a:avLst/>
           </a:prstGeom>
         </p:spPr>
       </p:pic>
-      <p:sp>
-        <p:nvSpPr>
-          <p:cNvPr id="8" name="Content Placeholder 7"/>
-          <p:cNvSpPr>
-            <a:spLocks noGrp="1"/>
-          </p:cNvSpPr>
-          <p:nvPr>
-            <p:ph idx="1"/>
-          </p:nvPr>
-        </p:nvSpPr>
-        <p:spPr/>
-        <p:txBody>
-          <a:bodyPr/>
-          <a:lstStyle/>
-          <a:p>
-            <a:endParaRPr lang="en-US" dirty="0"/>
-          </a:p>
-        </p:txBody>
-      </p:sp>
       <p:pic>
         <p:nvPicPr>
-          <p:cNvPr id="9" name="Picture 8"/>
+          <p:cNvPr id="10" name="Content Placeholder 9"/>
           <p:cNvPicPr>
-            <a:picLocks noChangeAspect="1"/>
+            <a:picLocks noGrp="1" noChangeAspect="1"/>
           </p:cNvPicPr>
-          <p:nvPr/>
+          <p:nvPr>
+            <p:ph idx="1"/>
+          </p:nvPr>
         </p:nvPicPr>
         <p:blipFill>
           <a:blip r:embed="rId4"/>
@@ -9095,8 +9249,8 @@
         </p:blipFill>
         <p:spPr>
           <a:xfrm>
-            <a:off x="847725" y="4001294"/>
-            <a:ext cx="10506075" cy="2028825"/>
+            <a:off x="847725" y="1690688"/>
+            <a:ext cx="10515600" cy="1458435"/>
           </a:xfrm>
           <a:prstGeom prst="rect">
             <a:avLst/>
@@ -9540,7 +9694,11 @@
             </a:r>
             <a:r>
               <a:rPr lang="nl-BE" dirty="0" smtClean="0"/>
-              <a:t>: extra mogelijkheden</a:t>
+              <a:t>: </a:t>
+            </a:r>
+            <a:r>
+              <a:rPr lang="nl-BE" dirty="0" err="1" smtClean="0"/>
+              <a:t>dialogs</a:t>
             </a:r>
             <a:endParaRPr lang="en-US" dirty="0"/>
           </a:p>
@@ -9560,32 +9718,6 @@
         <p:txBody>
           <a:bodyPr/>
           <a:lstStyle/>
-          <a:p>
-            <a:r>
-              <a:rPr lang="nl-BE" dirty="0" smtClean="0"/>
-              <a:t>Eigen </a:t>
-            </a:r>
-            <a:r>
-              <a:rPr lang="nl-BE" dirty="0" err="1" smtClean="0"/>
-              <a:t>transitions</a:t>
-            </a:r>
-            <a:endParaRPr lang="nl-BE" dirty="0" smtClean="0"/>
-          </a:p>
-          <a:p>
-            <a:r>
-              <a:rPr lang="nl-BE" dirty="0" err="1" smtClean="0"/>
-              <a:t>Publish</a:t>
-            </a:r>
-            <a:r>
-              <a:rPr lang="nl-BE" dirty="0" smtClean="0"/>
-              <a:t> </a:t>
-            </a:r>
-            <a:r>
-              <a:rPr lang="nl-BE" dirty="0" err="1" smtClean="0"/>
-              <a:t>subscribe</a:t>
-            </a:r>
-            <a:endParaRPr lang="nl-BE" dirty="0" smtClean="0"/>
-          </a:p>
           <a:p>
             <a:r>
               <a:rPr lang="nl-BE" dirty="0" err="1" smtClean="0"/>
@@ -10060,6 +10192,13 @@
               <a:rPr lang="nl-BE" dirty="0" err="1" smtClean="0"/>
               <a:t>observable</a:t>
             </a:r>
+            <a:endParaRPr lang="nl-BE" dirty="0" smtClean="0"/>
+          </a:p>
+          <a:p>
+            <a:r>
+              <a:rPr lang="nl-BE" dirty="0" smtClean="0"/>
+              <a:t>…</a:t>
+            </a:r>
             <a:endParaRPr lang="en-US" dirty="0"/>
           </a:p>
         </p:txBody>
@@ -10245,6 +10384,90 @@
             </a:r>
             <a:r>
               <a:rPr lang="nl-BE" dirty="0" smtClean="0"/>
+              <a:t> en ASP.NET MVC</a:t>
+            </a:r>
+            <a:endParaRPr lang="en-US" dirty="0"/>
+          </a:p>
+        </p:txBody>
+      </p:sp>
+      <p:sp>
+        <p:nvSpPr>
+          <p:cNvPr id="3" name="Content Placeholder 2"/>
+          <p:cNvSpPr>
+            <a:spLocks noGrp="1"/>
+          </p:cNvSpPr>
+          <p:nvPr>
+            <p:ph idx="1"/>
+          </p:nvPr>
+        </p:nvSpPr>
+        <p:spPr/>
+        <p:txBody>
+          <a:bodyPr/>
+          <a:lstStyle/>
+          <a:p>
+            <a:r>
+              <a:rPr lang="nl-BE" dirty="0" err="1" smtClean="0"/>
+              <a:t>HotTowel</a:t>
+            </a:r>
+            <a:r>
+              <a:rPr lang="nl-BE" dirty="0" smtClean="0"/>
+              <a:t> template</a:t>
+            </a:r>
+            <a:endParaRPr lang="en-US" dirty="0"/>
+          </a:p>
+        </p:txBody>
+      </p:sp>
+    </p:spTree>
+    <p:extLst>
+      <p:ext uri="{BB962C8B-B14F-4D97-AF65-F5344CB8AC3E}">
+        <p14:creationId xmlns:p14="http://schemas.microsoft.com/office/powerpoint/2010/main" val="3353343187"/>
+      </p:ext>
+    </p:extLst>
+  </p:cSld>
+  <p:clrMapOvr>
+    <a:masterClrMapping/>
+  </p:clrMapOvr>
+</p:sld>
+</file>
+
+<file path=ppt/slides/slide36.xml><?xml version="1.0" encoding="utf-8"?>
+<p:sld xmlns:a="http://schemas.openxmlformats.org/drawingml/2006/main" xmlns:r="http://schemas.openxmlformats.org/officeDocument/2006/relationships" xmlns:p="http://schemas.openxmlformats.org/presentationml/2006/main">
+  <p:cSld>
+    <p:spTree>
+      <p:nvGrpSpPr>
+        <p:cNvPr id="1" name=""/>
+        <p:cNvGrpSpPr/>
+        <p:nvPr/>
+      </p:nvGrpSpPr>
+      <p:grpSpPr>
+        <a:xfrm>
+          <a:off x="0" y="0"/>
+          <a:ext cx="0" cy="0"/>
+          <a:chOff x="0" y="0"/>
+          <a:chExt cx="0" cy="0"/>
+        </a:xfrm>
+      </p:grpSpPr>
+      <p:sp>
+        <p:nvSpPr>
+          <p:cNvPr id="2" name="Title 1"/>
+          <p:cNvSpPr>
+            <a:spLocks noGrp="1"/>
+          </p:cNvSpPr>
+          <p:nvPr>
+            <p:ph type="title"/>
+          </p:nvPr>
+        </p:nvSpPr>
+        <p:spPr/>
+        <p:txBody>
+          <a:bodyPr/>
+          <a:lstStyle/>
+          <a:p>
+            <a:r>
+              <a:rPr lang="nl-BE" dirty="0" err="1" smtClean="0"/>
+              <a:t>Durandal</a:t>
+            </a:r>
+            <a:r>
+              <a:rPr lang="nl-BE" dirty="0" smtClean="0"/>
               <a:t>: nog veel meer</a:t>
             </a:r>
             <a:endParaRPr lang="en-US" dirty="0"/>
@@ -10264,12 +10487,19 @@
         <p:spPr/>
         <p:txBody>
           <a:bodyPr>
-            <a:normAutofit fontScale="92500" lnSpcReduction="20000"/>
+            <a:normAutofit fontScale="55000" lnSpcReduction="20000"/>
           </a:bodyPr>
           <a:lstStyle/>
           <a:p>
             <a:r>
               <a:rPr lang="nl-BE" dirty="0" err="1" smtClean="0"/>
+              <a:t>Publish-subscribe</a:t>
+            </a:r>
+            <a:endParaRPr lang="nl-BE" dirty="0" smtClean="0"/>
+          </a:p>
+          <a:p>
+            <a:r>
+              <a:rPr lang="nl-BE" dirty="0" err="1" smtClean="0"/>
               <a:t>Templatable</a:t>
             </a:r>
             <a:r>
@@ -10411,8 +10641,58 @@
           <a:p>
             <a:r>
               <a:rPr lang="nl-BE" dirty="0" smtClean="0"/>
+              <a:t>Builden met Mimosa</a:t>
+            </a:r>
+          </a:p>
+          <a:p>
+            <a:r>
+              <a:rPr lang="nl-BE" dirty="0" smtClean="0"/>
               <a:t>SEO mogelijkheden</a:t>
             </a:r>
+          </a:p>
+          <a:p>
+            <a:r>
+              <a:rPr lang="nl-BE" dirty="0" smtClean="0"/>
+              <a:t>Integreer Q, </a:t>
+            </a:r>
+            <a:r>
+              <a:rPr lang="nl-BE" dirty="0" err="1" smtClean="0"/>
+              <a:t>Dojo</a:t>
+            </a:r>
+            <a:r>
+              <a:rPr lang="nl-BE" dirty="0" smtClean="0"/>
+              <a:t>, </a:t>
+            </a:r>
+            <a:r>
+              <a:rPr lang="nl-BE" dirty="0" err="1" smtClean="0"/>
+              <a:t>KendoUI</a:t>
+            </a:r>
+            <a:r>
+              <a:rPr lang="nl-BE" dirty="0" smtClean="0"/>
+              <a:t>, </a:t>
+            </a:r>
+            <a:r>
+              <a:rPr lang="nl-BE" dirty="0" err="1" smtClean="0"/>
+              <a:t>Almond</a:t>
+            </a:r>
+            <a:r>
+              <a:rPr lang="nl-BE" dirty="0" smtClean="0"/>
+              <a:t>, i18next,…</a:t>
+            </a:r>
+          </a:p>
+          <a:p>
+            <a:r>
+              <a:rPr lang="nl-BE" dirty="0" err="1" smtClean="0"/>
+              <a:t>PhoneGap</a:t>
+            </a:r>
+            <a:r>
+              <a:rPr lang="nl-BE" dirty="0" smtClean="0"/>
+              <a:t>, Node-Webkit, Windows 8</a:t>
+            </a:r>
+            <a:endParaRPr lang="nl-BE" dirty="0" smtClean="0"/>
+          </a:p>
+          <a:p>
+            <a:endParaRPr lang="nl-BE" dirty="0" smtClean="0"/>
           </a:p>
         </p:txBody>
       </p:sp>

</xml_diff>

<commit_message>
minor changes after run through presentation + bugfix in beers.js
</commit_message>
<xml_diff>
--- a/Durandal T4T.pptx
+++ b/Durandal T4T.pptx
@@ -691,8 +691,21 @@
             </a:r>
             <a:r>
               <a:rPr lang="nl-BE" dirty="0" smtClean="0"/>
-              <a:t>een class toevoegen/verwijderen</a:t>
-            </a:r>
+              <a:t>een class toevoegen/verwijderen, toon met</a:t>
+            </a:r>
+            <a:r>
+              <a:rPr lang="nl-BE" baseline="0" dirty="0" smtClean="0"/>
+              <a:t> beer-summary en class bij bepaalde rating (zie code </a:t>
+            </a:r>
+            <a:r>
+              <a:rPr lang="nl-BE" baseline="0" dirty="0" err="1" smtClean="0"/>
+              <a:t>blocks</a:t>
+            </a:r>
+            <a:r>
+              <a:rPr lang="nl-BE" baseline="0" dirty="0" smtClean="0"/>
+              <a:t>)</a:t>
+            </a:r>
+            <a:endParaRPr lang="nl-BE" dirty="0" smtClean="0"/>
           </a:p>
           <a:p>
             <a:r>
@@ -3743,7 +3756,7 @@
               <a:t>observables</a:t>
             </a:r>
             <a:r>
-              <a:rPr lang="nl-BE" baseline="0" smtClean="0"/>
+              <a:rPr lang="nl-BE" baseline="0" dirty="0" smtClean="0"/>
               <a:t>, …</a:t>
             </a:r>
             <a:endParaRPr lang="en-US" dirty="0"/>
@@ -10950,6 +10963,13 @@
   <p:clrMapOvr>
     <a:masterClrMapping/>
   </p:clrMapOvr>
+  <p:timing>
+    <p:tnLst>
+      <p:par>
+        <p:cTn id="1" dur="indefinite" restart="never" nodeType="tmRoot"/>
+      </p:par>
+    </p:tnLst>
+  </p:timing>
 </p:sld>
 </file>
 
@@ -11041,6 +11061,13 @@
   <p:clrMapOvr>
     <a:masterClrMapping/>
   </p:clrMapOvr>
+  <p:timing>
+    <p:tnLst>
+      <p:par>
+        <p:cTn id="1" dur="indefinite" restart="never" nodeType="tmRoot"/>
+      </p:par>
+    </p:tnLst>
+  </p:timing>
 </p:sld>
 </file>
 
@@ -11154,6 +11181,13 @@
   <p:clrMapOvr>
     <a:masterClrMapping/>
   </p:clrMapOvr>
+  <p:timing>
+    <p:tnLst>
+      <p:par>
+        <p:cTn id="1" dur="indefinite" restart="never" nodeType="tmRoot"/>
+      </p:par>
+    </p:tnLst>
+  </p:timing>
 </p:sld>
 </file>
 
@@ -11591,6 +11625,13 @@
   <p:clrMapOvr>
     <a:masterClrMapping/>
   </p:clrMapOvr>
+  <p:timing>
+    <p:tnLst>
+      <p:par>
+        <p:cTn id="1" dur="indefinite" restart="never" nodeType="tmRoot"/>
+      </p:par>
+    </p:tnLst>
+  </p:timing>
 </p:sld>
 </file>
 
@@ -11765,6 +11806,13 @@
   <p:clrMapOvr>
     <a:masterClrMapping/>
   </p:clrMapOvr>
+  <p:timing>
+    <p:tnLst>
+      <p:par>
+        <p:cTn id="1" dur="indefinite" restart="never" nodeType="tmRoot"/>
+      </p:par>
+    </p:tnLst>
+  </p:timing>
 </p:sld>
 </file>
 
@@ -11920,6 +11968,13 @@
   <p:clrMapOvr>
     <a:masterClrMapping/>
   </p:clrMapOvr>
+  <p:timing>
+    <p:tnLst>
+      <p:par>
+        <p:cTn id="1" dur="indefinite" restart="never" nodeType="tmRoot"/>
+      </p:par>
+    </p:tnLst>
+  </p:timing>
 </p:sld>
 </file>
 
@@ -12057,6 +12112,13 @@
   <p:clrMapOvr>
     <a:masterClrMapping/>
   </p:clrMapOvr>
+  <p:timing>
+    <p:tnLst>
+      <p:par>
+        <p:cTn id="1" dur="indefinite" restart="never" nodeType="tmRoot"/>
+      </p:par>
+    </p:tnLst>
+  </p:timing>
 </p:sld>
 </file>
 
@@ -12144,6 +12206,13 @@
   <p:clrMapOvr>
     <a:masterClrMapping/>
   </p:clrMapOvr>
+  <p:timing>
+    <p:tnLst>
+      <p:par>
+        <p:cTn id="1" dur="indefinite" restart="never" nodeType="tmRoot"/>
+      </p:par>
+    </p:tnLst>
+  </p:timing>
 </p:sld>
 </file>
 
@@ -12255,6 +12324,13 @@
   <p:clrMapOvr>
     <a:masterClrMapping/>
   </p:clrMapOvr>
+  <p:timing>
+    <p:tnLst>
+      <p:par>
+        <p:cTn id="1" dur="indefinite" restart="never" nodeType="tmRoot"/>
+      </p:par>
+    </p:tnLst>
+  </p:timing>
 </p:sld>
 </file>
 
@@ -12342,6 +12418,13 @@
   <p:clrMapOvr>
     <a:masterClrMapping/>
   </p:clrMapOvr>
+  <p:timing>
+    <p:tnLst>
+      <p:par>
+        <p:cTn id="1" dur="indefinite" restart="never" nodeType="tmRoot"/>
+      </p:par>
+    </p:tnLst>
+  </p:timing>
 </p:sld>
 </file>
 
@@ -12626,6 +12709,13 @@
   <p:clrMapOvr>
     <a:masterClrMapping/>
   </p:clrMapOvr>
+  <p:timing>
+    <p:tnLst>
+      <p:par>
+        <p:cTn id="1" dur="indefinite" restart="never" nodeType="tmRoot"/>
+      </p:par>
+    </p:tnLst>
+  </p:timing>
 </p:sld>
 </file>
 
@@ -12708,6 +12798,13 @@
   <p:clrMapOvr>
     <a:masterClrMapping/>
   </p:clrMapOvr>
+  <p:timing>
+    <p:tnLst>
+      <p:par>
+        <p:cTn id="1" dur="indefinite" restart="never" nodeType="tmRoot"/>
+      </p:par>
+    </p:tnLst>
+  </p:timing>
 </p:sld>
 </file>
 
@@ -12795,6 +12892,13 @@
   <p:clrMapOvr>
     <a:masterClrMapping/>
   </p:clrMapOvr>
+  <p:timing>
+    <p:tnLst>
+      <p:par>
+        <p:cTn id="1" dur="indefinite" restart="never" nodeType="tmRoot"/>
+      </p:par>
+    </p:tnLst>
+  </p:timing>
 </p:sld>
 </file>
 
@@ -12913,6 +13017,13 @@
   <p:clrMapOvr>
     <a:masterClrMapping/>
   </p:clrMapOvr>
+  <p:timing>
+    <p:tnLst>
+      <p:par>
+        <p:cTn id="1" dur="indefinite" restart="never" nodeType="tmRoot"/>
+      </p:par>
+    </p:tnLst>
+  </p:timing>
 </p:sld>
 </file>
 
@@ -13091,6 +13202,13 @@
   <p:clrMapOvr>
     <a:masterClrMapping/>
   </p:clrMapOvr>
+  <p:timing>
+    <p:tnLst>
+      <p:par>
+        <p:cTn id="1" dur="indefinite" restart="never" nodeType="tmRoot"/>
+      </p:par>
+    </p:tnLst>
+  </p:timing>
 </p:sld>
 </file>
 
@@ -13182,6 +13300,13 @@
   <p:clrMapOvr>
     <a:masterClrMapping/>
   </p:clrMapOvr>
+  <p:timing>
+    <p:tnLst>
+      <p:par>
+        <p:cTn id="1" dur="indefinite" restart="never" nodeType="tmRoot"/>
+      </p:par>
+    </p:tnLst>
+  </p:timing>
 </p:sld>
 </file>
 
@@ -13295,6 +13420,13 @@
   <p:clrMapOvr>
     <a:masterClrMapping/>
   </p:clrMapOvr>
+  <p:timing>
+    <p:tnLst>
+      <p:par>
+        <p:cTn id="1" dur="indefinite" restart="never" nodeType="tmRoot"/>
+      </p:par>
+    </p:tnLst>
+  </p:timing>
 </p:sld>
 </file>
 
@@ -13390,6 +13522,13 @@
   <p:clrMapOvr>
     <a:masterClrMapping/>
   </p:clrMapOvr>
+  <p:timing>
+    <p:tnLst>
+      <p:par>
+        <p:cTn id="1" dur="indefinite" restart="never" nodeType="tmRoot"/>
+      </p:par>
+    </p:tnLst>
+  </p:timing>
 </p:sld>
 </file>
 
@@ -13490,6 +13629,13 @@
   <p:clrMapOvr>
     <a:masterClrMapping/>
   </p:clrMapOvr>
+  <p:timing>
+    <p:tnLst>
+      <p:par>
+        <p:cTn id="1" dur="indefinite" restart="never" nodeType="tmRoot"/>
+      </p:par>
+    </p:tnLst>
+  </p:timing>
 </p:sld>
 </file>
 
@@ -13604,6 +13750,13 @@
   <p:clrMapOvr>
     <a:masterClrMapping/>
   </p:clrMapOvr>
+  <p:timing>
+    <p:tnLst>
+      <p:par>
+        <p:cTn id="1" dur="indefinite" restart="never" nodeType="tmRoot"/>
+      </p:par>
+    </p:tnLst>
+  </p:timing>
 </p:sld>
 </file>
 
@@ -13703,6 +13856,13 @@
   <p:clrMapOvr>
     <a:masterClrMapping/>
   </p:clrMapOvr>
+  <p:timing>
+    <p:tnLst>
+      <p:par>
+        <p:cTn id="1" dur="indefinite" restart="never" nodeType="tmRoot"/>
+      </p:par>
+    </p:tnLst>
+  </p:timing>
 </p:sld>
 </file>
 
@@ -13822,6 +13982,13 @@
   <p:clrMapOvr>
     <a:masterClrMapping/>
   </p:clrMapOvr>
+  <p:timing>
+    <p:tnLst>
+      <p:par>
+        <p:cTn id="1" dur="indefinite" restart="never" nodeType="tmRoot"/>
+      </p:par>
+    </p:tnLst>
+  </p:timing>
 </p:sld>
 </file>
 
@@ -13912,6 +14079,13 @@
   <p:clrMapOvr>
     <a:masterClrMapping/>
   </p:clrMapOvr>
+  <p:timing>
+    <p:tnLst>
+      <p:par>
+        <p:cTn id="1" dur="indefinite" restart="never" nodeType="tmRoot"/>
+      </p:par>
+    </p:tnLst>
+  </p:timing>
 </p:sld>
 </file>
 
@@ -14126,6 +14300,13 @@
   <p:clrMapOvr>
     <a:masterClrMapping/>
   </p:clrMapOvr>
+  <p:timing>
+    <p:tnLst>
+      <p:par>
+        <p:cTn id="1" dur="indefinite" restart="never" nodeType="tmRoot"/>
+      </p:par>
+    </p:tnLst>
+  </p:timing>
 </p:sld>
 </file>
 
@@ -14298,6 +14479,13 @@
   <p:clrMapOvr>
     <a:masterClrMapping/>
   </p:clrMapOvr>
+  <p:timing>
+    <p:tnLst>
+      <p:par>
+        <p:cTn id="1" dur="indefinite" restart="never" nodeType="tmRoot"/>
+      </p:par>
+    </p:tnLst>
+  </p:timing>
 </p:sld>
 </file>
 
@@ -14390,6 +14578,13 @@
   <p:clrMapOvr>
     <a:masterClrMapping/>
   </p:clrMapOvr>
+  <p:timing>
+    <p:tnLst>
+      <p:par>
+        <p:cTn id="1" dur="indefinite" restart="never" nodeType="tmRoot"/>
+      </p:par>
+    </p:tnLst>
+  </p:timing>
 </p:sld>
 </file>
 
@@ -14481,6 +14676,13 @@
   <p:clrMapOvr>
     <a:masterClrMapping/>
   </p:clrMapOvr>
+  <p:timing>
+    <p:tnLst>
+      <p:par>
+        <p:cTn id="1" dur="indefinite" restart="never" nodeType="tmRoot"/>
+      </p:par>
+    </p:tnLst>
+  </p:timing>
 </p:sld>
 </file>
 
@@ -14572,6 +14774,13 @@
   <p:clrMapOvr>
     <a:masterClrMapping/>
   </p:clrMapOvr>
+  <p:timing>
+    <p:tnLst>
+      <p:par>
+        <p:cTn id="1" dur="indefinite" restart="never" nodeType="tmRoot"/>
+      </p:par>
+    </p:tnLst>
+  </p:timing>
 </p:sld>
 </file>
 
@@ -14663,6 +14872,13 @@
   <p:clrMapOvr>
     <a:masterClrMapping/>
   </p:clrMapOvr>
+  <p:timing>
+    <p:tnLst>
+      <p:par>
+        <p:cTn id="1" dur="indefinite" restart="never" nodeType="tmRoot"/>
+      </p:par>
+    </p:tnLst>
+  </p:timing>
 </p:sld>
 </file>
 
@@ -14768,6 +14984,13 @@
   <p:clrMapOvr>
     <a:masterClrMapping/>
   </p:clrMapOvr>
+  <p:timing>
+    <p:tnLst>
+      <p:par>
+        <p:cTn id="1" dur="indefinite" restart="never" nodeType="tmRoot"/>
+      </p:par>
+    </p:tnLst>
+  </p:timing>
 </p:sld>
 </file>
 
@@ -14898,6 +15121,13 @@
   <p:clrMapOvr>
     <a:masterClrMapping/>
   </p:clrMapOvr>
+  <p:timing>
+    <p:tnLst>
+      <p:par>
+        <p:cTn id="1" dur="indefinite" restart="never" nodeType="tmRoot"/>
+      </p:par>
+    </p:tnLst>
+  </p:timing>
 </p:sld>
 </file>
 
@@ -14982,6 +15212,13 @@
   <p:clrMapOvr>
     <a:masterClrMapping/>
   </p:clrMapOvr>
+  <p:timing>
+    <p:tnLst>
+      <p:par>
+        <p:cTn id="1" dur="indefinite" restart="never" nodeType="tmRoot"/>
+      </p:par>
+    </p:tnLst>
+  </p:timing>
 </p:sld>
 </file>
 
@@ -15259,6 +15496,13 @@
   <p:clrMapOvr>
     <a:masterClrMapping/>
   </p:clrMapOvr>
+  <p:timing>
+    <p:tnLst>
+      <p:par>
+        <p:cTn id="1" dur="indefinite" restart="never" nodeType="tmRoot"/>
+      </p:par>
+    </p:tnLst>
+  </p:timing>
 </p:sld>
 </file>
 
@@ -15372,6 +15616,13 @@
   <p:clrMapOvr>
     <a:masterClrMapping/>
   </p:clrMapOvr>
+  <p:timing>
+    <p:tnLst>
+      <p:par>
+        <p:cTn id="1" dur="indefinite" restart="never" nodeType="tmRoot"/>
+      </p:par>
+    </p:tnLst>
+  </p:timing>
 </p:sld>
 </file>
 
@@ -15486,6 +15737,13 @@
   <p:clrMapOvr>
     <a:masterClrMapping/>
   </p:clrMapOvr>
+  <p:timing>
+    <p:tnLst>
+      <p:par>
+        <p:cTn id="1" dur="indefinite" restart="never" nodeType="tmRoot"/>
+      </p:par>
+    </p:tnLst>
+  </p:timing>
 </p:sld>
 </file>
 
@@ -15637,6 +15895,13 @@
   <p:clrMapOvr>
     <a:masterClrMapping/>
   </p:clrMapOvr>
+  <p:timing>
+    <p:tnLst>
+      <p:par>
+        <p:cTn id="1" dur="indefinite" restart="never" nodeType="tmRoot"/>
+      </p:par>
+    </p:tnLst>
+  </p:timing>
 </p:sld>
 </file>
 
@@ -15754,6 +16019,13 @@
   <p:clrMapOvr>
     <a:masterClrMapping/>
   </p:clrMapOvr>
+  <p:timing>
+    <p:tnLst>
+      <p:par>
+        <p:cTn id="1" dur="indefinite" restart="never" nodeType="tmRoot"/>
+      </p:par>
+    </p:tnLst>
+  </p:timing>
 </p:sld>
 </file>
 
@@ -15865,6 +16137,13 @@
   <p:clrMapOvr>
     <a:masterClrMapping/>
   </p:clrMapOvr>
+  <p:timing>
+    <p:tnLst>
+      <p:par>
+        <p:cTn id="1" dur="indefinite" restart="never" nodeType="tmRoot"/>
+      </p:par>
+    </p:tnLst>
+  </p:timing>
 </p:sld>
 </file>
 
@@ -15968,6 +16247,13 @@
   <p:clrMapOvr>
     <a:masterClrMapping/>
   </p:clrMapOvr>
+  <p:timing>
+    <p:tnLst>
+      <p:par>
+        <p:cTn id="1" dur="indefinite" restart="never" nodeType="tmRoot"/>
+      </p:par>
+    </p:tnLst>
+  </p:timing>
 </p:sld>
 </file>
 
@@ -16110,6 +16396,13 @@
   <p:clrMapOvr>
     <a:masterClrMapping/>
   </p:clrMapOvr>
+  <p:timing>
+    <p:tnLst>
+      <p:par>
+        <p:cTn id="1" dur="indefinite" restart="never" nodeType="tmRoot"/>
+      </p:par>
+    </p:tnLst>
+  </p:timing>
 </p:sld>
 </file>
 
@@ -16222,6 +16515,13 @@
   <p:clrMapOvr>
     <a:masterClrMapping/>
   </p:clrMapOvr>
+  <p:timing>
+    <p:tnLst>
+      <p:par>
+        <p:cTn id="1" dur="indefinite" restart="never" nodeType="tmRoot"/>
+      </p:par>
+    </p:tnLst>
+  </p:timing>
 </p:sld>
 </file>
 

</xml_diff>

<commit_message>
one of the last changes
</commit_message>
<xml_diff>
--- a/Durandal T4T.pptx
+++ b/Durandal T4T.pptx
@@ -2448,26 +2448,44 @@
               <a:rPr lang="nl-BE" baseline="0" dirty="0" smtClean="0">
                 <a:sym typeface="Wingdings" panose="05000000000000000000" pitchFamily="2" charset="2"/>
               </a:rPr>
-              <a:t>In demo: home.html </a:t>
-            </a:r>
-            <a:r>
-              <a:rPr lang="nl-BE" baseline="0" smtClean="0">
+              <a:t>In demo: home.html en beers.html</a:t>
+            </a:r>
+          </a:p>
+          <a:p>
+            <a:endParaRPr lang="nl-BE" baseline="0" dirty="0" smtClean="0">
+              <a:sym typeface="Wingdings" panose="05000000000000000000" pitchFamily="2" charset="2"/>
+            </a:endParaRPr>
+          </a:p>
+          <a:p>
+            <a:r>
+              <a:rPr lang="nl-BE" baseline="0" dirty="0" smtClean="0">
                 <a:sym typeface="Wingdings" panose="05000000000000000000" pitchFamily="2" charset="2"/>
               </a:rPr>
-              <a:t>en beers.html</a:t>
-            </a:r>
-          </a:p>
-          <a:p>
-            <a:endParaRPr lang="nl-BE" baseline="0" smtClean="0">
-              <a:sym typeface="Wingdings" panose="05000000000000000000" pitchFamily="2" charset="2"/>
-            </a:endParaRPr>
-          </a:p>
-          <a:p>
-            <a:r>
-              <a:rPr lang="nl-BE" baseline="0" smtClean="0">
+              <a:t>In beers.html kan je de </a:t>
+            </a:r>
+            <a:r>
+              <a:rPr lang="nl-BE" baseline="0" dirty="0" err="1" smtClean="0">
                 <a:sym typeface="Wingdings" panose="05000000000000000000" pitchFamily="2" charset="2"/>
               </a:rPr>
-              <a:t>In beers.html kan je de value van de binding vervangen door $data (herinner binding contexts)</a:t>
+              <a:t>value</a:t>
+            </a:r>
+            <a:r>
+              <a:rPr lang="nl-BE" baseline="0" dirty="0" smtClean="0">
+                <a:sym typeface="Wingdings" panose="05000000000000000000" pitchFamily="2" charset="2"/>
+              </a:rPr>
+              <a:t> van de binding vervangen door $data (herinner binding </a:t>
+            </a:r>
+            <a:r>
+              <a:rPr lang="nl-BE" baseline="0" dirty="0" err="1" smtClean="0">
+                <a:sym typeface="Wingdings" panose="05000000000000000000" pitchFamily="2" charset="2"/>
+              </a:rPr>
+              <a:t>contexts</a:t>
+            </a:r>
+            <a:r>
+              <a:rPr lang="nl-BE" baseline="0" dirty="0" smtClean="0">
+                <a:sym typeface="Wingdings" panose="05000000000000000000" pitchFamily="2" charset="2"/>
+              </a:rPr>
+              <a:t>)</a:t>
             </a:r>
             <a:endParaRPr lang="nl-BE" baseline="0" dirty="0" smtClean="0"/>
           </a:p>
@@ -17241,6 +17259,59 @@
                       </p:childTnLst>
                     </p:cTn>
                   </p:par>
+                  <p:par>
+                    <p:cTn id="8" fill="hold">
+                      <p:stCondLst>
+                        <p:cond delay="indefinite"/>
+                      </p:stCondLst>
+                      <p:childTnLst>
+                        <p:par>
+                          <p:cTn id="9" fill="hold">
+                            <p:stCondLst>
+                              <p:cond delay="0"/>
+                            </p:stCondLst>
+                            <p:childTnLst>
+                              <p:par>
+                                <p:cTn id="10" presetID="10" presetClass="entr" presetSubtype="0" fill="hold" nodeType="clickEffect">
+                                  <p:stCondLst>
+                                    <p:cond delay="0"/>
+                                  </p:stCondLst>
+                                  <p:childTnLst>
+                                    <p:set>
+                                      <p:cBhvr>
+                                        <p:cTn id="11" dur="1" fill="hold">
+                                          <p:stCondLst>
+                                            <p:cond delay="0"/>
+                                          </p:stCondLst>
+                                        </p:cTn>
+                                        <p:tgtEl>
+                                          <p:spTgt spid="9"/>
+                                        </p:tgtEl>
+                                        <p:attrNameLst>
+                                          <p:attrName>style.visibility</p:attrName>
+                                        </p:attrNameLst>
+                                      </p:cBhvr>
+                                      <p:to>
+                                        <p:strVal val="visible"/>
+                                      </p:to>
+                                    </p:set>
+                                    <p:animEffect transition="in" filter="fade">
+                                      <p:cBhvr>
+                                        <p:cTn id="12" dur="500"/>
+                                        <p:tgtEl>
+                                          <p:spTgt spid="9"/>
+                                        </p:tgtEl>
+                                      </p:cBhvr>
+                                    </p:animEffect>
+                                  </p:childTnLst>
+                                </p:cTn>
+                              </p:par>
+                            </p:childTnLst>
+                          </p:cTn>
+                        </p:par>
+                      </p:childTnLst>
+                    </p:cTn>
+                  </p:par>
                 </p:childTnLst>
               </p:cTn>
               <p:prevCondLst>
@@ -17992,7 +18063,7 @@
       </p:pic>
       <p:pic>
         <p:nvPicPr>
-          <p:cNvPr id="5" name="Picture 4"/>
+          <p:cNvPr id="7" name="Picture 6"/>
           <p:cNvPicPr>
             <a:picLocks noChangeAspect="1"/>
           </p:cNvPicPr>
@@ -18006,8 +18077,8 @@
         </p:blipFill>
         <p:spPr>
           <a:xfrm>
-            <a:off x="838200" y="2417710"/>
-            <a:ext cx="7172325" cy="733425"/>
+            <a:off x="838200" y="5230422"/>
+            <a:ext cx="9753600" cy="990600"/>
           </a:xfrm>
           <a:prstGeom prst="rect">
             <a:avLst/>
@@ -18016,7 +18087,7 @@
       </p:pic>
       <p:pic>
         <p:nvPicPr>
-          <p:cNvPr id="7" name="Picture 6"/>
+          <p:cNvPr id="8" name="Picture 7"/>
           <p:cNvPicPr>
             <a:picLocks noChangeAspect="1"/>
           </p:cNvPicPr>
@@ -18030,8 +18101,8 @@
         </p:blipFill>
         <p:spPr>
           <a:xfrm>
-            <a:off x="838200" y="5230422"/>
-            <a:ext cx="9753600" cy="990600"/>
+            <a:off x="838200" y="2417710"/>
+            <a:ext cx="7172325" cy="733425"/>
           </a:xfrm>
           <a:prstGeom prst="rect">
             <a:avLst/>
@@ -18051,9 +18122,292 @@
   <p:timing>
     <p:tnLst>
       <p:par>
-        <p:cTn id="1" dur="indefinite" restart="never" nodeType="tmRoot"/>
+        <p:cTn id="1" dur="indefinite" restart="never" nodeType="tmRoot">
+          <p:childTnLst>
+            <p:seq concurrent="1" nextAc="seek">
+              <p:cTn id="2" dur="indefinite" nodeType="mainSeq">
+                <p:childTnLst>
+                  <p:par>
+                    <p:cTn id="3" fill="hold">
+                      <p:stCondLst>
+                        <p:cond delay="indefinite"/>
+                      </p:stCondLst>
+                      <p:childTnLst>
+                        <p:par>
+                          <p:cTn id="4" fill="hold">
+                            <p:stCondLst>
+                              <p:cond delay="0"/>
+                            </p:stCondLst>
+                            <p:childTnLst>
+                              <p:par>
+                                <p:cTn id="5" presetID="1" presetClass="entr" presetSubtype="0" fill="hold" grpId="0" nodeType="clickEffect">
+                                  <p:stCondLst>
+                                    <p:cond delay="0"/>
+                                  </p:stCondLst>
+                                  <p:childTnLst>
+                                    <p:set>
+                                      <p:cBhvr>
+                                        <p:cTn id="6" dur="1" fill="hold">
+                                          <p:stCondLst>
+                                            <p:cond delay="0"/>
+                                          </p:stCondLst>
+                                        </p:cTn>
+                                        <p:tgtEl>
+                                          <p:spTgt spid="3">
+                                            <p:txEl>
+                                              <p:pRg st="0" end="0"/>
+                                            </p:txEl>
+                                          </p:spTgt>
+                                        </p:tgtEl>
+                                        <p:attrNameLst>
+                                          <p:attrName>style.visibility</p:attrName>
+                                        </p:attrNameLst>
+                                      </p:cBhvr>
+                                      <p:to>
+                                        <p:strVal val="visible"/>
+                                      </p:to>
+                                    </p:set>
+                                  </p:childTnLst>
+                                </p:cTn>
+                              </p:par>
+                            </p:childTnLst>
+                          </p:cTn>
+                        </p:par>
+                      </p:childTnLst>
+                    </p:cTn>
+                  </p:par>
+                  <p:par>
+                    <p:cTn id="7" fill="hold">
+                      <p:stCondLst>
+                        <p:cond delay="indefinite"/>
+                      </p:stCondLst>
+                      <p:childTnLst>
+                        <p:par>
+                          <p:cTn id="8" fill="hold">
+                            <p:stCondLst>
+                              <p:cond delay="0"/>
+                            </p:stCondLst>
+                            <p:childTnLst>
+                              <p:par>
+                                <p:cTn id="9" presetID="10" presetClass="entr" presetSubtype="0" fill="hold" nodeType="clickEffect">
+                                  <p:stCondLst>
+                                    <p:cond delay="0"/>
+                                  </p:stCondLst>
+                                  <p:childTnLst>
+                                    <p:set>
+                                      <p:cBhvr>
+                                        <p:cTn id="10" dur="1" fill="hold">
+                                          <p:stCondLst>
+                                            <p:cond delay="0"/>
+                                          </p:stCondLst>
+                                        </p:cTn>
+                                        <p:tgtEl>
+                                          <p:spTgt spid="8"/>
+                                        </p:tgtEl>
+                                        <p:attrNameLst>
+                                          <p:attrName>style.visibility</p:attrName>
+                                        </p:attrNameLst>
+                                      </p:cBhvr>
+                                      <p:to>
+                                        <p:strVal val="visible"/>
+                                      </p:to>
+                                    </p:set>
+                                    <p:animEffect transition="in" filter="fade">
+                                      <p:cBhvr>
+                                        <p:cTn id="11" dur="500"/>
+                                        <p:tgtEl>
+                                          <p:spTgt spid="8"/>
+                                        </p:tgtEl>
+                                      </p:cBhvr>
+                                    </p:animEffect>
+                                  </p:childTnLst>
+                                </p:cTn>
+                              </p:par>
+                            </p:childTnLst>
+                          </p:cTn>
+                        </p:par>
+                      </p:childTnLst>
+                    </p:cTn>
+                  </p:par>
+                  <p:par>
+                    <p:cTn id="12" fill="hold">
+                      <p:stCondLst>
+                        <p:cond delay="indefinite"/>
+                      </p:stCondLst>
+                      <p:childTnLst>
+                        <p:par>
+                          <p:cTn id="13" fill="hold">
+                            <p:stCondLst>
+                              <p:cond delay="0"/>
+                            </p:stCondLst>
+                            <p:childTnLst>
+                              <p:par>
+                                <p:cTn id="14" presetID="1" presetClass="entr" presetSubtype="0" fill="hold" grpId="0" nodeType="clickEffect">
+                                  <p:stCondLst>
+                                    <p:cond delay="0"/>
+                                  </p:stCondLst>
+                                  <p:childTnLst>
+                                    <p:set>
+                                      <p:cBhvr>
+                                        <p:cTn id="15" dur="1" fill="hold">
+                                          <p:stCondLst>
+                                            <p:cond delay="0"/>
+                                          </p:stCondLst>
+                                        </p:cTn>
+                                        <p:tgtEl>
+                                          <p:spTgt spid="3">
+                                            <p:txEl>
+                                              <p:pRg st="3" end="3"/>
+                                            </p:txEl>
+                                          </p:spTgt>
+                                        </p:tgtEl>
+                                        <p:attrNameLst>
+                                          <p:attrName>style.visibility</p:attrName>
+                                        </p:attrNameLst>
+                                      </p:cBhvr>
+                                      <p:to>
+                                        <p:strVal val="visible"/>
+                                      </p:to>
+                                    </p:set>
+                                  </p:childTnLst>
+                                </p:cTn>
+                              </p:par>
+                            </p:childTnLst>
+                          </p:cTn>
+                        </p:par>
+                      </p:childTnLst>
+                    </p:cTn>
+                  </p:par>
+                  <p:par>
+                    <p:cTn id="16" fill="hold">
+                      <p:stCondLst>
+                        <p:cond delay="indefinite"/>
+                      </p:stCondLst>
+                      <p:childTnLst>
+                        <p:par>
+                          <p:cTn id="17" fill="hold">
+                            <p:stCondLst>
+                              <p:cond delay="0"/>
+                            </p:stCondLst>
+                            <p:childTnLst>
+                              <p:par>
+                                <p:cTn id="18" presetID="10" presetClass="entr" presetSubtype="0" fill="hold" nodeType="clickEffect">
+                                  <p:stCondLst>
+                                    <p:cond delay="0"/>
+                                  </p:stCondLst>
+                                  <p:childTnLst>
+                                    <p:set>
+                                      <p:cBhvr>
+                                        <p:cTn id="19" dur="1" fill="hold">
+                                          <p:stCondLst>
+                                            <p:cond delay="0"/>
+                                          </p:stCondLst>
+                                        </p:cTn>
+                                        <p:tgtEl>
+                                          <p:spTgt spid="4"/>
+                                        </p:tgtEl>
+                                        <p:attrNameLst>
+                                          <p:attrName>style.visibility</p:attrName>
+                                        </p:attrNameLst>
+                                      </p:cBhvr>
+                                      <p:to>
+                                        <p:strVal val="visible"/>
+                                      </p:to>
+                                    </p:set>
+                                    <p:animEffect transition="in" filter="fade">
+                                      <p:cBhvr>
+                                        <p:cTn id="20" dur="500"/>
+                                        <p:tgtEl>
+                                          <p:spTgt spid="4"/>
+                                        </p:tgtEl>
+                                      </p:cBhvr>
+                                    </p:animEffect>
+                                  </p:childTnLst>
+                                </p:cTn>
+                              </p:par>
+                            </p:childTnLst>
+                          </p:cTn>
+                        </p:par>
+                      </p:childTnLst>
+                    </p:cTn>
+                  </p:par>
+                  <p:par>
+                    <p:cTn id="21" fill="hold">
+                      <p:stCondLst>
+                        <p:cond delay="indefinite"/>
+                      </p:stCondLst>
+                      <p:childTnLst>
+                        <p:par>
+                          <p:cTn id="22" fill="hold">
+                            <p:stCondLst>
+                              <p:cond delay="0"/>
+                            </p:stCondLst>
+                            <p:childTnLst>
+                              <p:par>
+                                <p:cTn id="23" presetID="10" presetClass="entr" presetSubtype="0" fill="hold" nodeType="clickEffect">
+                                  <p:stCondLst>
+                                    <p:cond delay="0"/>
+                                  </p:stCondLst>
+                                  <p:childTnLst>
+                                    <p:set>
+                                      <p:cBhvr>
+                                        <p:cTn id="24" dur="1" fill="hold">
+                                          <p:stCondLst>
+                                            <p:cond delay="0"/>
+                                          </p:stCondLst>
+                                        </p:cTn>
+                                        <p:tgtEl>
+                                          <p:spTgt spid="7"/>
+                                        </p:tgtEl>
+                                        <p:attrNameLst>
+                                          <p:attrName>style.visibility</p:attrName>
+                                        </p:attrNameLst>
+                                      </p:cBhvr>
+                                      <p:to>
+                                        <p:strVal val="visible"/>
+                                      </p:to>
+                                    </p:set>
+                                    <p:animEffect transition="in" filter="fade">
+                                      <p:cBhvr>
+                                        <p:cTn id="25" dur="500"/>
+                                        <p:tgtEl>
+                                          <p:spTgt spid="7"/>
+                                        </p:tgtEl>
+                                      </p:cBhvr>
+                                    </p:animEffect>
+                                  </p:childTnLst>
+                                </p:cTn>
+                              </p:par>
+                            </p:childTnLst>
+                          </p:cTn>
+                        </p:par>
+                      </p:childTnLst>
+                    </p:cTn>
+                  </p:par>
+                </p:childTnLst>
+              </p:cTn>
+              <p:prevCondLst>
+                <p:cond evt="onPrev" delay="0">
+                  <p:tgtEl>
+                    <p:sldTgt/>
+                  </p:tgtEl>
+                </p:cond>
+              </p:prevCondLst>
+              <p:nextCondLst>
+                <p:cond evt="onNext" delay="0">
+                  <p:tgtEl>
+                    <p:sldTgt/>
+                  </p:tgtEl>
+                </p:cond>
+              </p:nextCondLst>
+            </p:seq>
+          </p:childTnLst>
+        </p:cTn>
       </p:par>
     </p:tnLst>
+    <p:bldLst>
+      <p:bldP spid="3" grpId="0" uiExpand="1" build="p"/>
+    </p:bldLst>
   </p:timing>
 </p:sld>
 </file>

</xml_diff>